<commit_message>
fixed duedate in detail view, added to PP
</commit_message>
<xml_diff>
--- a/Final Project Documentation/CSC521.pptx
+++ b/Final Project Documentation/CSC521.pptx
@@ -5,7 +5,7 @@
     <p:sldMasterId id="2147483678" r:id="rId1"/>
   </p:sldMasterIdLst>
   <p:notesMasterIdLst>
-    <p:notesMasterId r:id="rId14"/>
+    <p:notesMasterId r:id="rId16"/>
   </p:notesMasterIdLst>
   <p:sldIdLst>
     <p:sldId id="276" r:id="rId2"/>
@@ -14,12 +14,14 @@
     <p:sldId id="260" r:id="rId5"/>
     <p:sldId id="291" r:id="rId6"/>
     <p:sldId id="261" r:id="rId7"/>
-    <p:sldId id="265" r:id="rId8"/>
-    <p:sldId id="264" r:id="rId9"/>
-    <p:sldId id="290" r:id="rId10"/>
-    <p:sldId id="295" r:id="rId11"/>
-    <p:sldId id="293" r:id="rId12"/>
-    <p:sldId id="294" r:id="rId13"/>
+    <p:sldId id="297" r:id="rId8"/>
+    <p:sldId id="265" r:id="rId9"/>
+    <p:sldId id="264" r:id="rId10"/>
+    <p:sldId id="290" r:id="rId11"/>
+    <p:sldId id="296" r:id="rId12"/>
+    <p:sldId id="295" r:id="rId13"/>
+    <p:sldId id="293" r:id="rId14"/>
+    <p:sldId id="294" r:id="rId15"/>
   </p:sldIdLst>
   <p:sldSz cx="12192000" cy="6858000"/>
   <p:notesSz cx="6858000" cy="9144000"/>
@@ -410,6 +412,109 @@
 </p:notes>
 </file>
 
+<file path=ppt/notesSlides/notesSlide10.xml><?xml version="1.0" encoding="utf-8"?>
+<p:notes xmlns:a="http://schemas.openxmlformats.org/drawingml/2006/main" xmlns:r="http://schemas.openxmlformats.org/officeDocument/2006/relationships" xmlns:p="http://schemas.openxmlformats.org/presentationml/2006/main">
+  <p:cSld>
+    <p:spTree>
+      <p:nvGrpSpPr>
+        <p:cNvPr id="1" name=""/>
+        <p:cNvGrpSpPr/>
+        <p:nvPr/>
+      </p:nvGrpSpPr>
+      <p:grpSpPr>
+        <a:xfrm>
+          <a:off x="0" y="0"/>
+          <a:ext cx="0" cy="0"/>
+          <a:chOff x="0" y="0"/>
+          <a:chExt cx="0" cy="0"/>
+        </a:xfrm>
+      </p:grpSpPr>
+      <p:sp>
+        <p:nvSpPr>
+          <p:cNvPr id="2" name="Slide Image Placeholder 1"/>
+          <p:cNvSpPr>
+            <a:spLocks noGrp="1" noRot="1" noChangeAspect="1"/>
+          </p:cNvSpPr>
+          <p:nvPr>
+            <p:ph type="sldImg"/>
+          </p:nvPr>
+        </p:nvSpPr>
+        <p:spPr>
+          <a:xfrm>
+            <a:off x="685800" y="1143000"/>
+            <a:ext cx="5486400" cy="3086100"/>
+          </a:xfrm>
+          <a:prstGeom prst="rect">
+            <a:avLst/>
+          </a:prstGeom>
+          <a:noFill/>
+          <a:ln w="12700">
+            <a:solidFill>
+              <a:prstClr val="black"/>
+            </a:solidFill>
+          </a:ln>
+        </p:spPr>
+      </p:sp>
+      <p:sp>
+        <p:nvSpPr>
+          <p:cNvPr id="3" name="Notes Placeholder 2"/>
+          <p:cNvSpPr>
+            <a:spLocks noGrp="1"/>
+          </p:cNvSpPr>
+          <p:nvPr>
+            <p:ph type="body" idx="1"/>
+          </p:nvPr>
+        </p:nvSpPr>
+        <p:spPr>
+          <a:xfrm>
+            <a:off x="685800" y="4400550"/>
+            <a:ext cx="5486400" cy="3600450"/>
+          </a:xfrm>
+          <a:prstGeom prst="rect">
+            <a:avLst/>
+          </a:prstGeom>
+        </p:spPr>
+        <p:txBody>
+          <a:bodyPr/>
+          <a:lstStyle/>
+          <a:p>
+            <a:r>
+              <a:rPr lang="en-US" sz="1200" kern="1200" dirty="0" smtClean="0">
+                <a:solidFill>
+                  <a:schemeClr val="tx1"/>
+                </a:solidFill>
+                <a:effectLst/>
+                <a:latin typeface="+mn-lt"/>
+                <a:ea typeface="+mn-ea"/>
+                <a:cs typeface="+mn-cs"/>
+              </a:rPr>
+              <a:t>We would like to thank you for your time, and this brings us to the conclusion of our presentation. Do we have any questions?</a:t>
+            </a:r>
+            <a:endParaRPr lang="en-US" sz="1200" kern="1200" dirty="0">
+              <a:solidFill>
+                <a:schemeClr val="tx1"/>
+              </a:solidFill>
+              <a:effectLst/>
+              <a:latin typeface="+mn-lt"/>
+              <a:ea typeface="+mn-ea"/>
+              <a:cs typeface="+mn-cs"/>
+            </a:endParaRPr>
+          </a:p>
+        </p:txBody>
+      </p:sp>
+    </p:spTree>
+    <p:extLst>
+      <p:ext uri="{BB962C8B-B14F-4D97-AF65-F5344CB8AC3E}">
+        <p14:creationId xmlns:p14="http://schemas.microsoft.com/office/powerpoint/2010/main" val="971011799"/>
+      </p:ext>
+    </p:extLst>
+  </p:cSld>
+  <p:clrMapOvr>
+    <a:masterClrMapping/>
+  </p:clrMapOvr>
+</p:notes>
+</file>
+
 <file path=ppt/notesSlides/notesSlide2.xml><?xml version="1.0" encoding="utf-8"?>
 <p:notes xmlns:a="http://schemas.openxmlformats.org/drawingml/2006/main" xmlns:r="http://schemas.openxmlformats.org/officeDocument/2006/relationships" xmlns:p="http://schemas.openxmlformats.org/presentationml/2006/main">
   <p:cSld>
@@ -1472,7 +1577,58 @@
               <a:rPr lang="en-US">
                 <a:cs typeface="Calibri"/>
               </a:rPr>
-              <a:t>website</a:t>
+              <a:t>workflow chart - </a:t>
+            </a:r>
+            <a:r>
+              <a:rPr lang="en-US" sz="1100">
+                <a:cs typeface="Calibri"/>
+              </a:rPr>
+              <a:t>This work has been released into the </a:t>
+            </a:r>
+            <a:r>
+              <a:rPr lang="en-US" sz="1100" b="1">
+                <a:cs typeface="Calibri"/>
+                <a:hlinkClick r:id="rId3" tooltip="w:en:public domain"/>
+              </a:rPr>
+              <a:t>public domain</a:t>
+            </a:r>
+            <a:r>
+              <a:rPr lang="en-US" sz="1100">
+                <a:cs typeface="Calibri"/>
+              </a:rPr>
+              <a:t> by its author, </a:t>
+            </a:r>
+            <a:r>
+              <a:rPr lang="en-US" sz="1100" b="1">
+                <a:cs typeface="Calibri"/>
+                <a:hlinkClick r:id="rId4" tooltip="Projectcode:User:Dutchguilder (page does not exist)"/>
+              </a:rPr>
+              <a:t>Dutchguilder</a:t>
+            </a:r>
+            <a:r>
+              <a:rPr lang="en-US" sz="1100" b="1">
+                <a:cs typeface="Calibri"/>
+              </a:rPr>
+              <a:t> at the </a:t>
+            </a:r>
+            <a:r>
+              <a:rPr lang="en-US" sz="1100" b="1">
+                <a:cs typeface="Calibri"/>
+                <a:hlinkClick r:id="rId5" tooltip="Projectcode: (page does not exist)"/>
+              </a:rPr>
+              <a:t>projectname</a:t>
+            </a:r>
+            <a:r>
+              <a:rPr lang="en-US" sz="1100" b="1">
+                <a:cs typeface="Calibri"/>
+              </a:rPr>
+              <a:t> project</a:t>
+            </a:r>
+            <a:r>
+              <a:rPr lang="en-US" sz="1100">
+                <a:cs typeface="Calibri"/>
+              </a:rPr>
+              <a:t>. This applies worldwide.</a:t>
             </a:r>
           </a:p>
           <a:p>
@@ -1480,23 +1636,7 @@
               <a:rPr lang="en-US">
                 <a:cs typeface="Calibri"/>
               </a:rPr>
-              <a:t>functionality</a:t>
-            </a:r>
-          </a:p>
-          <a:p>
-            <a:r>
-              <a:rPr lang="en-US">
-                <a:cs typeface="Calibri"/>
-              </a:rPr>
-              <a:t>From Beth:</a:t>
-            </a:r>
-          </a:p>
-          <a:p>
-            <a:r>
-              <a:rPr lang="en-US">
-                <a:cs typeface="Calibri"/>
-              </a:rPr>
-              <a:t>If you explain at the beginning that there are uncertainties and show how there is a range of time that you expect these things to be done in, then when you reevaluate you should be more certain and have a better view of how long it's going to take so that the time range should be more narrow.  We need to acknowledge during the presentation that the first couple of sprints are experimental and will have a better feel of what we can acomplish. </a:t>
+              <a:t>2 week sprints</a:t>
             </a:r>
           </a:p>
           <a:p>
@@ -1520,7 +1660,7 @@
     </p:spTree>
     <p:extLst>
       <p:ext uri="{BB962C8B-B14F-4D97-AF65-F5344CB8AC3E}">
-        <p14:creationId xmlns:p14="http://schemas.microsoft.com/office/powerpoint/2010/main" val="2858488278"/>
+        <p14:creationId xmlns:p14="http://schemas.microsoft.com/office/powerpoint/2010/main" val="2827903348"/>
       </p:ext>
     </p:extLst>
   </p:cSld>
@@ -1597,145 +1737,58 @@
           <a:lstStyle/>
           <a:p>
             <a:r>
-              <a:rPr lang="en-US" dirty="0" smtClean="0"/>
-              <a:t>We </a:t>
-            </a:r>
-            <a:r>
-              <a:rPr lang="en-US" dirty="0"/>
-              <a:t>assigned specification 20% because we felt it was one of the most important parts of our project and considering we all took the software engineering track we were able to understand its importance.</a:t>
-            </a:r>
-          </a:p>
-          <a:p>
-            <a:endParaRPr lang="en-US" dirty="0">
-              <a:solidFill>
-                <a:srgbClr val="FF0000"/>
-              </a:solidFill>
-              <a:latin typeface="Times New Roman"/>
-              <a:cs typeface="Times New Roman"/>
+              <a:rPr lang="en-US">
+                <a:cs typeface="Calibri"/>
+              </a:rPr>
+              <a:t>website</a:t>
+            </a:r>
+          </a:p>
+          <a:p>
+            <a:r>
+              <a:rPr lang="en-US">
+                <a:cs typeface="Calibri"/>
+              </a:rPr>
+              <a:t>functionality</a:t>
+            </a:r>
+          </a:p>
+          <a:p>
+            <a:r>
+              <a:rPr lang="en-US">
+                <a:cs typeface="Calibri"/>
+              </a:rPr>
+              <a:t>From Beth:</a:t>
+            </a:r>
+          </a:p>
+          <a:p>
+            <a:r>
+              <a:rPr lang="en-US">
+                <a:cs typeface="Calibri"/>
+              </a:rPr>
+              <a:t>If you explain at the beginning that there are uncertainties and show how there is a range of time that you expect these things to be done in, then when you reevaluate you should be more certain and have a better view of how long it's going to take so that the time range should be more narrow.  We need to acknowledge during the presentation that the first couple of sprints are experimental and will have a better feel of what we can acomplish. </a:t>
+            </a:r>
+          </a:p>
+          <a:p>
+            <a:r>
+              <a:rPr lang="en-US">
+                <a:cs typeface="Calibri"/>
+              </a:rPr>
+              <a:t/>
+            </a:r>
+            <a:br>
+              <a:rPr lang="en-US">
+                <a:cs typeface="Calibri"/>
+              </a:rPr>
+            </a:br>
+            <a:endParaRPr lang="en-US">
+              <a:cs typeface="Calibri"/>
             </a:endParaRPr>
-          </a:p>
-          <a:p>
-            <a:r>
-              <a:rPr lang="en-US" dirty="0"/>
-              <a:t>&lt;Next/&gt;</a:t>
-            </a:r>
-          </a:p>
-          <a:p>
-            <a:r>
-              <a:rPr lang="en-US" dirty="0"/>
-              <a:t>Following up with analysis we assigned it a slightly smaller number because we didn’t feel it was as important as specifications but at the same time we felt pulling out our classes and having a good understanding of the functional flow was important for scalability and maintainability in later workflows.</a:t>
-            </a:r>
-          </a:p>
-          <a:p>
-            <a:endParaRPr lang="en-US" dirty="0">
-              <a:latin typeface="Times New Roman"/>
-              <a:cs typeface="Times New Roman"/>
-            </a:endParaRPr>
-          </a:p>
-          <a:p>
-            <a:r>
-              <a:rPr lang="en-US" dirty="0"/>
-              <a:t>&lt;Next/&gt;</a:t>
-            </a:r>
-          </a:p>
-          <a:p>
-            <a:r>
-              <a:rPr lang="en-US" dirty="0"/>
-              <a:t>Design was given the same level of effort as analysis because at this point we will have already spent </a:t>
-            </a:r>
-            <a:r>
-              <a:rPr lang="en-US" dirty="0" smtClean="0"/>
-              <a:t>half of</a:t>
-            </a:r>
-            <a:r>
-              <a:rPr lang="en-US" baseline="0" dirty="0" smtClean="0"/>
-              <a:t> our</a:t>
-            </a:r>
-            <a:r>
-              <a:rPr lang="en-US" dirty="0" smtClean="0"/>
-              <a:t> </a:t>
-            </a:r>
-            <a:r>
-              <a:rPr lang="en-US" dirty="0"/>
-              <a:t>time on </a:t>
-            </a:r>
-            <a:r>
-              <a:rPr lang="en-US" dirty="0" smtClean="0"/>
-              <a:t>planning, </a:t>
-            </a:r>
-            <a:r>
-              <a:rPr lang="en-US" dirty="0"/>
-              <a:t>so continuing to make sure we keep on track and work on our design before implementation seemed appropriate. </a:t>
-            </a:r>
-          </a:p>
-          <a:p>
-            <a:endParaRPr lang="en-US" dirty="0">
-              <a:latin typeface="Times New Roman"/>
-              <a:cs typeface="Times New Roman"/>
-            </a:endParaRPr>
-          </a:p>
-          <a:p>
-            <a:r>
-              <a:rPr lang="en-US" dirty="0"/>
-              <a:t>&lt;Next/&gt;</a:t>
-            </a:r>
-          </a:p>
-          <a:p>
-            <a:r>
-              <a:rPr lang="en-US" dirty="0"/>
-              <a:t>Implementation came in at 30%. Although the largest individual assignment, we have still assigned the majority of the project to planning.</a:t>
-            </a:r>
-          </a:p>
-          <a:p>
-            <a:endParaRPr lang="en-US" dirty="0">
-              <a:latin typeface="Times New Roman"/>
-              <a:cs typeface="Times New Roman"/>
-            </a:endParaRPr>
-          </a:p>
-          <a:p>
-            <a:r>
-              <a:rPr lang="en-US" dirty="0"/>
-              <a:t>&lt;Next/&gt;</a:t>
-            </a:r>
-          </a:p>
-          <a:p>
-            <a:r>
-              <a:rPr lang="en-US" dirty="0"/>
-              <a:t>Documentation </a:t>
-            </a:r>
-            <a:r>
-              <a:rPr lang="en-US" dirty="0" smtClean="0"/>
-              <a:t>has earned </a:t>
-            </a:r>
-            <a:r>
-              <a:rPr lang="en-US" dirty="0"/>
-              <a:t>it's self 10% because as a real world software experience we understand that in order for a group to function properly, we can’t be wasting our time trying to understand what our colleague’s code is supposed to do.</a:t>
-            </a:r>
-          </a:p>
-          <a:p>
-            <a:endParaRPr lang="en-US" dirty="0">
-              <a:latin typeface="Times New Roman"/>
-              <a:cs typeface="Times New Roman"/>
-            </a:endParaRPr>
-          </a:p>
-          <a:p>
-            <a:r>
-              <a:rPr lang="en-US" dirty="0"/>
-              <a:t>&lt;Next/&gt;</a:t>
-            </a:r>
-          </a:p>
-          <a:p>
-            <a:r>
-              <a:rPr lang="en-US" dirty="0"/>
-              <a:t>And finally we have assigned our presentation 10% because our goal is to not just to deliver a piece of software but deliver a quality and engaging product presentation. </a:t>
-            </a:r>
           </a:p>
         </p:txBody>
       </p:sp>
     </p:spTree>
     <p:extLst>
       <p:ext uri="{BB962C8B-B14F-4D97-AF65-F5344CB8AC3E}">
-        <p14:creationId xmlns:p14="http://schemas.microsoft.com/office/powerpoint/2010/main" val="3049396755"/>
+        <p14:creationId xmlns:p14="http://schemas.microsoft.com/office/powerpoint/2010/main" val="2858488278"/>
       </p:ext>
     </p:extLst>
   </p:cSld>
@@ -1812,33 +1865,145 @@
           <a:lstStyle/>
           <a:p>
             <a:r>
-              <a:rPr lang="en-US" sz="1200" kern="1200" dirty="0" smtClean="0">
-                <a:solidFill>
-                  <a:schemeClr val="tx1"/>
-                </a:solidFill>
-                <a:effectLst/>
-                <a:latin typeface="+mn-lt"/>
-                <a:ea typeface="+mn-ea"/>
-                <a:cs typeface="+mn-cs"/>
-              </a:rPr>
-              <a:t>We would like to thank you for your time, and this brings us to the conclusion of our presentation. Do we have any questions?</a:t>
-            </a:r>
-            <a:endParaRPr lang="en-US" sz="1200" kern="1200" dirty="0">
+              <a:rPr lang="en-US" dirty="0" smtClean="0"/>
+              <a:t>We </a:t>
+            </a:r>
+            <a:r>
+              <a:rPr lang="en-US" dirty="0"/>
+              <a:t>assigned specification 20% because we felt it was one of the most important parts of our project and considering we all took the software engineering track we were able to understand its importance.</a:t>
+            </a:r>
+          </a:p>
+          <a:p>
+            <a:endParaRPr lang="en-US" dirty="0">
               <a:solidFill>
-                <a:schemeClr val="tx1"/>
+                <a:srgbClr val="FF0000"/>
               </a:solidFill>
-              <a:effectLst/>
-              <a:latin typeface="+mn-lt"/>
-              <a:ea typeface="+mn-ea"/>
-              <a:cs typeface="+mn-cs"/>
+              <a:latin typeface="Times New Roman"/>
+              <a:cs typeface="Times New Roman"/>
             </a:endParaRPr>
+          </a:p>
+          <a:p>
+            <a:r>
+              <a:rPr lang="en-US" dirty="0"/>
+              <a:t>&lt;Next/&gt;</a:t>
+            </a:r>
+          </a:p>
+          <a:p>
+            <a:r>
+              <a:rPr lang="en-US" dirty="0"/>
+              <a:t>Following up with analysis we assigned it a slightly smaller number because we didn’t feel it was as important as specifications but at the same time we felt pulling out our classes and having a good understanding of the functional flow was important for scalability and maintainability in later workflows.</a:t>
+            </a:r>
+          </a:p>
+          <a:p>
+            <a:endParaRPr lang="en-US" dirty="0">
+              <a:latin typeface="Times New Roman"/>
+              <a:cs typeface="Times New Roman"/>
+            </a:endParaRPr>
+          </a:p>
+          <a:p>
+            <a:r>
+              <a:rPr lang="en-US" dirty="0"/>
+              <a:t>&lt;Next/&gt;</a:t>
+            </a:r>
+          </a:p>
+          <a:p>
+            <a:r>
+              <a:rPr lang="en-US" dirty="0"/>
+              <a:t>Design was given the same level of effort as analysis because at this point we will have already spent </a:t>
+            </a:r>
+            <a:r>
+              <a:rPr lang="en-US" dirty="0" smtClean="0"/>
+              <a:t>half of</a:t>
+            </a:r>
+            <a:r>
+              <a:rPr lang="en-US" baseline="0" dirty="0" smtClean="0"/>
+              <a:t> our</a:t>
+            </a:r>
+            <a:r>
+              <a:rPr lang="en-US" dirty="0" smtClean="0"/>
+              <a:t> </a:t>
+            </a:r>
+            <a:r>
+              <a:rPr lang="en-US" dirty="0"/>
+              <a:t>time on </a:t>
+            </a:r>
+            <a:r>
+              <a:rPr lang="en-US" dirty="0" smtClean="0"/>
+              <a:t>planning, </a:t>
+            </a:r>
+            <a:r>
+              <a:rPr lang="en-US" dirty="0"/>
+              <a:t>so continuing to make sure we keep on track and work on our design before implementation seemed appropriate. </a:t>
+            </a:r>
+          </a:p>
+          <a:p>
+            <a:endParaRPr lang="en-US" dirty="0">
+              <a:latin typeface="Times New Roman"/>
+              <a:cs typeface="Times New Roman"/>
+            </a:endParaRPr>
+          </a:p>
+          <a:p>
+            <a:r>
+              <a:rPr lang="en-US" dirty="0"/>
+              <a:t>&lt;Next/&gt;</a:t>
+            </a:r>
+          </a:p>
+          <a:p>
+            <a:r>
+              <a:rPr lang="en-US" dirty="0"/>
+              <a:t>Implementation came in at 30%. Although the largest individual assignment, we have still assigned the majority of the project to planning.</a:t>
+            </a:r>
+          </a:p>
+          <a:p>
+            <a:endParaRPr lang="en-US" dirty="0">
+              <a:latin typeface="Times New Roman"/>
+              <a:cs typeface="Times New Roman"/>
+            </a:endParaRPr>
+          </a:p>
+          <a:p>
+            <a:r>
+              <a:rPr lang="en-US" dirty="0"/>
+              <a:t>&lt;Next/&gt;</a:t>
+            </a:r>
+          </a:p>
+          <a:p>
+            <a:r>
+              <a:rPr lang="en-US" dirty="0"/>
+              <a:t>Documentation </a:t>
+            </a:r>
+            <a:r>
+              <a:rPr lang="en-US" dirty="0" smtClean="0"/>
+              <a:t>has earned </a:t>
+            </a:r>
+            <a:r>
+              <a:rPr lang="en-US" dirty="0"/>
+              <a:t>it's self 10% because as a real world software experience we understand that in order for a group to function properly, we can’t be wasting our time trying to understand what our colleague’s code is supposed to do.</a:t>
+            </a:r>
+          </a:p>
+          <a:p>
+            <a:endParaRPr lang="en-US" dirty="0">
+              <a:latin typeface="Times New Roman"/>
+              <a:cs typeface="Times New Roman"/>
+            </a:endParaRPr>
+          </a:p>
+          <a:p>
+            <a:r>
+              <a:rPr lang="en-US" dirty="0"/>
+              <a:t>&lt;Next/&gt;</a:t>
+            </a:r>
+          </a:p>
+          <a:p>
+            <a:r>
+              <a:rPr lang="en-US" dirty="0"/>
+              <a:t>And finally we have assigned our presentation 10% because our goal is to not just to deliver a piece of software but deliver a quality and engaging product presentation. </a:t>
+            </a:r>
           </a:p>
         </p:txBody>
       </p:sp>
     </p:spTree>
     <p:extLst>
       <p:ext uri="{BB962C8B-B14F-4D97-AF65-F5344CB8AC3E}">
-        <p14:creationId xmlns:p14="http://schemas.microsoft.com/office/powerpoint/2010/main" val="971011799"/>
+        <p14:creationId xmlns:p14="http://schemas.microsoft.com/office/powerpoint/2010/main" val="3049396755"/>
       </p:ext>
     </p:extLst>
   </p:cSld>
@@ -8983,6 +9148,309 @@
 </file>
 
 <file path=ppt/slides/slide10.xml><?xml version="1.0" encoding="utf-8"?>
+<p:sld xmlns:a="http://schemas.openxmlformats.org/drawingml/2006/main" xmlns:r="http://schemas.openxmlformats.org/officeDocument/2006/relationships" xmlns:p="http://schemas.openxmlformats.org/presentationml/2006/main">
+  <p:cSld>
+    <p:spTree>
+      <p:nvGrpSpPr>
+        <p:cNvPr id="1" name=""/>
+        <p:cNvGrpSpPr/>
+        <p:nvPr/>
+      </p:nvGrpSpPr>
+      <p:grpSpPr>
+        <a:xfrm>
+          <a:off x="0" y="0"/>
+          <a:ext cx="0" cy="0"/>
+          <a:chOff x="0" y="0"/>
+          <a:chExt cx="0" cy="0"/>
+        </a:xfrm>
+      </p:grpSpPr>
+      <p:sp>
+        <p:nvSpPr>
+          <p:cNvPr id="2" name="Title 1"/>
+          <p:cNvSpPr>
+            <a:spLocks noGrp="1"/>
+          </p:cNvSpPr>
+          <p:nvPr>
+            <p:ph type="ctrTitle"/>
+          </p:nvPr>
+        </p:nvSpPr>
+        <p:spPr>
+          <a:xfrm>
+            <a:off x="1298046" y="1911287"/>
+            <a:ext cx="7766936" cy="1646302"/>
+          </a:xfrm>
+        </p:spPr>
+        <p:txBody>
+          <a:bodyPr>
+            <a:normAutofit/>
+          </a:bodyPr>
+          <a:lstStyle/>
+          <a:p>
+            <a:pPr algn="ctr"/>
+            <a:r>
+              <a:rPr lang="en-US" sz="7200" dirty="0" smtClean="0">
+                <a:latin typeface="Big Caslon"/>
+                <a:cs typeface="Big Caslon"/>
+              </a:rPr>
+              <a:t>Plan</a:t>
+            </a:r>
+            <a:r>
+              <a:rPr lang="en-US" sz="7200" i="1" dirty="0" smtClean="0">
+                <a:solidFill>
+                  <a:srgbClr val="7F7F7F"/>
+                </a:solidFill>
+                <a:latin typeface="Big Caslon"/>
+                <a:cs typeface="Big Caslon"/>
+              </a:rPr>
+              <a:t>it</a:t>
+            </a:r>
+            <a:r>
+              <a:rPr lang="en-US" sz="7200" dirty="0" smtClean="0">
+                <a:solidFill>
+                  <a:srgbClr val="7F7F7F"/>
+                </a:solidFill>
+                <a:latin typeface="Big Caslon"/>
+                <a:cs typeface="Big Caslon"/>
+              </a:rPr>
+              <a:t>!</a:t>
+            </a:r>
+            <a:endParaRPr lang="en-US" sz="7200" dirty="0">
+              <a:solidFill>
+                <a:srgbClr val="7F7F7F"/>
+              </a:solidFill>
+              <a:latin typeface="Big Caslon"/>
+              <a:cs typeface="Big Caslon"/>
+            </a:endParaRPr>
+          </a:p>
+        </p:txBody>
+      </p:sp>
+      <p:sp>
+        <p:nvSpPr>
+          <p:cNvPr id="6" name="Rectangle 5"/>
+          <p:cNvSpPr/>
+          <p:nvPr/>
+        </p:nvSpPr>
+        <p:spPr>
+          <a:xfrm>
+            <a:off x="3919267" y="3393071"/>
+            <a:ext cx="2405850" cy="400110"/>
+          </a:xfrm>
+          <a:prstGeom prst="rect">
+            <a:avLst/>
+          </a:prstGeom>
+        </p:spPr>
+        <p:txBody>
+          <a:bodyPr wrap="none">
+            <a:spAutoFit/>
+          </a:bodyPr>
+          <a:lstStyle/>
+          <a:p>
+            <a:pPr algn="ctr"/>
+            <a:r>
+              <a:rPr lang="en-US" sz="2000" dirty="0">
+                <a:solidFill>
+                  <a:srgbClr val="70AD47"/>
+                </a:solidFill>
+              </a:rPr>
+              <a:t>We’re Here to Help</a:t>
+            </a:r>
+          </a:p>
+        </p:txBody>
+      </p:sp>
+    </p:spTree>
+    <p:extLst>
+      <p:ext uri="{BB962C8B-B14F-4D97-AF65-F5344CB8AC3E}">
+        <p14:creationId xmlns:p14="http://schemas.microsoft.com/office/powerpoint/2010/main" val="2624175973"/>
+      </p:ext>
+    </p:extLst>
+  </p:cSld>
+  <p:clrMapOvr>
+    <a:masterClrMapping/>
+  </p:clrMapOvr>
+  <p:timing>
+    <p:tnLst>
+      <p:par>
+        <p:cTn id="1" dur="indefinite" restart="never" nodeType="tmRoot"/>
+      </p:par>
+    </p:tnLst>
+  </p:timing>
+</p:sld>
+</file>
+
+<file path=ppt/slides/slide11.xml><?xml version="1.0" encoding="utf-8"?>
+<p:sld xmlns:a="http://schemas.openxmlformats.org/drawingml/2006/main" xmlns:r="http://schemas.openxmlformats.org/officeDocument/2006/relationships" xmlns:p="http://schemas.openxmlformats.org/presentationml/2006/main">
+  <p:cSld>
+    <p:spTree>
+      <p:nvGrpSpPr>
+        <p:cNvPr id="1" name=""/>
+        <p:cNvGrpSpPr/>
+        <p:nvPr/>
+      </p:nvGrpSpPr>
+      <p:grpSpPr>
+        <a:xfrm>
+          <a:off x="0" y="0"/>
+          <a:ext cx="0" cy="0"/>
+          <a:chOff x="0" y="0"/>
+          <a:chExt cx="0" cy="0"/>
+        </a:xfrm>
+      </p:grpSpPr>
+      <p:sp>
+        <p:nvSpPr>
+          <p:cNvPr id="2" name="Title 1"/>
+          <p:cNvSpPr>
+            <a:spLocks noGrp="1"/>
+          </p:cNvSpPr>
+          <p:nvPr>
+            <p:ph type="title"/>
+          </p:nvPr>
+        </p:nvSpPr>
+        <p:spPr/>
+        <p:txBody>
+          <a:bodyPr/>
+          <a:lstStyle/>
+          <a:p>
+            <a:endParaRPr lang="en-US" dirty="0"/>
+          </a:p>
+        </p:txBody>
+      </p:sp>
+      <p:sp>
+        <p:nvSpPr>
+          <p:cNvPr id="3" name="Content Placeholder 2"/>
+          <p:cNvSpPr>
+            <a:spLocks noGrp="1"/>
+          </p:cNvSpPr>
+          <p:nvPr>
+            <p:ph idx="1"/>
+          </p:nvPr>
+        </p:nvSpPr>
+        <p:spPr/>
+        <p:txBody>
+          <a:bodyPr>
+            <a:normAutofit fontScale="85000" lnSpcReduction="20000"/>
+          </a:bodyPr>
+          <a:lstStyle/>
+          <a:p>
+            <a:r>
+              <a:rPr lang="en-US" b="1" dirty="0"/>
+              <a:t>Choosing the Project Framework</a:t>
+            </a:r>
+            <a:endParaRPr lang="en-US" dirty="0"/>
+          </a:p>
+          <a:p>
+            <a:r>
+              <a:rPr lang="en-US" b="1" dirty="0"/>
+              <a:t>Doing the first walkthrough of deploying to Azure</a:t>
+            </a:r>
+            <a:endParaRPr lang="en-US" dirty="0"/>
+          </a:p>
+          <a:p>
+            <a:r>
+              <a:rPr lang="en-US" b="1" dirty="0"/>
+              <a:t>Integrating JQuery plugins into MVC project</a:t>
+            </a:r>
+            <a:endParaRPr lang="en-US" dirty="0"/>
+          </a:p>
+          <a:p>
+            <a:r>
+              <a:rPr lang="en-US" b="1" dirty="0"/>
+              <a:t>Integrating </a:t>
+            </a:r>
+            <a:r>
+              <a:rPr lang="en-US" b="1" dirty="0" err="1"/>
+              <a:t>javascript</a:t>
+            </a:r>
+            <a:r>
+              <a:rPr lang="en-US" b="1" dirty="0"/>
+              <a:t> code into MVC/Razor/Html Model</a:t>
+            </a:r>
+            <a:endParaRPr lang="en-US" dirty="0"/>
+          </a:p>
+          <a:p>
+            <a:r>
+              <a:rPr lang="en-US" b="1" dirty="0"/>
+              <a:t>The GIT Bash Learning curve - Living in </a:t>
+            </a:r>
+            <a:r>
+              <a:rPr lang="en-US" b="1" dirty="0" err="1"/>
+              <a:t>GITHub</a:t>
+            </a:r>
+            <a:r>
+              <a:rPr lang="en-US" b="1" dirty="0"/>
+              <a:t> and working in GIT</a:t>
+            </a:r>
+            <a:endParaRPr lang="en-US" dirty="0"/>
+          </a:p>
+          <a:p>
+            <a:r>
+              <a:rPr lang="en-US" b="1" dirty="0"/>
+              <a:t>Database </a:t>
+            </a:r>
+            <a:endParaRPr lang="en-US" dirty="0"/>
+          </a:p>
+          <a:p>
+            <a:r>
+              <a:rPr lang="en-US" b="1" dirty="0"/>
+              <a:t>Integrating the MVC “free” User Authentication</a:t>
+            </a:r>
+            <a:endParaRPr lang="en-US" dirty="0"/>
+          </a:p>
+          <a:p>
+            <a:r>
+              <a:rPr lang="en-US" b="1" dirty="0"/>
+              <a:t>No change is a standalone change</a:t>
+            </a:r>
+            <a:endParaRPr lang="en-US" dirty="0"/>
+          </a:p>
+          <a:p>
+            <a:r>
+              <a:rPr lang="en-US" b="1" dirty="0"/>
+              <a:t>Sprints, deadlines, formal testing and documentation – not so much….</a:t>
+            </a:r>
+            <a:endParaRPr lang="en-US" dirty="0"/>
+          </a:p>
+          <a:p>
+            <a:r>
+              <a:rPr lang="en-US" b="1" dirty="0"/>
+              <a:t>Scheduling, Teamwork and meetings</a:t>
+            </a:r>
+            <a:endParaRPr lang="en-US" dirty="0"/>
+          </a:p>
+          <a:p>
+            <a:r>
+              <a:rPr lang="en-US" b="1" dirty="0"/>
+              <a:t>Beta Testing by Family and Friends</a:t>
+            </a:r>
+            <a:r>
+              <a:rPr lang="en-US" dirty="0"/>
+              <a:t> </a:t>
+            </a:r>
+          </a:p>
+          <a:p>
+            <a:r>
+              <a:rPr lang="en-US" b="1" dirty="0"/>
+              <a:t>What would we do differently?</a:t>
+            </a:r>
+            <a:endParaRPr lang="en-US" dirty="0"/>
+          </a:p>
+          <a:p>
+            <a:endParaRPr lang="en-US" dirty="0"/>
+          </a:p>
+        </p:txBody>
+      </p:sp>
+    </p:spTree>
+    <p:extLst>
+      <p:ext uri="{BB962C8B-B14F-4D97-AF65-F5344CB8AC3E}">
+        <p14:creationId xmlns:p14="http://schemas.microsoft.com/office/powerpoint/2010/main" val="2116137551"/>
+      </p:ext>
+    </p:extLst>
+  </p:cSld>
+  <p:clrMapOvr>
+    <a:masterClrMapping/>
+  </p:clrMapOvr>
+</p:sld>
+</file>
+
+<file path=ppt/slides/slide12.xml><?xml version="1.0" encoding="utf-8"?>
 <p:sld xmlns:a="http://schemas.openxmlformats.org/drawingml/2006/main" xmlns:r="http://schemas.openxmlformats.org/officeDocument/2006/relationships" xmlns:p="http://schemas.openxmlformats.org/presentationml/2006/main">
   <p:cSld>
     <p:spTree>
@@ -10203,7 +10671,7 @@
 </p:sld>
 </file>
 
-<file path=ppt/slides/slide11.xml><?xml version="1.0" encoding="utf-8"?>
+<file path=ppt/slides/slide13.xml><?xml version="1.0" encoding="utf-8"?>
 <p:sld xmlns:a="http://schemas.openxmlformats.org/drawingml/2006/main" xmlns:r="http://schemas.openxmlformats.org/officeDocument/2006/relationships" xmlns:p="http://schemas.openxmlformats.org/presentationml/2006/main">
   <p:cSld>
     <p:spTree>
@@ -10295,7 +10763,7 @@
 </p:sld>
 </file>
 
-<file path=ppt/slides/slide12.xml><?xml version="1.0" encoding="utf-8"?>
+<file path=ppt/slides/slide14.xml><?xml version="1.0" encoding="utf-8"?>
 <p:sld xmlns:a="http://schemas.openxmlformats.org/drawingml/2006/main" xmlns:r="http://schemas.openxmlformats.org/officeDocument/2006/relationships" xmlns:p="http://schemas.openxmlformats.org/presentationml/2006/main">
   <p:cSld>
     <p:spTree>
@@ -13783,6 +14251,88 @@
           <a:lstStyle/>
           <a:p>
             <a:r>
+              <a:rPr lang="en-US" dirty="0"/>
+              <a:t>Time Schedule</a:t>
+            </a:r>
+          </a:p>
+        </p:txBody>
+      </p:sp>
+      <p:pic>
+        <p:nvPicPr>
+          <p:cNvPr id="7" name="Content Placeholder 6" descr="ScreenCapture 2013-12-06 at 9.18.43 PM.jpg"/>
+          <p:cNvPicPr>
+            <a:picLocks noGrp="1" noChangeAspect="1"/>
+          </p:cNvPicPr>
+          <p:nvPr>
+            <p:ph idx="1"/>
+          </p:nvPr>
+        </p:nvPicPr>
+        <p:blipFill>
+          <a:blip r:embed="rId3"/>
+          <a:stretch>
+            <a:fillRect/>
+          </a:stretch>
+        </p:blipFill>
+        <p:spPr>
+          <a:xfrm>
+            <a:off x="239713" y="1806463"/>
+            <a:ext cx="9311298" cy="3443400"/>
+          </a:xfrm>
+        </p:spPr>
+      </p:pic>
+    </p:spTree>
+    <p:extLst>
+      <p:ext uri="{BB962C8B-B14F-4D97-AF65-F5344CB8AC3E}">
+        <p14:creationId xmlns:p14="http://schemas.microsoft.com/office/powerpoint/2010/main" val="4197266926"/>
+      </p:ext>
+    </p:extLst>
+  </p:cSld>
+  <p:clrMapOvr>
+    <a:masterClrMapping/>
+  </p:clrMapOvr>
+  <p:timing>
+    <p:tnLst>
+      <p:par>
+        <p:cTn id="1" dur="indefinite" restart="never" nodeType="tmRoot"/>
+      </p:par>
+    </p:tnLst>
+  </p:timing>
+</p:sld>
+</file>
+
+<file path=ppt/slides/slide8.xml><?xml version="1.0" encoding="utf-8"?>
+<p:sld xmlns:a="http://schemas.openxmlformats.org/drawingml/2006/main" xmlns:r="http://schemas.openxmlformats.org/officeDocument/2006/relationships" xmlns:p="http://schemas.openxmlformats.org/presentationml/2006/main">
+  <p:cSld>
+    <p:spTree>
+      <p:nvGrpSpPr>
+        <p:cNvPr id="1" name=""/>
+        <p:cNvGrpSpPr/>
+        <p:nvPr/>
+      </p:nvGrpSpPr>
+      <p:grpSpPr>
+        <a:xfrm>
+          <a:off x="0" y="0"/>
+          <a:ext cx="0" cy="0"/>
+          <a:chOff x="0" y="0"/>
+          <a:chExt cx="0" cy="0"/>
+        </a:xfrm>
+      </p:grpSpPr>
+      <p:sp>
+        <p:nvSpPr>
+          <p:cNvPr id="2" name="Title 1"/>
+          <p:cNvSpPr>
+            <a:spLocks noGrp="1"/>
+          </p:cNvSpPr>
+          <p:nvPr>
+            <p:ph type="title"/>
+          </p:nvPr>
+        </p:nvSpPr>
+        <p:spPr/>
+        <p:txBody>
+          <a:bodyPr/>
+          <a:lstStyle/>
+          <a:p>
+            <a:r>
               <a:rPr lang="en-US"/>
               <a:t>List of Deliverables</a:t>
             </a:r>
@@ -13832,7 +14382,7 @@
 </p:sld>
 </file>
 
-<file path=ppt/slides/slide8.xml><?xml version="1.0" encoding="utf-8"?>
+<file path=ppt/slides/slide9.xml><?xml version="1.0" encoding="utf-8"?>
 <p:sld xmlns:a="http://schemas.openxmlformats.org/drawingml/2006/main" xmlns:r="http://schemas.openxmlformats.org/officeDocument/2006/relationships" xmlns:p="http://schemas.openxmlformats.org/presentationml/2006/main">
   <p:cSld>
     <p:spTree>
@@ -14993,136 +15543,6 @@
 </p:sld>
 </file>
 
-<file path=ppt/slides/slide9.xml><?xml version="1.0" encoding="utf-8"?>
-<p:sld xmlns:a="http://schemas.openxmlformats.org/drawingml/2006/main" xmlns:r="http://schemas.openxmlformats.org/officeDocument/2006/relationships" xmlns:p="http://schemas.openxmlformats.org/presentationml/2006/main">
-  <p:cSld>
-    <p:spTree>
-      <p:nvGrpSpPr>
-        <p:cNvPr id="1" name=""/>
-        <p:cNvGrpSpPr/>
-        <p:nvPr/>
-      </p:nvGrpSpPr>
-      <p:grpSpPr>
-        <a:xfrm>
-          <a:off x="0" y="0"/>
-          <a:ext cx="0" cy="0"/>
-          <a:chOff x="0" y="0"/>
-          <a:chExt cx="0" cy="0"/>
-        </a:xfrm>
-      </p:grpSpPr>
-      <p:sp>
-        <p:nvSpPr>
-          <p:cNvPr id="2" name="Title 1"/>
-          <p:cNvSpPr>
-            <a:spLocks noGrp="1"/>
-          </p:cNvSpPr>
-          <p:nvPr>
-            <p:ph type="ctrTitle"/>
-          </p:nvPr>
-        </p:nvSpPr>
-        <p:spPr>
-          <a:xfrm>
-            <a:off x="1298046" y="1911287"/>
-            <a:ext cx="7766936" cy="1646302"/>
-          </a:xfrm>
-        </p:spPr>
-        <p:txBody>
-          <a:bodyPr>
-            <a:normAutofit/>
-          </a:bodyPr>
-          <a:lstStyle/>
-          <a:p>
-            <a:pPr algn="ctr"/>
-            <a:r>
-              <a:rPr lang="en-US" sz="7200" dirty="0" smtClean="0">
-                <a:latin typeface="Big Caslon"/>
-                <a:cs typeface="Big Caslon"/>
-              </a:rPr>
-              <a:t>Plan</a:t>
-            </a:r>
-            <a:r>
-              <a:rPr lang="en-US" sz="7200" i="1" dirty="0" smtClean="0">
-                <a:solidFill>
-                  <a:srgbClr val="7F7F7F"/>
-                </a:solidFill>
-                <a:latin typeface="Big Caslon"/>
-                <a:cs typeface="Big Caslon"/>
-              </a:rPr>
-              <a:t>it</a:t>
-            </a:r>
-            <a:r>
-              <a:rPr lang="en-US" sz="7200" dirty="0" smtClean="0">
-                <a:solidFill>
-                  <a:srgbClr val="7F7F7F"/>
-                </a:solidFill>
-                <a:latin typeface="Big Caslon"/>
-                <a:cs typeface="Big Caslon"/>
-              </a:rPr>
-              <a:t>!</a:t>
-            </a:r>
-            <a:endParaRPr lang="en-US" sz="7200" dirty="0">
-              <a:solidFill>
-                <a:srgbClr val="7F7F7F"/>
-              </a:solidFill>
-              <a:latin typeface="Big Caslon"/>
-              <a:cs typeface="Big Caslon"/>
-            </a:endParaRPr>
-          </a:p>
-        </p:txBody>
-      </p:sp>
-      <p:sp>
-        <p:nvSpPr>
-          <p:cNvPr id="6" name="Rectangle 5"/>
-          <p:cNvSpPr/>
-          <p:nvPr/>
-        </p:nvSpPr>
-        <p:spPr>
-          <a:xfrm>
-            <a:off x="3919267" y="3393071"/>
-            <a:ext cx="2405850" cy="400110"/>
-          </a:xfrm>
-          <a:prstGeom prst="rect">
-            <a:avLst/>
-          </a:prstGeom>
-        </p:spPr>
-        <p:txBody>
-          <a:bodyPr wrap="none">
-            <a:spAutoFit/>
-          </a:bodyPr>
-          <a:lstStyle/>
-          <a:p>
-            <a:pPr algn="ctr"/>
-            <a:r>
-              <a:rPr lang="en-US" sz="2000" dirty="0">
-                <a:solidFill>
-                  <a:srgbClr val="70AD47"/>
-                </a:solidFill>
-              </a:rPr>
-              <a:t>We’re Here to Help</a:t>
-            </a:r>
-          </a:p>
-        </p:txBody>
-      </p:sp>
-    </p:spTree>
-    <p:extLst>
-      <p:ext uri="{BB962C8B-B14F-4D97-AF65-F5344CB8AC3E}">
-        <p14:creationId xmlns:p14="http://schemas.microsoft.com/office/powerpoint/2010/main" val="2624175973"/>
-      </p:ext>
-    </p:extLst>
-  </p:cSld>
-  <p:clrMapOvr>
-    <a:masterClrMapping/>
-  </p:clrMapOvr>
-  <p:timing>
-    <p:tnLst>
-      <p:par>
-        <p:cTn id="1" dur="indefinite" restart="never" nodeType="tmRoot"/>
-      </p:par>
-    </p:tnLst>
-  </p:timing>
-</p:sld>
-</file>
-
 <file path=ppt/theme/theme1.xml><?xml version="1.0" encoding="utf-8"?>
 <a:theme xmlns:a="http://schemas.openxmlformats.org/drawingml/2006/main" name="Facet">
   <a:themeElements>

</xml_diff>

<commit_message>
renamed directory for mockups
</commit_message>
<xml_diff>
--- a/Final Project Documentation/CSC521.pptx
+++ b/Final Project Documentation/CSC521.pptx
@@ -9063,8 +9063,8 @@
         </p:nvSpPr>
         <p:spPr>
           <a:xfrm>
-            <a:off x="3285943" y="3155917"/>
-            <a:ext cx="3297698" cy="1508105"/>
+            <a:off x="3822147" y="3155917"/>
+            <a:ext cx="2225289" cy="1077218"/>
           </a:xfrm>
           <a:prstGeom prst="rect">
             <a:avLst/>
@@ -9078,7 +9078,7 @@
           <a:p>
             <a:pPr algn="ctr"/>
             <a:r>
-              <a:rPr lang="en-US" sz="2000" dirty="0" smtClean="0">
+              <a:rPr lang="en-US" sz="2400" dirty="0" smtClean="0">
                 <a:solidFill>
                   <a:schemeClr val="bg1">
                     <a:lumMod val="50000"/>
@@ -9103,26 +9103,6 @@
             <a:endParaRPr lang="en-US" sz="2000" dirty="0" smtClean="0">
               <a:solidFill>
                 <a:srgbClr val="70AD47"/>
-              </a:solidFill>
-            </a:endParaRPr>
-          </a:p>
-          <a:p>
-            <a:pPr algn="ctr"/>
-            <a:r>
-              <a:rPr lang="en-US" sz="3200" dirty="0" smtClean="0">
-                <a:solidFill>
-                  <a:schemeClr val="bg1">
-                    <a:lumMod val="50000"/>
-                  </a:schemeClr>
-                </a:solidFill>
-              </a:rPr>
-              <a:t>Planit.proj6.com</a:t>
-            </a:r>
-            <a:endParaRPr lang="en-US" sz="3200" dirty="0">
-              <a:solidFill>
-                <a:schemeClr val="bg1">
-                  <a:lumMod val="50000"/>
-                </a:schemeClr>
               </a:solidFill>
             </a:endParaRPr>
           </a:p>
@@ -10864,15 +10844,7 @@
             </a:pPr>
             <a:r>
               <a:rPr lang="en-US" sz="4000" dirty="0"/>
-              <a:t>                    parent: </a:t>
-            </a:r>
-            <a:r>
-              <a:rPr lang="en-US" sz="4000" dirty="0"/>
-              <a:t>null</a:t>
-            </a:r>
-            <a:r>
-              <a:rPr lang="en-US" sz="4000" dirty="0"/>
-              <a:t>,</a:t>
+              <a:t>                    parent: null,</a:t>
             </a:r>
           </a:p>
           <a:p>
@@ -11060,11 +11032,7 @@
             </a:pPr>
             <a:r>
               <a:rPr lang="en-US" sz="4000" dirty="0"/>
-              <a:t> </a:t>
-            </a:r>
-            <a:r>
-              <a:rPr lang="en-US" sz="4000" dirty="0"/>
-              <a:t>@foreach(var item in Model)</a:t>
+              <a:t> @foreach(var item in Model)</a:t>
             </a:r>
           </a:p>
           <a:p>
@@ -11285,11 +11253,7 @@
             </a:pPr>
             <a:r>
               <a:rPr lang="en-US" sz="4000" dirty="0"/>
-              <a:t> </a:t>
-            </a:r>
-            <a:r>
-              <a:rPr lang="en-US" sz="4000" dirty="0"/>
-              <a:t>@:items.push(newItem);</a:t>
+              <a:t> @:items.push(newItem);</a:t>
             </a:r>
           </a:p>
           <a:p>
@@ -11359,7 +11323,7 @@
         </p:nvSpPr>
         <p:spPr>
           <a:xfrm>
-            <a:off x="2206498" y="612845"/>
+            <a:off x="2159363" y="1121892"/>
             <a:ext cx="6033454" cy="5599674"/>
           </a:xfrm>
           <a:prstGeom prst="rect">
@@ -11454,6 +11418,106 @@
             <a:endParaRPr lang="en-US" sz="3600" dirty="0">
               <a:cs typeface="Calibri"/>
             </a:endParaRPr>
+          </a:p>
+        </p:txBody>
+      </p:sp>
+      <p:sp>
+        <p:nvSpPr>
+          <p:cNvPr id="4" name="Title 1"/>
+          <p:cNvSpPr txBox="1">
+            <a:spLocks/>
+          </p:cNvSpPr>
+          <p:nvPr/>
+        </p:nvSpPr>
+        <p:spPr>
+          <a:xfrm>
+            <a:off x="617009" y="677290"/>
+            <a:ext cx="8596668" cy="1320800"/>
+          </a:xfrm>
+          <a:prstGeom prst="rect">
+            <a:avLst/>
+          </a:prstGeom>
+        </p:spPr>
+        <p:txBody>
+          <a:bodyPr/>
+          <a:lstStyle>
+            <a:lvl1pPr algn="l" defTabSz="457200" rtl="0" eaLnBrk="1" latinLnBrk="0" hangingPunct="1">
+              <a:spcBef>
+                <a:spcPct val="0"/>
+              </a:spcBef>
+              <a:buNone/>
+              <a:defRPr sz="3600" kern="1200">
+                <a:solidFill>
+                  <a:schemeClr val="accent1"/>
+                </a:solidFill>
+                <a:latin typeface="+mj-lt"/>
+                <a:ea typeface="+mj-ea"/>
+                <a:cs typeface="+mj-cs"/>
+              </a:defRPr>
+            </a:lvl1pPr>
+            <a:lvl2pPr eaLnBrk="1" hangingPunct="1">
+              <a:defRPr>
+                <a:solidFill>
+                  <a:schemeClr val="tx2"/>
+                </a:solidFill>
+              </a:defRPr>
+            </a:lvl2pPr>
+            <a:lvl3pPr eaLnBrk="1" hangingPunct="1">
+              <a:defRPr>
+                <a:solidFill>
+                  <a:schemeClr val="tx2"/>
+                </a:solidFill>
+              </a:defRPr>
+            </a:lvl3pPr>
+            <a:lvl4pPr eaLnBrk="1" hangingPunct="1">
+              <a:defRPr>
+                <a:solidFill>
+                  <a:schemeClr val="tx2"/>
+                </a:solidFill>
+              </a:defRPr>
+            </a:lvl4pPr>
+            <a:lvl5pPr eaLnBrk="1" hangingPunct="1">
+              <a:defRPr>
+                <a:solidFill>
+                  <a:schemeClr val="tx2"/>
+                </a:solidFill>
+              </a:defRPr>
+            </a:lvl5pPr>
+            <a:lvl6pPr eaLnBrk="1" hangingPunct="1">
+              <a:defRPr>
+                <a:solidFill>
+                  <a:schemeClr val="tx2"/>
+                </a:solidFill>
+              </a:defRPr>
+            </a:lvl6pPr>
+            <a:lvl7pPr eaLnBrk="1" hangingPunct="1">
+              <a:defRPr>
+                <a:solidFill>
+                  <a:schemeClr val="tx2"/>
+                </a:solidFill>
+              </a:defRPr>
+            </a:lvl7pPr>
+            <a:lvl8pPr eaLnBrk="1" hangingPunct="1">
+              <a:defRPr>
+                <a:solidFill>
+                  <a:schemeClr val="tx2"/>
+                </a:solidFill>
+              </a:defRPr>
+            </a:lvl8pPr>
+            <a:lvl9pPr eaLnBrk="1" hangingPunct="1">
+              <a:defRPr>
+                <a:solidFill>
+                  <a:schemeClr val="tx2"/>
+                </a:solidFill>
+              </a:defRPr>
+            </a:lvl9pPr>
+          </a:lstStyle>
+          <a:p>
+            <a:r>
+              <a:rPr lang="en-US" dirty="0" smtClean="0"/>
+              <a:t>Quick Recap of the Proposal</a:t>
+            </a:r>
+            <a:endParaRPr lang="en-US" dirty="0"/>
           </a:p>
         </p:txBody>
       </p:sp>
@@ -13993,7 +14057,7 @@
         </p:blipFill>
         <p:spPr>
           <a:xfrm>
-            <a:off x="9629217" y="3121623"/>
+            <a:off x="9629217" y="3187612"/>
             <a:ext cx="2123153" cy="522134"/>
           </a:xfrm>
           <a:prstGeom prst="rect">
@@ -14173,7 +14237,7 @@
         </p:blipFill>
         <p:spPr>
           <a:xfrm>
-            <a:off x="8922453" y="4400701"/>
+            <a:off x="8922453" y="4334712"/>
             <a:ext cx="2556616" cy="971514"/>
           </a:xfrm>
           <a:prstGeom prst="rect">

</xml_diff>

<commit_message>
made changes to architecture diagram in ppt
</commit_message>
<xml_diff>
--- a/Final Project Documentation/CSC521.pptx
+++ b/Final Project Documentation/CSC521.pptx
@@ -11,16 +11,16 @@
     <p:sldId id="276" r:id="rId2"/>
     <p:sldId id="268" r:id="rId3"/>
     <p:sldId id="259" r:id="rId4"/>
-    <p:sldId id="299" r:id="rId5"/>
-    <p:sldId id="260" r:id="rId6"/>
-    <p:sldId id="291" r:id="rId7"/>
-    <p:sldId id="261" r:id="rId8"/>
-    <p:sldId id="297" r:id="rId9"/>
-    <p:sldId id="265" r:id="rId10"/>
-    <p:sldId id="264" r:id="rId11"/>
-    <p:sldId id="290" r:id="rId12"/>
-    <p:sldId id="296" r:id="rId13"/>
-    <p:sldId id="295" r:id="rId14"/>
+    <p:sldId id="260" r:id="rId5"/>
+    <p:sldId id="291" r:id="rId6"/>
+    <p:sldId id="261" r:id="rId7"/>
+    <p:sldId id="297" r:id="rId8"/>
+    <p:sldId id="265" r:id="rId9"/>
+    <p:sldId id="264" r:id="rId10"/>
+    <p:sldId id="290" r:id="rId11"/>
+    <p:sldId id="296" r:id="rId12"/>
+    <p:sldId id="295" r:id="rId13"/>
+    <p:sldId id="299" r:id="rId14"/>
     <p:sldId id="298" r:id="rId15"/>
     <p:sldId id="300" r:id="rId16"/>
   </p:sldIdLst>
@@ -9172,273 +9172,55 @@
             <a:spLocks noGrp="1"/>
           </p:cNvSpPr>
           <p:nvPr>
-            <p:ph type="title"/>
-          </p:nvPr>
-        </p:nvSpPr>
-        <p:spPr/>
-        <p:txBody>
-          <a:bodyPr/>
-          <a:lstStyle/>
-          <a:p>
-            <a:r>
-              <a:rPr lang="en-US" dirty="0"/>
-              <a:t>Grading Scheme</a:t>
-            </a:r>
-          </a:p>
-        </p:txBody>
-      </p:sp>
-      <p:sp>
-        <p:nvSpPr>
-          <p:cNvPr id="3" name="Content Placeholder 2"/>
-          <p:cNvSpPr>
-            <a:spLocks noGrp="1"/>
-          </p:cNvSpPr>
-          <p:nvPr>
-            <p:ph idx="1"/>
+            <p:ph type="ctrTitle"/>
           </p:nvPr>
         </p:nvSpPr>
         <p:spPr>
           <a:xfrm>
-            <a:off x="790769" y="1509637"/>
-            <a:ext cx="10515600" cy="4351338"/>
+            <a:off x="1298046" y="1911287"/>
+            <a:ext cx="7766936" cy="1646302"/>
           </a:xfrm>
         </p:spPr>
         <p:txBody>
-          <a:bodyPr/>
-          <a:lstStyle/>
-          <a:p>
-            <a:pPr marL="0" indent="0">
-              <a:buNone/>
-            </a:pPr>
-            <a:endParaRPr lang="en-US" dirty="0">
-              <a:solidFill>
-                <a:srgbClr val="000000"/>
-              </a:solidFill>
-              <a:latin typeface="Calibri"/>
-              <a:cs typeface="Calibri"/>
-            </a:endParaRPr>
-          </a:p>
-        </p:txBody>
-      </p:sp>
-      <p:pic>
-        <p:nvPicPr>
-          <p:cNvPr id="4" name="Picture 3"/>
-          <p:cNvPicPr>
-            <a:picLocks noChangeAspect="1"/>
-          </p:cNvPicPr>
-          <p:nvPr/>
-        </p:nvPicPr>
-        <p:blipFill>
-          <a:blip r:embed="rId3"/>
-          <a:stretch>
-            <a:fillRect/>
-          </a:stretch>
-        </p:blipFill>
-        <p:spPr>
-          <a:xfrm>
-            <a:off x="7089852" y="2285120"/>
-            <a:ext cx="1749312" cy="316989"/>
-          </a:xfrm>
-          <a:prstGeom prst="rect">
-            <a:avLst/>
-          </a:prstGeom>
-        </p:spPr>
-      </p:pic>
-      <p:pic>
-        <p:nvPicPr>
-          <p:cNvPr id="7" name="Picture 6"/>
-          <p:cNvPicPr>
-            <a:picLocks noChangeAspect="1"/>
-          </p:cNvPicPr>
-          <p:nvPr/>
-        </p:nvPicPr>
-        <p:blipFill>
-          <a:blip r:embed="rId4"/>
-          <a:stretch>
-            <a:fillRect/>
-          </a:stretch>
-        </p:blipFill>
-        <p:spPr>
-          <a:xfrm>
-            <a:off x="7081062" y="2547745"/>
-            <a:ext cx="1498187" cy="357974"/>
-          </a:xfrm>
-          <a:prstGeom prst="rect">
-            <a:avLst/>
-          </a:prstGeom>
-        </p:spPr>
-      </p:pic>
-      <p:pic>
-        <p:nvPicPr>
-          <p:cNvPr id="9" name="Picture 8"/>
-          <p:cNvPicPr>
-            <a:picLocks noChangeAspect="1"/>
-          </p:cNvPicPr>
-          <p:nvPr/>
-        </p:nvPicPr>
-        <p:blipFill>
-          <a:blip r:embed="rId5"/>
-          <a:stretch>
-            <a:fillRect/>
-          </a:stretch>
-        </p:blipFill>
-        <p:spPr>
-          <a:xfrm>
-            <a:off x="7098107" y="2832073"/>
-            <a:ext cx="1410168" cy="424420"/>
-          </a:xfrm>
-          <a:prstGeom prst="rect">
-            <a:avLst/>
-          </a:prstGeom>
-        </p:spPr>
-      </p:pic>
-      <p:pic>
-        <p:nvPicPr>
-          <p:cNvPr id="10" name="Picture 9"/>
-          <p:cNvPicPr>
-            <a:picLocks noChangeAspect="1"/>
-          </p:cNvPicPr>
-          <p:nvPr/>
-        </p:nvPicPr>
-        <p:blipFill>
-          <a:blip r:embed="rId6"/>
-          <a:stretch>
-            <a:fillRect/>
-          </a:stretch>
-        </p:blipFill>
-        <p:spPr>
-          <a:xfrm>
-            <a:off x="7120171" y="3164788"/>
-            <a:ext cx="2066847" cy="397964"/>
-          </a:xfrm>
-          <a:prstGeom prst="rect">
-            <a:avLst/>
-          </a:prstGeom>
-        </p:spPr>
-      </p:pic>
-      <p:pic>
-        <p:nvPicPr>
-          <p:cNvPr id="11" name="Picture 10"/>
-          <p:cNvPicPr>
-            <a:picLocks noChangeAspect="1"/>
-          </p:cNvPicPr>
-          <p:nvPr/>
-        </p:nvPicPr>
-        <p:blipFill>
-          <a:blip r:embed="rId7"/>
-          <a:stretch>
-            <a:fillRect/>
-          </a:stretch>
-        </p:blipFill>
-        <p:spPr>
-          <a:xfrm>
-            <a:off x="7098106" y="3468399"/>
-            <a:ext cx="1932683" cy="372132"/>
-          </a:xfrm>
-          <a:prstGeom prst="rect">
-            <a:avLst/>
-          </a:prstGeom>
-        </p:spPr>
-      </p:pic>
-      <p:pic>
-        <p:nvPicPr>
-          <p:cNvPr id="12" name="Picture 11"/>
-          <p:cNvPicPr>
-            <a:picLocks noChangeAspect="1"/>
-          </p:cNvPicPr>
-          <p:nvPr/>
-        </p:nvPicPr>
-        <p:blipFill>
-          <a:blip r:embed="rId8"/>
-          <a:stretch>
-            <a:fillRect/>
-          </a:stretch>
-        </p:blipFill>
-        <p:spPr>
-          <a:xfrm>
-            <a:off x="7089852" y="3785872"/>
-            <a:ext cx="1866603" cy="370673"/>
-          </a:xfrm>
-          <a:prstGeom prst="rect">
-            <a:avLst/>
-          </a:prstGeom>
-        </p:spPr>
-      </p:pic>
-      <p:pic>
-        <p:nvPicPr>
-          <p:cNvPr id="13" name="Picture 12"/>
-          <p:cNvPicPr>
-            <a:picLocks noChangeAspect="1"/>
-          </p:cNvPicPr>
-          <p:nvPr/>
-        </p:nvPicPr>
-        <p:blipFill>
-          <a:blip r:embed="rId9"/>
-          <a:stretch>
-            <a:fillRect/>
-          </a:stretch>
-        </p:blipFill>
-        <p:spPr>
-          <a:xfrm>
-            <a:off x="1229545" y="1908868"/>
-            <a:ext cx="5442404" cy="3219450"/>
-          </a:xfrm>
-          <a:prstGeom prst="rect">
-            <a:avLst/>
-          </a:prstGeom>
-        </p:spPr>
-      </p:pic>
-      <p:sp>
-        <p:nvSpPr>
-          <p:cNvPr id="5" name="Rectangle 4"/>
-          <p:cNvSpPr/>
-          <p:nvPr/>
-        </p:nvSpPr>
-        <p:spPr>
-          <a:xfrm>
-            <a:off x="4138889" y="2138748"/>
-            <a:ext cx="1509681" cy="461665"/>
-          </a:xfrm>
-          <a:prstGeom prst="rect">
-            <a:avLst/>
-          </a:prstGeom>
-          <a:noFill/>
-        </p:spPr>
-        <p:txBody>
-          <a:bodyPr wrap="square" lIns="91440" tIns="45720" rIns="91440" bIns="45720">
-            <a:spAutoFit/>
+          <a:bodyPr>
+            <a:normAutofit/>
           </a:bodyPr>
           <a:lstStyle/>
           <a:p>
             <a:pPr algn="ctr"/>
             <a:r>
-              <a:rPr lang="en-US" sz="2400" b="0" cap="none" spc="0" dirty="0" smtClean="0">
-                <a:ln w="0"/>
+              <a:rPr lang="en-US" sz="7200" dirty="0" smtClean="0">
+                <a:latin typeface="Big Caslon"/>
+                <a:cs typeface="Big Caslon"/>
+              </a:rPr>
+              <a:t>Plan</a:t>
+            </a:r>
+            <a:r>
+              <a:rPr lang="en-US" sz="7200" i="1" dirty="0" smtClean="0">
                 <a:solidFill>
-                  <a:schemeClr val="tx1"/>
+                  <a:srgbClr val="7F7F7F"/>
                 </a:solidFill>
-                <a:effectLst>
-                  <a:outerShdw blurRad="38100" dist="19050" dir="2700000" algn="tl" rotWithShape="0">
-                    <a:schemeClr val="dk1">
-                      <a:alpha val="40000"/>
-                    </a:schemeClr>
-                  </a:outerShdw>
-                </a:effectLst>
+                <a:latin typeface="Big Caslon"/>
+                <a:cs typeface="Big Caslon"/>
               </a:rPr>
-              <a:t>20%</a:t>
-            </a:r>
-            <a:endParaRPr lang="en-US" sz="2400" b="0" cap="none" spc="0" dirty="0">
-              <a:ln w="0"/>
+              <a:t>it</a:t>
+            </a:r>
+            <a:r>
+              <a:rPr lang="en-US" sz="7200" dirty="0" smtClean="0">
+                <a:solidFill>
+                  <a:srgbClr val="7F7F7F"/>
+                </a:solidFill>
+                <a:latin typeface="Big Caslon"/>
+                <a:cs typeface="Big Caslon"/>
+              </a:rPr>
+              <a:t>!</a:t>
+            </a:r>
+            <a:endParaRPr lang="en-US" sz="7200" dirty="0">
               <a:solidFill>
-                <a:schemeClr val="tx1"/>
+                <a:srgbClr val="7F7F7F"/>
               </a:solidFill>
-              <a:effectLst>
-                <a:outerShdw blurRad="38100" dist="19050" dir="2700000" algn="tl" rotWithShape="0">
-                  <a:schemeClr val="dk1">
-                    <a:alpha val="40000"/>
-                  </a:schemeClr>
-                </a:outerShdw>
-              </a:effectLst>
+              <a:latin typeface="Big Caslon"/>
+              <a:cs typeface="Big Caslon"/>
             </a:endParaRPr>
           </a:p>
         </p:txBody>
@@ -9451,277 +9233,35 @@
         </p:nvSpPr>
         <p:spPr>
           <a:xfrm>
-            <a:off x="5426645" y="2912698"/>
-            <a:ext cx="692167" cy="461665"/>
+            <a:off x="3919267" y="3393071"/>
+            <a:ext cx="2405850" cy="400110"/>
           </a:xfrm>
           <a:prstGeom prst="rect">
             <a:avLst/>
           </a:prstGeom>
-          <a:noFill/>
         </p:spPr>
         <p:txBody>
-          <a:bodyPr wrap="none" lIns="91440" tIns="45720" rIns="91440" bIns="45720">
+          <a:bodyPr wrap="none">
             <a:spAutoFit/>
           </a:bodyPr>
           <a:lstStyle/>
           <a:p>
             <a:pPr algn="ctr"/>
             <a:r>
-              <a:rPr lang="en-US" sz="2400" b="0" cap="none" spc="0" dirty="0" smtClean="0">
-                <a:ln w="0"/>
+              <a:rPr lang="en-US" sz="2000" dirty="0">
                 <a:solidFill>
-                  <a:schemeClr val="tx1"/>
+                  <a:srgbClr val="70AD47"/>
                 </a:solidFill>
-                <a:effectLst>
-                  <a:outerShdw blurRad="38100" dist="19050" dir="2700000" algn="tl" rotWithShape="0">
-                    <a:schemeClr val="dk1">
-                      <a:alpha val="40000"/>
-                    </a:schemeClr>
-                  </a:outerShdw>
-                </a:effectLst>
               </a:rPr>
-              <a:t>15%</a:t>
-            </a:r>
-            <a:endParaRPr lang="en-US" sz="2400" b="0" cap="none" spc="0" dirty="0">
-              <a:ln w="0"/>
-              <a:solidFill>
-                <a:schemeClr val="tx1"/>
-              </a:solidFill>
-              <a:effectLst>
-                <a:outerShdw blurRad="38100" dist="19050" dir="2700000" algn="tl" rotWithShape="0">
-                  <a:schemeClr val="dk1">
-                    <a:alpha val="40000"/>
-                  </a:schemeClr>
-                </a:outerShdw>
-              </a:effectLst>
-            </a:endParaRPr>
-          </a:p>
-        </p:txBody>
-      </p:sp>
-      <p:sp>
-        <p:nvSpPr>
-          <p:cNvPr id="8" name="Rectangle 7"/>
-          <p:cNvSpPr/>
-          <p:nvPr/>
-        </p:nvSpPr>
-        <p:spPr>
-          <a:xfrm>
-            <a:off x="4418531" y="3518593"/>
-            <a:ext cx="692167" cy="461665"/>
-          </a:xfrm>
-          <a:prstGeom prst="rect">
-            <a:avLst/>
-          </a:prstGeom>
-          <a:noFill/>
-        </p:spPr>
-        <p:txBody>
-          <a:bodyPr wrap="none" lIns="91440" tIns="45720" rIns="91440" bIns="45720">
-            <a:spAutoFit/>
-          </a:bodyPr>
-          <a:lstStyle/>
-          <a:p>
-            <a:pPr algn="ctr"/>
-            <a:r>
-              <a:rPr lang="en-US" sz="2400" b="0" cap="none" spc="0" dirty="0" smtClean="0">
-                <a:ln w="0"/>
-                <a:solidFill>
-                  <a:schemeClr val="tx1"/>
-                </a:solidFill>
-                <a:effectLst>
-                  <a:outerShdw blurRad="38100" dist="19050" dir="2700000" algn="tl" rotWithShape="0">
-                    <a:schemeClr val="dk1">
-                      <a:alpha val="40000"/>
-                    </a:schemeClr>
-                  </a:outerShdw>
-                </a:effectLst>
-              </a:rPr>
-              <a:t>15%</a:t>
-            </a:r>
-            <a:endParaRPr lang="en-US" sz="2400" b="0" cap="none" spc="0" dirty="0">
-              <a:ln w="0"/>
-              <a:solidFill>
-                <a:schemeClr val="tx1"/>
-              </a:solidFill>
-              <a:effectLst>
-                <a:outerShdw blurRad="38100" dist="19050" dir="2700000" algn="tl" rotWithShape="0">
-                  <a:schemeClr val="dk1">
-                    <a:alpha val="40000"/>
-                  </a:schemeClr>
-                </a:outerShdw>
-              </a:effectLst>
-            </a:endParaRPr>
-          </a:p>
-        </p:txBody>
-      </p:sp>
-      <p:sp>
-        <p:nvSpPr>
-          <p:cNvPr id="14" name="Rectangle 13"/>
-          <p:cNvSpPr/>
-          <p:nvPr/>
-        </p:nvSpPr>
-        <p:spPr>
-          <a:xfrm>
-            <a:off x="2414738" y="3167134"/>
-            <a:ext cx="692167" cy="461665"/>
-          </a:xfrm>
-          <a:prstGeom prst="rect">
-            <a:avLst/>
-          </a:prstGeom>
-          <a:noFill/>
-        </p:spPr>
-        <p:txBody>
-          <a:bodyPr wrap="none" lIns="91440" tIns="45720" rIns="91440" bIns="45720">
-            <a:spAutoFit/>
-          </a:bodyPr>
-          <a:lstStyle/>
-          <a:p>
-            <a:pPr algn="ctr"/>
-            <a:r>
-              <a:rPr lang="en-US" sz="2400" b="0" cap="none" spc="0" dirty="0" smtClean="0">
-                <a:ln w="0"/>
-                <a:solidFill>
-                  <a:schemeClr val="tx1"/>
-                </a:solidFill>
-                <a:effectLst>
-                  <a:outerShdw blurRad="38100" dist="19050" dir="2700000" algn="tl" rotWithShape="0">
-                    <a:schemeClr val="dk1">
-                      <a:alpha val="40000"/>
-                    </a:schemeClr>
-                  </a:outerShdw>
-                </a:effectLst>
-              </a:rPr>
-              <a:t>30%</a:t>
-            </a:r>
-            <a:endParaRPr lang="en-US" sz="2400" b="0" cap="none" spc="0" dirty="0">
-              <a:ln w="0"/>
-              <a:solidFill>
-                <a:schemeClr val="tx1"/>
-              </a:solidFill>
-              <a:effectLst>
-                <a:outerShdw blurRad="38100" dist="19050" dir="2700000" algn="tl" rotWithShape="0">
-                  <a:schemeClr val="dk1">
-                    <a:alpha val="40000"/>
-                  </a:schemeClr>
-                </a:outerShdw>
-              </a:effectLst>
-            </a:endParaRPr>
-          </a:p>
-        </p:txBody>
-      </p:sp>
-      <p:sp>
-        <p:nvSpPr>
-          <p:cNvPr id="15" name="Rectangle 14"/>
-          <p:cNvSpPr/>
-          <p:nvPr/>
-        </p:nvSpPr>
-        <p:spPr>
-          <a:xfrm>
-            <a:off x="2254173" y="2275169"/>
-            <a:ext cx="692167" cy="461665"/>
-          </a:xfrm>
-          <a:prstGeom prst="rect">
-            <a:avLst/>
-          </a:prstGeom>
-          <a:noFill/>
-        </p:spPr>
-        <p:txBody>
-          <a:bodyPr wrap="none" lIns="91440" tIns="45720" rIns="91440" bIns="45720">
-            <a:spAutoFit/>
-          </a:bodyPr>
-          <a:lstStyle/>
-          <a:p>
-            <a:pPr algn="ctr"/>
-            <a:r>
-              <a:rPr lang="en-US" sz="2400" b="0" cap="none" spc="0" dirty="0" smtClean="0">
-                <a:ln w="0"/>
-                <a:solidFill>
-                  <a:schemeClr val="tx1"/>
-                </a:solidFill>
-                <a:effectLst>
-                  <a:outerShdw blurRad="38100" dist="19050" dir="2700000" algn="tl" rotWithShape="0">
-                    <a:schemeClr val="dk1">
-                      <a:alpha val="40000"/>
-                    </a:schemeClr>
-                  </a:outerShdw>
-                </a:effectLst>
-              </a:rPr>
-              <a:t>10%</a:t>
-            </a:r>
-            <a:endParaRPr lang="en-US" sz="2400" b="0" cap="none" spc="0" dirty="0">
-              <a:ln w="0"/>
-              <a:solidFill>
-                <a:schemeClr val="tx1"/>
-              </a:solidFill>
-              <a:effectLst>
-                <a:outerShdw blurRad="38100" dist="19050" dir="2700000" algn="tl" rotWithShape="0">
-                  <a:schemeClr val="dk1">
-                    <a:alpha val="40000"/>
-                  </a:schemeClr>
-                </a:outerShdw>
-              </a:effectLst>
-            </a:endParaRPr>
-          </a:p>
-        </p:txBody>
-      </p:sp>
-      <p:sp>
-        <p:nvSpPr>
-          <p:cNvPr id="16" name="Rectangle 15"/>
-          <p:cNvSpPr/>
-          <p:nvPr/>
-        </p:nvSpPr>
-        <p:spPr>
-          <a:xfrm>
-            <a:off x="3166330" y="2017900"/>
-            <a:ext cx="692167" cy="461665"/>
-          </a:xfrm>
-          <a:prstGeom prst="rect">
-            <a:avLst/>
-          </a:prstGeom>
-          <a:noFill/>
-        </p:spPr>
-        <p:txBody>
-          <a:bodyPr wrap="none" lIns="91440" tIns="45720" rIns="91440" bIns="45720">
-            <a:spAutoFit/>
-          </a:bodyPr>
-          <a:lstStyle/>
-          <a:p>
-            <a:pPr algn="ctr"/>
-            <a:r>
-              <a:rPr lang="en-US" sz="2400" b="0" cap="none" spc="0" dirty="0" smtClean="0">
-                <a:ln w="0"/>
-                <a:solidFill>
-                  <a:schemeClr val="tx1"/>
-                </a:solidFill>
-                <a:effectLst>
-                  <a:outerShdw blurRad="38100" dist="19050" dir="2700000" algn="tl" rotWithShape="0">
-                    <a:schemeClr val="dk1">
-                      <a:alpha val="40000"/>
-                    </a:schemeClr>
-                  </a:outerShdw>
-                </a:effectLst>
-              </a:rPr>
-              <a:t>10%</a:t>
-            </a:r>
-            <a:endParaRPr lang="en-US" sz="2400" b="0" cap="none" spc="0" dirty="0">
-              <a:ln w="0"/>
-              <a:solidFill>
-                <a:schemeClr val="tx1"/>
-              </a:solidFill>
-              <a:effectLst>
-                <a:outerShdw blurRad="38100" dist="19050" dir="2700000" algn="tl" rotWithShape="0">
-                  <a:schemeClr val="dk1">
-                    <a:alpha val="40000"/>
-                  </a:schemeClr>
-                </a:outerShdw>
-              </a:effectLst>
-            </a:endParaRPr>
+              <a:t>We’re Here to Help</a:t>
+            </a:r>
           </a:p>
         </p:txBody>
       </p:sp>
     </p:spTree>
     <p:extLst>
       <p:ext uri="{BB962C8B-B14F-4D97-AF65-F5344CB8AC3E}">
-        <p14:creationId xmlns:p14="http://schemas.microsoft.com/office/powerpoint/2010/main" val="1315062242"/>
+        <p14:creationId xmlns:p14="http://schemas.microsoft.com/office/powerpoint/2010/main" val="2624175973"/>
       </p:ext>
     </p:extLst>
   </p:cSld>
@@ -9731,580 +9271,9 @@
   <p:timing>
     <p:tnLst>
       <p:par>
-        <p:cTn id="1" dur="indefinite" restart="never" nodeType="tmRoot">
-          <p:childTnLst>
-            <p:seq concurrent="1" nextAc="seek">
-              <p:cTn id="2" dur="indefinite" nodeType="mainSeq">
-                <p:childTnLst>
-                  <p:par>
-                    <p:cTn id="3" fill="hold">
-                      <p:stCondLst>
-                        <p:cond delay="indefinite"/>
-                        <p:cond evt="onBegin" delay="0">
-                          <p:tn val="2"/>
-                        </p:cond>
-                      </p:stCondLst>
-                      <p:childTnLst>
-                        <p:par>
-                          <p:cTn id="4" fill="hold">
-                            <p:stCondLst>
-                              <p:cond delay="0"/>
-                            </p:stCondLst>
-                            <p:childTnLst>
-                              <p:par>
-                                <p:cTn id="5" presetID="10" presetClass="entr" presetSubtype="0" fill="hold" grpId="0" nodeType="afterEffect">
-                                  <p:stCondLst>
-                                    <p:cond delay="500"/>
-                                  </p:stCondLst>
-                                  <p:childTnLst>
-                                    <p:set>
-                                      <p:cBhvr>
-                                        <p:cTn id="6" dur="1" fill="hold">
-                                          <p:stCondLst>
-                                            <p:cond delay="0"/>
-                                          </p:stCondLst>
-                                        </p:cTn>
-                                        <p:tgtEl>
-                                          <p:spTgt spid="5"/>
-                                        </p:tgtEl>
-                                        <p:attrNameLst>
-                                          <p:attrName>style.visibility</p:attrName>
-                                        </p:attrNameLst>
-                                      </p:cBhvr>
-                                      <p:to>
-                                        <p:strVal val="visible"/>
-                                      </p:to>
-                                    </p:set>
-                                    <p:animEffect transition="in" filter="fade">
-                                      <p:cBhvr>
-                                        <p:cTn id="7" dur="500"/>
-                                        <p:tgtEl>
-                                          <p:spTgt spid="5"/>
-                                        </p:tgtEl>
-                                      </p:cBhvr>
-                                    </p:animEffect>
-                                  </p:childTnLst>
-                                </p:cTn>
-                              </p:par>
-                            </p:childTnLst>
-                          </p:cTn>
-                        </p:par>
-                        <p:par>
-                          <p:cTn id="8" fill="hold">
-                            <p:stCondLst>
-                              <p:cond delay="1000"/>
-                            </p:stCondLst>
-                            <p:childTnLst>
-                              <p:par>
-                                <p:cTn id="9" presetID="10" presetClass="entr" presetSubtype="0" fill="hold" nodeType="afterEffect">
-                                  <p:stCondLst>
-                                    <p:cond delay="0"/>
-                                  </p:stCondLst>
-                                  <p:childTnLst>
-                                    <p:set>
-                                      <p:cBhvr>
-                                        <p:cTn id="10" dur="1" fill="hold">
-                                          <p:stCondLst>
-                                            <p:cond delay="0"/>
-                                          </p:stCondLst>
-                                        </p:cTn>
-                                        <p:tgtEl>
-                                          <p:spTgt spid="4"/>
-                                        </p:tgtEl>
-                                        <p:attrNameLst>
-                                          <p:attrName>style.visibility</p:attrName>
-                                        </p:attrNameLst>
-                                      </p:cBhvr>
-                                      <p:to>
-                                        <p:strVal val="visible"/>
-                                      </p:to>
-                                    </p:set>
-                                    <p:animEffect transition="in" filter="fade">
-                                      <p:cBhvr>
-                                        <p:cTn id="11" dur="250"/>
-                                        <p:tgtEl>
-                                          <p:spTgt spid="4"/>
-                                        </p:tgtEl>
-                                      </p:cBhvr>
-                                    </p:animEffect>
-                                  </p:childTnLst>
-                                </p:cTn>
-                              </p:par>
-                            </p:childTnLst>
-                          </p:cTn>
-                        </p:par>
-                      </p:childTnLst>
-                    </p:cTn>
-                  </p:par>
-                  <p:par>
-                    <p:cTn id="12" fill="hold">
-                      <p:stCondLst>
-                        <p:cond delay="indefinite"/>
-                      </p:stCondLst>
-                      <p:childTnLst>
-                        <p:par>
-                          <p:cTn id="13" fill="hold">
-                            <p:stCondLst>
-                              <p:cond delay="0"/>
-                            </p:stCondLst>
-                            <p:childTnLst>
-                              <p:par>
-                                <p:cTn id="14" presetID="10" presetClass="entr" presetSubtype="0" fill="hold" nodeType="clickEffect">
-                                  <p:stCondLst>
-                                    <p:cond delay="0"/>
-                                  </p:stCondLst>
-                                  <p:childTnLst>
-                                    <p:set>
-                                      <p:cBhvr>
-                                        <p:cTn id="15" dur="1" fill="hold">
-                                          <p:stCondLst>
-                                            <p:cond delay="0"/>
-                                          </p:stCondLst>
-                                        </p:cTn>
-                                        <p:tgtEl>
-                                          <p:spTgt spid="7"/>
-                                        </p:tgtEl>
-                                        <p:attrNameLst>
-                                          <p:attrName>style.visibility</p:attrName>
-                                        </p:attrNameLst>
-                                      </p:cBhvr>
-                                      <p:to>
-                                        <p:strVal val="visible"/>
-                                      </p:to>
-                                    </p:set>
-                                    <p:animEffect transition="in" filter="fade">
-                                      <p:cBhvr>
-                                        <p:cTn id="16" dur="500"/>
-                                        <p:tgtEl>
-                                          <p:spTgt spid="7"/>
-                                        </p:tgtEl>
-                                      </p:cBhvr>
-                                    </p:animEffect>
-                                  </p:childTnLst>
-                                </p:cTn>
-                              </p:par>
-                              <p:par>
-                                <p:cTn id="17" presetID="10" presetClass="entr" presetSubtype="0" fill="hold" grpId="0" nodeType="withEffect">
-                                  <p:stCondLst>
-                                    <p:cond delay="0"/>
-                                  </p:stCondLst>
-                                  <p:childTnLst>
-                                    <p:set>
-                                      <p:cBhvr>
-                                        <p:cTn id="18" dur="1" fill="hold">
-                                          <p:stCondLst>
-                                            <p:cond delay="0"/>
-                                          </p:stCondLst>
-                                        </p:cTn>
-                                        <p:tgtEl>
-                                          <p:spTgt spid="6"/>
-                                        </p:tgtEl>
-                                        <p:attrNameLst>
-                                          <p:attrName>style.visibility</p:attrName>
-                                        </p:attrNameLst>
-                                      </p:cBhvr>
-                                      <p:to>
-                                        <p:strVal val="visible"/>
-                                      </p:to>
-                                    </p:set>
-                                    <p:animEffect transition="in" filter="fade">
-                                      <p:cBhvr>
-                                        <p:cTn id="19" dur="500"/>
-                                        <p:tgtEl>
-                                          <p:spTgt spid="6"/>
-                                        </p:tgtEl>
-                                      </p:cBhvr>
-                                    </p:animEffect>
-                                  </p:childTnLst>
-                                </p:cTn>
-                              </p:par>
-                            </p:childTnLst>
-                          </p:cTn>
-                        </p:par>
-                      </p:childTnLst>
-                    </p:cTn>
-                  </p:par>
-                  <p:par>
-                    <p:cTn id="20" fill="hold">
-                      <p:stCondLst>
-                        <p:cond delay="indefinite"/>
-                      </p:stCondLst>
-                      <p:childTnLst>
-                        <p:par>
-                          <p:cTn id="21" fill="hold">
-                            <p:stCondLst>
-                              <p:cond delay="0"/>
-                            </p:stCondLst>
-                            <p:childTnLst>
-                              <p:par>
-                                <p:cTn id="22" presetID="10" presetClass="entr" presetSubtype="0" fill="hold" nodeType="clickEffect">
-                                  <p:stCondLst>
-                                    <p:cond delay="0"/>
-                                  </p:stCondLst>
-                                  <p:childTnLst>
-                                    <p:set>
-                                      <p:cBhvr>
-                                        <p:cTn id="23" dur="1" fill="hold">
-                                          <p:stCondLst>
-                                            <p:cond delay="0"/>
-                                          </p:stCondLst>
-                                        </p:cTn>
-                                        <p:tgtEl>
-                                          <p:spTgt spid="9"/>
-                                        </p:tgtEl>
-                                        <p:attrNameLst>
-                                          <p:attrName>style.visibility</p:attrName>
-                                        </p:attrNameLst>
-                                      </p:cBhvr>
-                                      <p:to>
-                                        <p:strVal val="visible"/>
-                                      </p:to>
-                                    </p:set>
-                                    <p:animEffect transition="in" filter="fade">
-                                      <p:cBhvr>
-                                        <p:cTn id="24" dur="500"/>
-                                        <p:tgtEl>
-                                          <p:spTgt spid="9"/>
-                                        </p:tgtEl>
-                                      </p:cBhvr>
-                                    </p:animEffect>
-                                  </p:childTnLst>
-                                </p:cTn>
-                              </p:par>
-                              <p:par>
-                                <p:cTn id="25" presetID="10" presetClass="entr" presetSubtype="0" fill="hold" grpId="0" nodeType="withEffect">
-                                  <p:stCondLst>
-                                    <p:cond delay="0"/>
-                                  </p:stCondLst>
-                                  <p:childTnLst>
-                                    <p:set>
-                                      <p:cBhvr>
-                                        <p:cTn id="26" dur="1" fill="hold">
-                                          <p:stCondLst>
-                                            <p:cond delay="0"/>
-                                          </p:stCondLst>
-                                        </p:cTn>
-                                        <p:tgtEl>
-                                          <p:spTgt spid="8"/>
-                                        </p:tgtEl>
-                                        <p:attrNameLst>
-                                          <p:attrName>style.visibility</p:attrName>
-                                        </p:attrNameLst>
-                                      </p:cBhvr>
-                                      <p:to>
-                                        <p:strVal val="visible"/>
-                                      </p:to>
-                                    </p:set>
-                                    <p:animEffect transition="in" filter="fade">
-                                      <p:cBhvr>
-                                        <p:cTn id="27" dur="500"/>
-                                        <p:tgtEl>
-                                          <p:spTgt spid="8"/>
-                                        </p:tgtEl>
-                                      </p:cBhvr>
-                                    </p:animEffect>
-                                  </p:childTnLst>
-                                </p:cTn>
-                              </p:par>
-                            </p:childTnLst>
-                          </p:cTn>
-                        </p:par>
-                      </p:childTnLst>
-                    </p:cTn>
-                  </p:par>
-                  <p:par>
-                    <p:cTn id="28" fill="hold">
-                      <p:stCondLst>
-                        <p:cond delay="indefinite"/>
-                      </p:stCondLst>
-                      <p:childTnLst>
-                        <p:par>
-                          <p:cTn id="29" fill="hold">
-                            <p:stCondLst>
-                              <p:cond delay="0"/>
-                            </p:stCondLst>
-                            <p:childTnLst>
-                              <p:par>
-                                <p:cTn id="30" presetID="10" presetClass="entr" presetSubtype="0" fill="hold" nodeType="clickEffect">
-                                  <p:stCondLst>
-                                    <p:cond delay="0"/>
-                                  </p:stCondLst>
-                                  <p:childTnLst>
-                                    <p:set>
-                                      <p:cBhvr>
-                                        <p:cTn id="31" dur="1" fill="hold">
-                                          <p:stCondLst>
-                                            <p:cond delay="0"/>
-                                          </p:stCondLst>
-                                        </p:cTn>
-                                        <p:tgtEl>
-                                          <p:spTgt spid="10"/>
-                                        </p:tgtEl>
-                                        <p:attrNameLst>
-                                          <p:attrName>style.visibility</p:attrName>
-                                        </p:attrNameLst>
-                                      </p:cBhvr>
-                                      <p:to>
-                                        <p:strVal val="visible"/>
-                                      </p:to>
-                                    </p:set>
-                                    <p:animEffect transition="in" filter="fade">
-                                      <p:cBhvr>
-                                        <p:cTn id="32" dur="500"/>
-                                        <p:tgtEl>
-                                          <p:spTgt spid="10"/>
-                                        </p:tgtEl>
-                                      </p:cBhvr>
-                                    </p:animEffect>
-                                  </p:childTnLst>
-                                </p:cTn>
-                              </p:par>
-                              <p:par>
-                                <p:cTn id="33" presetID="10" presetClass="entr" presetSubtype="0" fill="hold" grpId="0" nodeType="withEffect">
-                                  <p:stCondLst>
-                                    <p:cond delay="0"/>
-                                  </p:stCondLst>
-                                  <p:childTnLst>
-                                    <p:set>
-                                      <p:cBhvr>
-                                        <p:cTn id="34" dur="1" fill="hold">
-                                          <p:stCondLst>
-                                            <p:cond delay="0"/>
-                                          </p:stCondLst>
-                                        </p:cTn>
-                                        <p:tgtEl>
-                                          <p:spTgt spid="14"/>
-                                        </p:tgtEl>
-                                        <p:attrNameLst>
-                                          <p:attrName>style.visibility</p:attrName>
-                                        </p:attrNameLst>
-                                      </p:cBhvr>
-                                      <p:to>
-                                        <p:strVal val="visible"/>
-                                      </p:to>
-                                    </p:set>
-                                    <p:animEffect transition="in" filter="fade">
-                                      <p:cBhvr>
-                                        <p:cTn id="35" dur="500"/>
-                                        <p:tgtEl>
-                                          <p:spTgt spid="14"/>
-                                        </p:tgtEl>
-                                      </p:cBhvr>
-                                    </p:animEffect>
-                                  </p:childTnLst>
-                                </p:cTn>
-                              </p:par>
-                            </p:childTnLst>
-                          </p:cTn>
-                        </p:par>
-                      </p:childTnLst>
-                    </p:cTn>
-                  </p:par>
-                  <p:par>
-                    <p:cTn id="36" fill="hold">
-                      <p:stCondLst>
-                        <p:cond delay="indefinite"/>
-                      </p:stCondLst>
-                      <p:childTnLst>
-                        <p:par>
-                          <p:cTn id="37" fill="hold">
-                            <p:stCondLst>
-                              <p:cond delay="0"/>
-                            </p:stCondLst>
-                            <p:childTnLst>
-                              <p:par>
-                                <p:cTn id="38" presetID="10" presetClass="entr" presetSubtype="0" fill="hold" nodeType="clickEffect">
-                                  <p:stCondLst>
-                                    <p:cond delay="0"/>
-                                  </p:stCondLst>
-                                  <p:childTnLst>
-                                    <p:set>
-                                      <p:cBhvr>
-                                        <p:cTn id="39" dur="1" fill="hold">
-                                          <p:stCondLst>
-                                            <p:cond delay="0"/>
-                                          </p:stCondLst>
-                                        </p:cTn>
-                                        <p:tgtEl>
-                                          <p:spTgt spid="11"/>
-                                        </p:tgtEl>
-                                        <p:attrNameLst>
-                                          <p:attrName>style.visibility</p:attrName>
-                                        </p:attrNameLst>
-                                      </p:cBhvr>
-                                      <p:to>
-                                        <p:strVal val="visible"/>
-                                      </p:to>
-                                    </p:set>
-                                    <p:animEffect transition="in" filter="fade">
-                                      <p:cBhvr>
-                                        <p:cTn id="40" dur="500"/>
-                                        <p:tgtEl>
-                                          <p:spTgt spid="11"/>
-                                        </p:tgtEl>
-                                      </p:cBhvr>
-                                    </p:animEffect>
-                                  </p:childTnLst>
-                                </p:cTn>
-                              </p:par>
-                              <p:par>
-                                <p:cTn id="41" presetID="10" presetClass="entr" presetSubtype="0" fill="hold" grpId="0" nodeType="withEffect">
-                                  <p:stCondLst>
-                                    <p:cond delay="0"/>
-                                  </p:stCondLst>
-                                  <p:childTnLst>
-                                    <p:set>
-                                      <p:cBhvr>
-                                        <p:cTn id="42" dur="1" fill="hold">
-                                          <p:stCondLst>
-                                            <p:cond delay="0"/>
-                                          </p:stCondLst>
-                                        </p:cTn>
-                                        <p:tgtEl>
-                                          <p:spTgt spid="15"/>
-                                        </p:tgtEl>
-                                        <p:attrNameLst>
-                                          <p:attrName>style.visibility</p:attrName>
-                                        </p:attrNameLst>
-                                      </p:cBhvr>
-                                      <p:to>
-                                        <p:strVal val="visible"/>
-                                      </p:to>
-                                    </p:set>
-                                    <p:animEffect transition="in" filter="fade">
-                                      <p:cBhvr>
-                                        <p:cTn id="43" dur="500"/>
-                                        <p:tgtEl>
-                                          <p:spTgt spid="15"/>
-                                        </p:tgtEl>
-                                      </p:cBhvr>
-                                    </p:animEffect>
-                                  </p:childTnLst>
-                                </p:cTn>
-                              </p:par>
-                            </p:childTnLst>
-                          </p:cTn>
-                        </p:par>
-                      </p:childTnLst>
-                    </p:cTn>
-                  </p:par>
-                  <p:par>
-                    <p:cTn id="44" fill="hold">
-                      <p:stCondLst>
-                        <p:cond delay="indefinite"/>
-                      </p:stCondLst>
-                      <p:childTnLst>
-                        <p:par>
-                          <p:cTn id="45" fill="hold">
-                            <p:stCondLst>
-                              <p:cond delay="0"/>
-                            </p:stCondLst>
-                            <p:childTnLst>
-                              <p:par>
-                                <p:cTn id="46" presetID="10" presetClass="entr" presetSubtype="0" fill="hold" nodeType="clickEffect">
-                                  <p:stCondLst>
-                                    <p:cond delay="0"/>
-                                  </p:stCondLst>
-                                  <p:childTnLst>
-                                    <p:set>
-                                      <p:cBhvr>
-                                        <p:cTn id="47" dur="1" fill="hold">
-                                          <p:stCondLst>
-                                            <p:cond delay="0"/>
-                                          </p:stCondLst>
-                                        </p:cTn>
-                                        <p:tgtEl>
-                                          <p:spTgt spid="12"/>
-                                        </p:tgtEl>
-                                        <p:attrNameLst>
-                                          <p:attrName>style.visibility</p:attrName>
-                                        </p:attrNameLst>
-                                      </p:cBhvr>
-                                      <p:to>
-                                        <p:strVal val="visible"/>
-                                      </p:to>
-                                    </p:set>
-                                    <p:animEffect transition="in" filter="fade">
-                                      <p:cBhvr>
-                                        <p:cTn id="48" dur="500"/>
-                                        <p:tgtEl>
-                                          <p:spTgt spid="12"/>
-                                        </p:tgtEl>
-                                      </p:cBhvr>
-                                    </p:animEffect>
-                                  </p:childTnLst>
-                                </p:cTn>
-                              </p:par>
-                              <p:par>
-                                <p:cTn id="49" presetID="10" presetClass="entr" presetSubtype="0" fill="hold" grpId="0" nodeType="withEffect">
-                                  <p:stCondLst>
-                                    <p:cond delay="0"/>
-                                  </p:stCondLst>
-                                  <p:childTnLst>
-                                    <p:set>
-                                      <p:cBhvr>
-                                        <p:cTn id="50" dur="1" fill="hold">
-                                          <p:stCondLst>
-                                            <p:cond delay="0"/>
-                                          </p:stCondLst>
-                                        </p:cTn>
-                                        <p:tgtEl>
-                                          <p:spTgt spid="16"/>
-                                        </p:tgtEl>
-                                        <p:attrNameLst>
-                                          <p:attrName>style.visibility</p:attrName>
-                                        </p:attrNameLst>
-                                      </p:cBhvr>
-                                      <p:to>
-                                        <p:strVal val="visible"/>
-                                      </p:to>
-                                    </p:set>
-                                    <p:animEffect transition="in" filter="fade">
-                                      <p:cBhvr>
-                                        <p:cTn id="51" dur="500"/>
-                                        <p:tgtEl>
-                                          <p:spTgt spid="16"/>
-                                        </p:tgtEl>
-                                      </p:cBhvr>
-                                    </p:animEffect>
-                                  </p:childTnLst>
-                                </p:cTn>
-                              </p:par>
-                            </p:childTnLst>
-                          </p:cTn>
-                        </p:par>
-                      </p:childTnLst>
-                    </p:cTn>
-                  </p:par>
-                </p:childTnLst>
-              </p:cTn>
-              <p:prevCondLst>
-                <p:cond evt="onPrev" delay="0">
-                  <p:tgtEl>
-                    <p:sldTgt/>
-                  </p:tgtEl>
-                </p:cond>
-              </p:prevCondLst>
-              <p:nextCondLst>
-                <p:cond evt="onNext" delay="0">
-                  <p:tgtEl>
-                    <p:sldTgt/>
-                  </p:tgtEl>
-                </p:cond>
-              </p:nextCondLst>
-            </p:seq>
-          </p:childTnLst>
-        </p:cTn>
+        <p:cTn id="1" dur="indefinite" restart="never" nodeType="tmRoot"/>
       </p:par>
     </p:tnLst>
-    <p:bldLst>
-      <p:bldP spid="5" grpId="0"/>
-      <p:bldP spid="6" grpId="0"/>
-      <p:bldP spid="8" grpId="0"/>
-      <p:bldP spid="14" grpId="0"/>
-      <p:bldP spid="15" grpId="0"/>
-      <p:bldP spid="16" grpId="0"/>
-    </p:bldLst>
   </p:timing>
 </p:sld>
 </file>
@@ -10333,96 +9302,149 @@
             <a:spLocks noGrp="1"/>
           </p:cNvSpPr>
           <p:nvPr>
-            <p:ph type="ctrTitle"/>
+            <p:ph type="title"/>
           </p:nvPr>
         </p:nvSpPr>
-        <p:spPr>
-          <a:xfrm>
-            <a:off x="1298046" y="1911287"/>
-            <a:ext cx="7766936" cy="1646302"/>
-          </a:xfrm>
-        </p:spPr>
+        <p:spPr/>
+        <p:txBody>
+          <a:bodyPr/>
+          <a:lstStyle/>
+          <a:p>
+            <a:endParaRPr lang="en-US" dirty="0"/>
+          </a:p>
+        </p:txBody>
+      </p:sp>
+      <p:sp>
+        <p:nvSpPr>
+          <p:cNvPr id="3" name="Content Placeholder 2"/>
+          <p:cNvSpPr>
+            <a:spLocks noGrp="1"/>
+          </p:cNvSpPr>
+          <p:nvPr>
+            <p:ph idx="1"/>
+          </p:nvPr>
+        </p:nvSpPr>
+        <p:spPr/>
         <p:txBody>
           <a:bodyPr>
             <a:normAutofit/>
           </a:bodyPr>
           <a:lstStyle/>
           <a:p>
-            <a:pPr algn="ctr"/>
-            <a:r>
-              <a:rPr lang="en-US" sz="7200" dirty="0" smtClean="0">
-                <a:latin typeface="Big Caslon"/>
-                <a:cs typeface="Big Caslon"/>
-              </a:rPr>
-              <a:t>Plan</a:t>
-            </a:r>
-            <a:r>
-              <a:rPr lang="en-US" sz="7200" i="1" dirty="0" smtClean="0">
-                <a:solidFill>
-                  <a:srgbClr val="7F7F7F"/>
-                </a:solidFill>
-                <a:latin typeface="Big Caslon"/>
-                <a:cs typeface="Big Caslon"/>
-              </a:rPr>
-              <a:t>it</a:t>
-            </a:r>
-            <a:r>
-              <a:rPr lang="en-US" sz="7200" dirty="0" smtClean="0">
-                <a:solidFill>
-                  <a:srgbClr val="7F7F7F"/>
-                </a:solidFill>
-                <a:latin typeface="Big Caslon"/>
-                <a:cs typeface="Big Caslon"/>
-              </a:rPr>
-              <a:t>!</a:t>
-            </a:r>
-            <a:endParaRPr lang="en-US" sz="7200" dirty="0">
-              <a:solidFill>
-                <a:srgbClr val="7F7F7F"/>
-              </a:solidFill>
-              <a:latin typeface="Big Caslon"/>
-              <a:cs typeface="Big Caslon"/>
-            </a:endParaRPr>
-          </a:p>
-        </p:txBody>
-      </p:sp>
-      <p:sp>
-        <p:nvSpPr>
-          <p:cNvPr id="6" name="Rectangle 5"/>
-          <p:cNvSpPr/>
-          <p:nvPr/>
-        </p:nvSpPr>
-        <p:spPr>
-          <a:xfrm>
-            <a:off x="3919267" y="3393071"/>
-            <a:ext cx="2405850" cy="400110"/>
-          </a:xfrm>
-          <a:prstGeom prst="rect">
-            <a:avLst/>
-          </a:prstGeom>
-        </p:spPr>
-        <p:txBody>
-          <a:bodyPr wrap="none">
-            <a:spAutoFit/>
-          </a:bodyPr>
-          <a:lstStyle/>
-          <a:p>
-            <a:pPr algn="ctr"/>
-            <a:r>
-              <a:rPr lang="en-US" sz="2000" dirty="0">
-                <a:solidFill>
-                  <a:srgbClr val="70AD47"/>
-                </a:solidFill>
-              </a:rPr>
-              <a:t>We’re Here to Help</a:t>
-            </a:r>
+            <a:r>
+              <a:rPr lang="en-US" b="1" dirty="0" smtClean="0"/>
+              <a:t>Doing </a:t>
+            </a:r>
+            <a:r>
+              <a:rPr lang="en-US" b="1" dirty="0"/>
+              <a:t>the first walkthrough of deploying to </a:t>
+            </a:r>
+            <a:r>
+              <a:rPr lang="en-US" b="1" dirty="0" smtClean="0"/>
+              <a:t>Azure Devin</a:t>
+            </a:r>
+            <a:endParaRPr lang="en-US" dirty="0"/>
+          </a:p>
+          <a:p>
+            <a:r>
+              <a:rPr lang="en-US" b="1" dirty="0"/>
+              <a:t>Integrating JQuery plugins into MVC </a:t>
+            </a:r>
+            <a:r>
+              <a:rPr lang="en-US" b="1" dirty="0" smtClean="0"/>
+              <a:t>project Albert</a:t>
+            </a:r>
+          </a:p>
+          <a:p>
+            <a:r>
+              <a:rPr lang="en-US" b="1" dirty="0" smtClean="0"/>
+              <a:t>The </a:t>
+            </a:r>
+            <a:r>
+              <a:rPr lang="en-US" b="1" dirty="0"/>
+              <a:t>GIT Bash Learning curve - Living in </a:t>
+            </a:r>
+            <a:r>
+              <a:rPr lang="en-US" b="1" dirty="0" err="1"/>
+              <a:t>GITHub</a:t>
+            </a:r>
+            <a:r>
+              <a:rPr lang="en-US" b="1" dirty="0"/>
+              <a:t> and working in </a:t>
+            </a:r>
+            <a:r>
+              <a:rPr lang="en-US" b="1" dirty="0" smtClean="0"/>
+              <a:t>GIT Albert</a:t>
+            </a:r>
+            <a:endParaRPr lang="en-US" dirty="0"/>
+          </a:p>
+          <a:p>
+            <a:r>
+              <a:rPr lang="en-US" b="1" dirty="0"/>
+              <a:t>Database </a:t>
+            </a:r>
+            <a:endParaRPr lang="en-US" dirty="0"/>
+          </a:p>
+          <a:p>
+            <a:r>
+              <a:rPr lang="en-US" b="1" dirty="0"/>
+              <a:t>Integrating the MVC “free” User Authentication</a:t>
+            </a:r>
+            <a:endParaRPr lang="en-US" dirty="0"/>
+          </a:p>
+          <a:p>
+            <a:r>
+              <a:rPr lang="en-US" b="1" dirty="0" smtClean="0"/>
+              <a:t>Sprints</a:t>
+            </a:r>
+            <a:r>
+              <a:rPr lang="en-US" b="1" dirty="0"/>
+              <a:t>, deadlines, formal testing and documentation – not so much….</a:t>
+            </a:r>
+            <a:endParaRPr lang="en-US" dirty="0"/>
+          </a:p>
+          <a:p>
+            <a:r>
+              <a:rPr lang="en-US" b="1" dirty="0"/>
+              <a:t>Scheduling, Teamwork and meetings</a:t>
+            </a:r>
+            <a:endParaRPr lang="en-US" dirty="0"/>
+          </a:p>
+          <a:p>
+            <a:r>
+              <a:rPr lang="en-US" b="1" dirty="0"/>
+              <a:t>Beta Testing by Family and </a:t>
+            </a:r>
+            <a:r>
+              <a:rPr lang="en-US" b="1"/>
+              <a:t>Friends</a:t>
+            </a:r>
+            <a:r>
+              <a:rPr lang="en-US"/>
+              <a:t> </a:t>
+            </a:r>
+            <a:r>
+              <a:rPr lang="en-US" smtClean="0"/>
+              <a:t>Devin</a:t>
+            </a:r>
+            <a:endParaRPr lang="en-US" dirty="0"/>
+          </a:p>
+          <a:p>
+            <a:r>
+              <a:rPr lang="en-US" b="1" dirty="0"/>
+              <a:t>What would we do differently?</a:t>
+            </a:r>
+            <a:endParaRPr lang="en-US" dirty="0"/>
+          </a:p>
+          <a:p>
+            <a:endParaRPr lang="en-US" dirty="0"/>
           </a:p>
         </p:txBody>
       </p:sp>
     </p:spTree>
     <p:extLst>
       <p:ext uri="{BB962C8B-B14F-4D97-AF65-F5344CB8AC3E}">
-        <p14:creationId xmlns:p14="http://schemas.microsoft.com/office/powerpoint/2010/main" val="2624175973"/>
+        <p14:creationId xmlns:p14="http://schemas.microsoft.com/office/powerpoint/2010/main" val="2116137551"/>
       </p:ext>
     </p:extLst>
   </p:cSld>
@@ -10466,152 +9488,43 @@
             <p:ph type="title"/>
           </p:nvPr>
         </p:nvSpPr>
-        <p:spPr/>
-        <p:txBody>
-          <a:bodyPr/>
-          <a:lstStyle/>
-          <a:p>
-            <a:endParaRPr lang="en-US" dirty="0"/>
-          </a:p>
-        </p:txBody>
-      </p:sp>
-      <p:sp>
-        <p:nvSpPr>
-          <p:cNvPr id="3" name="Content Placeholder 2"/>
-          <p:cNvSpPr>
-            <a:spLocks noGrp="1"/>
-          </p:cNvSpPr>
-          <p:nvPr>
-            <p:ph idx="1"/>
-          </p:nvPr>
-        </p:nvSpPr>
-        <p:spPr/>
+        <p:spPr>
+          <a:xfrm>
+            <a:off x="677334" y="609600"/>
+            <a:ext cx="8596668" cy="774357"/>
+          </a:xfrm>
+        </p:spPr>
         <p:txBody>
           <a:bodyPr>
-            <a:normAutofit/>
+            <a:noAutofit/>
           </a:bodyPr>
           <a:lstStyle/>
           <a:p>
             <a:r>
-              <a:rPr lang="en-US" b="1" dirty="0" smtClean="0"/>
-              <a:t>Doing </a:t>
-            </a:r>
-            <a:r>
-              <a:rPr lang="en-US" b="1" dirty="0"/>
-              <a:t>the first walkthrough of deploying to </a:t>
-            </a:r>
-            <a:r>
-              <a:rPr lang="en-US" b="1" dirty="0" smtClean="0"/>
-              <a:t>Azure Devin</a:t>
-            </a:r>
-            <a:endParaRPr lang="en-US" dirty="0"/>
-          </a:p>
-          <a:p>
-            <a:r>
-              <a:rPr lang="en-US" b="1" dirty="0"/>
-              <a:t>Integrating JQuery plugins into MVC </a:t>
-            </a:r>
-            <a:r>
-              <a:rPr lang="en-US" b="1" dirty="0" smtClean="0"/>
-              <a:t>project Albert</a:t>
-            </a:r>
-          </a:p>
-          <a:p>
-            <a:r>
-              <a:rPr lang="en-US" b="1" dirty="0" smtClean="0"/>
-              <a:t>The </a:t>
-            </a:r>
-            <a:r>
-              <a:rPr lang="en-US" b="1" dirty="0"/>
-              <a:t>GIT Bash Learning curve - Living in </a:t>
-            </a:r>
-            <a:r>
-              <a:rPr lang="en-US" b="1" dirty="0" err="1"/>
-              <a:t>GITHub</a:t>
-            </a:r>
-            <a:r>
-              <a:rPr lang="en-US" b="1" dirty="0"/>
-              <a:t> and working in </a:t>
-            </a:r>
-            <a:r>
-              <a:rPr lang="en-US" b="1" dirty="0" smtClean="0"/>
-              <a:t>GIT Albert</a:t>
-            </a:r>
-            <a:endParaRPr lang="en-US" dirty="0"/>
-          </a:p>
-          <a:p>
-            <a:r>
-              <a:rPr lang="en-US" b="1" dirty="0"/>
-              <a:t>Database </a:t>
-            </a:r>
-            <a:endParaRPr lang="en-US" dirty="0"/>
-          </a:p>
-          <a:p>
-            <a:r>
-              <a:rPr lang="en-US" b="1" dirty="0"/>
-              <a:t>Integrating the MVC “free” User Authentication</a:t>
-            </a:r>
-            <a:endParaRPr lang="en-US" dirty="0"/>
-          </a:p>
-          <a:p>
-            <a:r>
-              <a:rPr lang="en-US" b="1" dirty="0" smtClean="0"/>
-              <a:t>Sprints</a:t>
-            </a:r>
-            <a:r>
-              <a:rPr lang="en-US" b="1" dirty="0"/>
-              <a:t>, deadlines, formal testing and documentation – not so much….</a:t>
-            </a:r>
-            <a:endParaRPr lang="en-US" dirty="0"/>
-          </a:p>
-          <a:p>
-            <a:r>
-              <a:rPr lang="en-US" b="1" dirty="0"/>
-              <a:t>Scheduling, Teamwork and meetings</a:t>
-            </a:r>
-            <a:endParaRPr lang="en-US" dirty="0"/>
-          </a:p>
-          <a:p>
-            <a:r>
-              <a:rPr lang="en-US" b="1" dirty="0"/>
-              <a:t>Beta Testing by Family and </a:t>
-            </a:r>
-            <a:r>
-              <a:rPr lang="en-US" b="1"/>
-              <a:t>Friends</a:t>
-            </a:r>
-            <a:r>
-              <a:rPr lang="en-US"/>
-              <a:t> </a:t>
-            </a:r>
-            <a:r>
-              <a:rPr lang="en-US" smtClean="0"/>
-              <a:t>Devin</a:t>
-            </a:r>
-            <a:endParaRPr lang="en-US" dirty="0"/>
-          </a:p>
-          <a:p>
-            <a:r>
-              <a:rPr lang="en-US" b="1" dirty="0"/>
-              <a:t>What would we do differently?</a:t>
-            </a:r>
-            <a:endParaRPr lang="en-US" dirty="0"/>
-          </a:p>
-          <a:p>
-            <a:endParaRPr lang="en-US" dirty="0"/>
+              <a:rPr lang="en-US" sz="5400" dirty="0" smtClean="0"/>
+              <a:t>Backlog</a:t>
+            </a:r>
+            <a:endParaRPr lang="en-US" sz="5400" dirty="0"/>
           </a:p>
         </p:txBody>
       </p:sp>
     </p:spTree>
     <p:extLst>
       <p:ext uri="{BB962C8B-B14F-4D97-AF65-F5344CB8AC3E}">
-        <p14:creationId xmlns:p14="http://schemas.microsoft.com/office/powerpoint/2010/main" val="2116137551"/>
+        <p14:creationId xmlns:p14="http://schemas.microsoft.com/office/powerpoint/2010/main" val="4221975140"/>
       </p:ext>
     </p:extLst>
   </p:cSld>
   <p:clrMapOvr>
     <a:masterClrMapping/>
   </p:clrMapOvr>
+  <p:timing>
+    <p:tnLst>
+      <p:par>
+        <p:cTn id="1" dur="indefinite" restart="never" nodeType="tmRoot"/>
+      </p:par>
+    </p:tnLst>
+  </p:timing>
 </p:sld>
 </file>
 
@@ -10632,46 +9545,669 @@
           <a:chExt cx="0" cy="0"/>
         </a:xfrm>
       </p:grpSpPr>
+      <p:grpSp>
+        <p:nvGrpSpPr>
+          <p:cNvPr id="4" name="Canvas 1"/>
+          <p:cNvGrpSpPr/>
+          <p:nvPr/>
+        </p:nvGrpSpPr>
+        <p:grpSpPr>
+          <a:xfrm>
+            <a:off x="2158222" y="1700697"/>
+            <a:ext cx="5486400" cy="3200400"/>
+            <a:chOff x="0" y="0"/>
+            <a:chExt cx="5486400" cy="3200400"/>
+          </a:xfrm>
+        </p:grpSpPr>
+        <p:sp>
+          <p:nvSpPr>
+            <p:cNvPr id="5" name="Rectangle 4"/>
+            <p:cNvSpPr/>
+            <p:nvPr/>
+          </p:nvSpPr>
+          <p:spPr>
+            <a:xfrm>
+              <a:off x="0" y="0"/>
+              <a:ext cx="5486400" cy="3200400"/>
+            </a:xfrm>
+            <a:prstGeom prst="rect">
+              <a:avLst/>
+            </a:prstGeom>
+          </p:spPr>
+        </p:sp>
+        <p:sp>
+          <p:nvSpPr>
+            <p:cNvPr id="6" name="Rounded Rectangle 5"/>
+            <p:cNvSpPr/>
+            <p:nvPr/>
+          </p:nvSpPr>
+          <p:spPr>
+            <a:xfrm>
+              <a:off x="675861" y="278297"/>
+              <a:ext cx="3116911" cy="516834"/>
+            </a:xfrm>
+            <a:prstGeom prst="roundRect">
+              <a:avLst/>
+            </a:prstGeom>
+          </p:spPr>
+          <p:style>
+            <a:lnRef idx="1">
+              <a:schemeClr val="accent1"/>
+            </a:lnRef>
+            <a:fillRef idx="3">
+              <a:schemeClr val="accent1"/>
+            </a:fillRef>
+            <a:effectRef idx="2">
+              <a:schemeClr val="accent1"/>
+            </a:effectRef>
+            <a:fontRef idx="minor">
+              <a:schemeClr val="lt1"/>
+            </a:fontRef>
+          </p:style>
+          <p:txBody>
+            <a:bodyPr rot="0" spcFirstLastPara="0" vert="horz" wrap="square" lIns="91440" tIns="45720" rIns="91440" bIns="45720" numCol="1" spcCol="0" rtlCol="0" fromWordArt="0" anchor="ctr" anchorCtr="0" forceAA="0" compatLnSpc="1">
+              <a:prstTxWarp prst="textNoShape">
+                <a:avLst/>
+              </a:prstTxWarp>
+              <a:noAutofit/>
+            </a:bodyPr>
+            <a:lstStyle/>
+            <a:p>
+              <a:pPr marL="0" marR="0" algn="ctr">
+                <a:lnSpc>
+                  <a:spcPct val="107000"/>
+                </a:lnSpc>
+                <a:spcBef>
+                  <a:spcPts val="0"/>
+                </a:spcBef>
+                <a:spcAft>
+                  <a:spcPts val="800"/>
+                </a:spcAft>
+              </a:pPr>
+              <a:r>
+                <a:rPr lang="en-US" sz="1400" dirty="0">
+                  <a:effectLst/>
+                  <a:ea typeface="Calibri" panose="020F0502020204030204" pitchFamily="34" charset="0"/>
+                  <a:cs typeface="Times New Roman" panose="02020603050405020304" pitchFamily="18" charset="0"/>
+                </a:rPr>
+                <a:t>View</a:t>
+              </a:r>
+              <a:endParaRPr lang="en-US" sz="1100" dirty="0">
+                <a:effectLst/>
+                <a:ea typeface="Calibri" panose="020F0502020204030204" pitchFamily="34" charset="0"/>
+                <a:cs typeface="Times New Roman" panose="02020603050405020304" pitchFamily="18" charset="0"/>
+              </a:endParaRPr>
+            </a:p>
+          </p:txBody>
+        </p:sp>
+        <p:sp>
+          <p:nvSpPr>
+            <p:cNvPr id="7" name="Rounded Rectangle 6"/>
+            <p:cNvSpPr/>
+            <p:nvPr/>
+          </p:nvSpPr>
+          <p:spPr>
+            <a:xfrm>
+              <a:off x="676192" y="847909"/>
+              <a:ext cx="3116580" cy="516255"/>
+            </a:xfrm>
+            <a:prstGeom prst="roundRect">
+              <a:avLst/>
+            </a:prstGeom>
+          </p:spPr>
+          <p:style>
+            <a:lnRef idx="1">
+              <a:schemeClr val="accent1"/>
+            </a:lnRef>
+            <a:fillRef idx="3">
+              <a:schemeClr val="accent1"/>
+            </a:fillRef>
+            <a:effectRef idx="2">
+              <a:schemeClr val="accent1"/>
+            </a:effectRef>
+            <a:fontRef idx="minor">
+              <a:schemeClr val="lt1"/>
+            </a:fontRef>
+          </p:style>
+          <p:txBody>
+            <a:bodyPr rot="0" spcFirstLastPara="0" vert="horz" wrap="square" lIns="91440" tIns="45720" rIns="91440" bIns="45720" numCol="1" spcCol="0" rtlCol="0" fromWordArt="0" anchor="ctr" anchorCtr="0" forceAA="0" compatLnSpc="1">
+              <a:prstTxWarp prst="textNoShape">
+                <a:avLst/>
+              </a:prstTxWarp>
+              <a:noAutofit/>
+            </a:bodyPr>
+            <a:lstStyle/>
+            <a:p>
+              <a:pPr marL="0" marR="0" algn="ctr">
+                <a:lnSpc>
+                  <a:spcPct val="106000"/>
+                </a:lnSpc>
+                <a:spcBef>
+                  <a:spcPts val="0"/>
+                </a:spcBef>
+                <a:spcAft>
+                  <a:spcPts val="800"/>
+                </a:spcAft>
+              </a:pPr>
+              <a:r>
+                <a:rPr lang="en-US" sz="1400" dirty="0" smtClean="0">
+                  <a:effectLst/>
+                  <a:latin typeface="Times New Roman" panose="02020603050405020304" pitchFamily="18" charset="0"/>
+                  <a:ea typeface="Calibri" panose="020F0502020204030204" pitchFamily="34" charset="0"/>
+                </a:rPr>
+                <a:t>Controller</a:t>
+              </a:r>
+              <a:endParaRPr lang="en-US" sz="1200" dirty="0">
+                <a:effectLst/>
+                <a:latin typeface="Times New Roman" panose="02020603050405020304" pitchFamily="18" charset="0"/>
+                <a:ea typeface="Times New Roman" panose="02020603050405020304" pitchFamily="18" charset="0"/>
+              </a:endParaRPr>
+            </a:p>
+          </p:txBody>
+        </p:sp>
+        <p:sp>
+          <p:nvSpPr>
+            <p:cNvPr id="8" name="Rounded Rectangle 7"/>
+            <p:cNvSpPr/>
+            <p:nvPr/>
+          </p:nvSpPr>
+          <p:spPr>
+            <a:xfrm>
+              <a:off x="676192" y="1412453"/>
+              <a:ext cx="3116580" cy="516255"/>
+            </a:xfrm>
+            <a:prstGeom prst="roundRect">
+              <a:avLst/>
+            </a:prstGeom>
+          </p:spPr>
+          <p:style>
+            <a:lnRef idx="1">
+              <a:schemeClr val="accent1"/>
+            </a:lnRef>
+            <a:fillRef idx="3">
+              <a:schemeClr val="accent1"/>
+            </a:fillRef>
+            <a:effectRef idx="2">
+              <a:schemeClr val="accent1"/>
+            </a:effectRef>
+            <a:fontRef idx="minor">
+              <a:schemeClr val="lt1"/>
+            </a:fontRef>
+          </p:style>
+          <p:txBody>
+            <a:bodyPr rot="0" spcFirstLastPara="0" vert="horz" wrap="square" lIns="91440" tIns="45720" rIns="91440" bIns="45720" numCol="1" spcCol="0" rtlCol="0" fromWordArt="0" anchor="ctr" anchorCtr="0" forceAA="0" compatLnSpc="1">
+              <a:prstTxWarp prst="textNoShape">
+                <a:avLst/>
+              </a:prstTxWarp>
+              <a:noAutofit/>
+            </a:bodyPr>
+            <a:lstStyle/>
+            <a:p>
+              <a:pPr marL="0" marR="0" algn="ctr">
+                <a:lnSpc>
+                  <a:spcPct val="106000"/>
+                </a:lnSpc>
+                <a:spcBef>
+                  <a:spcPts val="0"/>
+                </a:spcBef>
+                <a:spcAft>
+                  <a:spcPts val="800"/>
+                </a:spcAft>
+              </a:pPr>
+              <a:r>
+                <a:rPr lang="en-US" sz="1400" dirty="0">
+                  <a:effectLst/>
+                  <a:latin typeface="Times New Roman" panose="02020603050405020304" pitchFamily="18" charset="0"/>
+                  <a:ea typeface="Calibri" panose="020F0502020204030204" pitchFamily="34" charset="0"/>
+                </a:rPr>
+                <a:t>Project Business Layer</a:t>
+              </a:r>
+              <a:endParaRPr lang="en-US" sz="1600" dirty="0">
+                <a:effectLst/>
+                <a:latin typeface="Times New Roman" panose="02020603050405020304" pitchFamily="18" charset="0"/>
+                <a:ea typeface="Times New Roman" panose="02020603050405020304" pitchFamily="18" charset="0"/>
+              </a:endParaRPr>
+            </a:p>
+          </p:txBody>
+        </p:sp>
+        <p:sp>
+          <p:nvSpPr>
+            <p:cNvPr id="9" name="Rounded Rectangle 8"/>
+            <p:cNvSpPr/>
+            <p:nvPr/>
+          </p:nvSpPr>
+          <p:spPr>
+            <a:xfrm>
+              <a:off x="676192" y="1976995"/>
+              <a:ext cx="3116580" cy="516255"/>
+            </a:xfrm>
+            <a:prstGeom prst="roundRect">
+              <a:avLst/>
+            </a:prstGeom>
+          </p:spPr>
+          <p:style>
+            <a:lnRef idx="1">
+              <a:schemeClr val="accent1"/>
+            </a:lnRef>
+            <a:fillRef idx="3">
+              <a:schemeClr val="accent1"/>
+            </a:fillRef>
+            <a:effectRef idx="2">
+              <a:schemeClr val="accent1"/>
+            </a:effectRef>
+            <a:fontRef idx="minor">
+              <a:schemeClr val="lt1"/>
+            </a:fontRef>
+          </p:style>
+          <p:txBody>
+            <a:bodyPr rot="0" spcFirstLastPara="0" vert="horz" wrap="square" lIns="91440" tIns="45720" rIns="91440" bIns="45720" numCol="1" spcCol="0" rtlCol="0" fromWordArt="0" anchor="ctr" anchorCtr="0" forceAA="0" compatLnSpc="1">
+              <a:prstTxWarp prst="textNoShape">
+                <a:avLst/>
+              </a:prstTxWarp>
+              <a:noAutofit/>
+            </a:bodyPr>
+            <a:lstStyle/>
+            <a:p>
+              <a:pPr marL="0" marR="0" algn="ctr">
+                <a:lnSpc>
+                  <a:spcPct val="106000"/>
+                </a:lnSpc>
+                <a:spcBef>
+                  <a:spcPts val="0"/>
+                </a:spcBef>
+                <a:spcAft>
+                  <a:spcPts val="800"/>
+                </a:spcAft>
+              </a:pPr>
+              <a:r>
+                <a:rPr lang="en-US" sz="1400" dirty="0">
+                  <a:effectLst/>
+                  <a:latin typeface="Times New Roman" panose="02020603050405020304" pitchFamily="18" charset="0"/>
+                  <a:ea typeface="Calibri" panose="020F0502020204030204" pitchFamily="34" charset="0"/>
+                </a:rPr>
+                <a:t>Project Data Layer</a:t>
+              </a:r>
+              <a:endParaRPr lang="en-US" sz="1600" dirty="0">
+                <a:effectLst/>
+                <a:latin typeface="Times New Roman" panose="02020603050405020304" pitchFamily="18" charset="0"/>
+                <a:ea typeface="Times New Roman" panose="02020603050405020304" pitchFamily="18" charset="0"/>
+              </a:endParaRPr>
+            </a:p>
+          </p:txBody>
+        </p:sp>
+        <p:sp>
+          <p:nvSpPr>
+            <p:cNvPr id="10" name="Rounded Rectangle 9"/>
+            <p:cNvSpPr/>
+            <p:nvPr/>
+          </p:nvSpPr>
+          <p:spPr>
+            <a:xfrm>
+              <a:off x="676192" y="2541537"/>
+              <a:ext cx="3116580" cy="516255"/>
+            </a:xfrm>
+            <a:prstGeom prst="roundRect">
+              <a:avLst/>
+            </a:prstGeom>
+          </p:spPr>
+          <p:style>
+            <a:lnRef idx="1">
+              <a:schemeClr val="accent1"/>
+            </a:lnRef>
+            <a:fillRef idx="3">
+              <a:schemeClr val="accent1"/>
+            </a:fillRef>
+            <a:effectRef idx="2">
+              <a:schemeClr val="accent1"/>
+            </a:effectRef>
+            <a:fontRef idx="minor">
+              <a:schemeClr val="lt1"/>
+            </a:fontRef>
+          </p:style>
+          <p:txBody>
+            <a:bodyPr rot="0" spcFirstLastPara="0" vert="horz" wrap="square" lIns="91440" tIns="45720" rIns="91440" bIns="45720" numCol="1" spcCol="0" rtlCol="0" fromWordArt="0" anchor="ctr" anchorCtr="0" forceAA="0" compatLnSpc="1">
+              <a:prstTxWarp prst="textNoShape">
+                <a:avLst/>
+              </a:prstTxWarp>
+              <a:noAutofit/>
+            </a:bodyPr>
+            <a:lstStyle/>
+            <a:p>
+              <a:pPr marL="0" marR="0" algn="ctr">
+                <a:lnSpc>
+                  <a:spcPct val="106000"/>
+                </a:lnSpc>
+                <a:spcBef>
+                  <a:spcPts val="0"/>
+                </a:spcBef>
+                <a:spcAft>
+                  <a:spcPts val="800"/>
+                </a:spcAft>
+              </a:pPr>
+              <a:r>
+                <a:rPr lang="en-US" sz="1400" dirty="0" smtClean="0">
+                  <a:effectLst/>
+                  <a:latin typeface="Times New Roman" panose="02020603050405020304" pitchFamily="18" charset="0"/>
+                  <a:ea typeface="Calibri" panose="020F0502020204030204" pitchFamily="34" charset="0"/>
+                </a:rPr>
+                <a:t>Entity Framework</a:t>
+              </a:r>
+            </a:p>
+          </p:txBody>
+        </p:sp>
+      </p:grpSp>
       <p:sp>
         <p:nvSpPr>
-          <p:cNvPr id="2" name="Title 1"/>
-          <p:cNvSpPr>
-            <a:spLocks noGrp="1"/>
-          </p:cNvSpPr>
-          <p:nvPr>
-            <p:ph type="title"/>
-          </p:nvPr>
+          <p:cNvPr id="11" name="Rounded Rectangle 10"/>
+          <p:cNvSpPr/>
+          <p:nvPr/>
         </p:nvSpPr>
         <p:spPr>
           <a:xfrm>
-            <a:off x="677334" y="609600"/>
-            <a:ext cx="8596668" cy="774357"/>
+            <a:off x="2834414" y="4806776"/>
+            <a:ext cx="3116580" cy="516255"/>
           </a:xfrm>
+          <a:prstGeom prst="roundRect">
+            <a:avLst/>
+          </a:prstGeom>
         </p:spPr>
+        <p:style>
+          <a:lnRef idx="1">
+            <a:schemeClr val="accent1"/>
+          </a:lnRef>
+          <a:fillRef idx="3">
+            <a:schemeClr val="accent1"/>
+          </a:fillRef>
+          <a:effectRef idx="2">
+            <a:schemeClr val="accent1"/>
+          </a:effectRef>
+          <a:fontRef idx="minor">
+            <a:schemeClr val="lt1"/>
+          </a:fontRef>
+        </p:style>
         <p:txBody>
-          <a:bodyPr>
+          <a:bodyPr rot="0" spcFirstLastPara="0" vert="horz" wrap="square" lIns="91440" tIns="45720" rIns="91440" bIns="45720" numCol="1" spcCol="0" rtlCol="0" fromWordArt="0" anchor="ctr" anchorCtr="0" forceAA="0" compatLnSpc="1">
+            <a:prstTxWarp prst="textNoShape">
+              <a:avLst/>
+            </a:prstTxWarp>
             <a:noAutofit/>
           </a:bodyPr>
           <a:lstStyle/>
           <a:p>
-            <a:r>
-              <a:rPr lang="en-US" sz="5400" dirty="0" smtClean="0"/>
-              <a:t>Backlog</a:t>
-            </a:r>
-            <a:endParaRPr lang="en-US" sz="5400" dirty="0"/>
+            <a:pPr marL="0" marR="0" algn="ctr">
+              <a:lnSpc>
+                <a:spcPct val="106000"/>
+              </a:lnSpc>
+              <a:spcBef>
+                <a:spcPts val="0"/>
+              </a:spcBef>
+              <a:spcAft>
+                <a:spcPts val="800"/>
+              </a:spcAft>
+            </a:pPr>
+            <a:r>
+              <a:rPr lang="en-US" sz="1400" dirty="0">
+                <a:effectLst/>
+                <a:latin typeface="Times New Roman" panose="02020603050405020304" pitchFamily="18" charset="0"/>
+                <a:ea typeface="Calibri" panose="020F0502020204030204" pitchFamily="34" charset="0"/>
+              </a:rPr>
+              <a:t>Database</a:t>
+            </a:r>
+            <a:endParaRPr lang="en-US" sz="1600" dirty="0">
+              <a:effectLst/>
+              <a:latin typeface="Times New Roman" panose="02020603050405020304" pitchFamily="18" charset="0"/>
+              <a:ea typeface="Times New Roman" panose="02020603050405020304" pitchFamily="18" charset="0"/>
+            </a:endParaRPr>
+          </a:p>
+        </p:txBody>
+      </p:sp>
+      <p:sp>
+        <p:nvSpPr>
+          <p:cNvPr id="12" name="Rounded Rectangle 11"/>
+          <p:cNvSpPr/>
+          <p:nvPr/>
+        </p:nvSpPr>
+        <p:spPr>
+          <a:xfrm>
+            <a:off x="6086332" y="4797720"/>
+            <a:ext cx="1558290" cy="516255"/>
+          </a:xfrm>
+          <a:prstGeom prst="roundRect">
+            <a:avLst/>
+          </a:prstGeom>
+          <a:solidFill>
+            <a:schemeClr val="accent2">
+              <a:lumMod val="75000"/>
+            </a:schemeClr>
+          </a:solidFill>
+        </p:spPr>
+        <p:style>
+          <a:lnRef idx="1">
+            <a:schemeClr val="accent1"/>
+          </a:lnRef>
+          <a:fillRef idx="3">
+            <a:schemeClr val="accent1"/>
+          </a:fillRef>
+          <a:effectRef idx="2">
+            <a:schemeClr val="accent1"/>
+          </a:effectRef>
+          <a:fontRef idx="minor">
+            <a:schemeClr val="lt1"/>
+          </a:fontRef>
+        </p:style>
+        <p:txBody>
+          <a:bodyPr rot="0" spcFirstLastPara="0" vert="horz" wrap="square" lIns="91440" tIns="45720" rIns="91440" bIns="45720" numCol="1" spcCol="0" rtlCol="0" fromWordArt="0" anchor="ctr" anchorCtr="0" forceAA="0" compatLnSpc="1">
+            <a:prstTxWarp prst="textNoShape">
+              <a:avLst/>
+            </a:prstTxWarp>
+            <a:noAutofit/>
+          </a:bodyPr>
+          <a:lstStyle/>
+          <a:p>
+            <a:pPr marL="0" marR="0" algn="ctr">
+              <a:lnSpc>
+                <a:spcPct val="106000"/>
+              </a:lnSpc>
+              <a:spcBef>
+                <a:spcPts val="0"/>
+              </a:spcBef>
+              <a:spcAft>
+                <a:spcPts val="800"/>
+              </a:spcAft>
+            </a:pPr>
+            <a:r>
+              <a:rPr lang="en-US" sz="1400" dirty="0" smtClean="0">
+                <a:latin typeface="Times New Roman" panose="02020603050405020304" pitchFamily="18" charset="0"/>
+                <a:ea typeface="Times New Roman" panose="02020603050405020304" pitchFamily="18" charset="0"/>
+              </a:rPr>
+              <a:t>MS SQL </a:t>
+            </a:r>
+            <a:r>
+              <a:rPr lang="en-US" sz="1400" dirty="0" smtClean="0">
+                <a:latin typeface="Times New Roman" panose="02020603050405020304" pitchFamily="18" charset="0"/>
+                <a:ea typeface="Times New Roman" panose="02020603050405020304" pitchFamily="18" charset="0"/>
+              </a:rPr>
+              <a:t>Azure</a:t>
+            </a:r>
+            <a:endParaRPr lang="en-US" sz="1600" dirty="0">
+              <a:effectLst/>
+              <a:latin typeface="Times New Roman" panose="02020603050405020304" pitchFamily="18" charset="0"/>
+              <a:ea typeface="Times New Roman" panose="02020603050405020304" pitchFamily="18" charset="0"/>
+            </a:endParaRPr>
+          </a:p>
+        </p:txBody>
+      </p:sp>
+      <p:sp>
+        <p:nvSpPr>
+          <p:cNvPr id="13" name="Rounded Rectangle 12"/>
+          <p:cNvSpPr/>
+          <p:nvPr/>
+        </p:nvSpPr>
+        <p:spPr>
+          <a:xfrm>
+            <a:off x="6086332" y="2005673"/>
+            <a:ext cx="1558290" cy="2731208"/>
+          </a:xfrm>
+          <a:prstGeom prst="roundRect">
+            <a:avLst/>
+          </a:prstGeom>
+          <a:solidFill>
+            <a:schemeClr val="accent2">
+              <a:lumMod val="75000"/>
+            </a:schemeClr>
+          </a:solidFill>
+        </p:spPr>
+        <p:style>
+          <a:lnRef idx="1">
+            <a:schemeClr val="accent1"/>
+          </a:lnRef>
+          <a:fillRef idx="3">
+            <a:schemeClr val="accent1"/>
+          </a:fillRef>
+          <a:effectRef idx="2">
+            <a:schemeClr val="accent1"/>
+          </a:effectRef>
+          <a:fontRef idx="minor">
+            <a:schemeClr val="lt1"/>
+          </a:fontRef>
+        </p:style>
+        <p:txBody>
+          <a:bodyPr rot="0" spcFirstLastPara="0" vert="horz" wrap="square" lIns="91440" tIns="45720" rIns="91440" bIns="45720" numCol="1" spcCol="0" rtlCol="0" fromWordArt="0" anchor="ctr" anchorCtr="0" forceAA="0" compatLnSpc="1">
+            <a:prstTxWarp prst="textNoShape">
+              <a:avLst/>
+            </a:prstTxWarp>
+            <a:noAutofit/>
+          </a:bodyPr>
+          <a:lstStyle/>
+          <a:p>
+            <a:pPr marL="0" marR="0" algn="ctr">
+              <a:lnSpc>
+                <a:spcPct val="106000"/>
+              </a:lnSpc>
+              <a:spcBef>
+                <a:spcPts val="0"/>
+              </a:spcBef>
+              <a:spcAft>
+                <a:spcPts val="800"/>
+              </a:spcAft>
+            </a:pPr>
+            <a:r>
+              <a:rPr lang="en-US" sz="1400" dirty="0" smtClean="0">
+                <a:latin typeface="Times New Roman" panose="02020603050405020304" pitchFamily="18" charset="0"/>
+                <a:ea typeface="Times New Roman" panose="02020603050405020304" pitchFamily="18" charset="0"/>
+              </a:rPr>
+              <a:t>.NET Framework</a:t>
+            </a:r>
+          </a:p>
+        </p:txBody>
+      </p:sp>
+      <p:sp>
+        <p:nvSpPr>
+          <p:cNvPr id="14" name="Rounded Rectangle 13"/>
+          <p:cNvSpPr/>
+          <p:nvPr/>
+        </p:nvSpPr>
+        <p:spPr>
+          <a:xfrm>
+            <a:off x="7779960" y="1978994"/>
+            <a:ext cx="1558290" cy="1085288"/>
+          </a:xfrm>
+          <a:prstGeom prst="roundRect">
+            <a:avLst/>
+          </a:prstGeom>
+          <a:solidFill>
+            <a:schemeClr val="accent2">
+              <a:lumMod val="75000"/>
+            </a:schemeClr>
+          </a:solidFill>
+        </p:spPr>
+        <p:style>
+          <a:lnRef idx="1">
+            <a:schemeClr val="accent1"/>
+          </a:lnRef>
+          <a:fillRef idx="3">
+            <a:schemeClr val="accent1"/>
+          </a:fillRef>
+          <a:effectRef idx="2">
+            <a:schemeClr val="accent1"/>
+          </a:effectRef>
+          <a:fontRef idx="minor">
+            <a:schemeClr val="lt1"/>
+          </a:fontRef>
+        </p:style>
+        <p:txBody>
+          <a:bodyPr rot="0" spcFirstLastPara="0" vert="horz" wrap="square" lIns="91440" tIns="45720" rIns="91440" bIns="45720" numCol="1" spcCol="0" rtlCol="0" fromWordArt="0" anchor="ctr" anchorCtr="0" forceAA="0" compatLnSpc="1">
+            <a:prstTxWarp prst="textNoShape">
+              <a:avLst/>
+            </a:prstTxWarp>
+            <a:noAutofit/>
+          </a:bodyPr>
+          <a:lstStyle/>
+          <a:p>
+            <a:pPr marL="0" marR="0" algn="ctr">
+              <a:lnSpc>
+                <a:spcPct val="106000"/>
+              </a:lnSpc>
+              <a:spcBef>
+                <a:spcPts val="0"/>
+              </a:spcBef>
+              <a:spcAft>
+                <a:spcPts val="800"/>
+              </a:spcAft>
+            </a:pPr>
+            <a:r>
+              <a:rPr lang="en-US" sz="1400" dirty="0" smtClean="0">
+                <a:latin typeface="Times New Roman" panose="02020603050405020304" pitchFamily="18" charset="0"/>
+                <a:ea typeface="Times New Roman" panose="02020603050405020304" pitchFamily="18" charset="0"/>
+              </a:rPr>
+              <a:t>ASP.NET</a:t>
+            </a:r>
+          </a:p>
+          <a:p>
+            <a:pPr marL="0" marR="0" algn="ctr">
+              <a:lnSpc>
+                <a:spcPct val="106000"/>
+              </a:lnSpc>
+              <a:spcBef>
+                <a:spcPts val="0"/>
+              </a:spcBef>
+              <a:spcAft>
+                <a:spcPts val="800"/>
+              </a:spcAft>
+            </a:pPr>
+            <a:r>
+              <a:rPr lang="en-US" sz="1400" dirty="0" smtClean="0">
+                <a:effectLst/>
+                <a:latin typeface="Times New Roman" panose="02020603050405020304" pitchFamily="18" charset="0"/>
+                <a:ea typeface="Times New Roman" panose="02020603050405020304" pitchFamily="18" charset="0"/>
+              </a:rPr>
+              <a:t>MVC 5</a:t>
+            </a:r>
+            <a:endParaRPr lang="en-US" sz="1200" dirty="0">
+              <a:effectLst/>
+              <a:latin typeface="Times New Roman" panose="02020603050405020304" pitchFamily="18" charset="0"/>
+              <a:ea typeface="Times New Roman" panose="02020603050405020304" pitchFamily="18" charset="0"/>
+            </a:endParaRPr>
           </a:p>
         </p:txBody>
       </p:sp>
     </p:spTree>
     <p:extLst>
       <p:ext uri="{BB962C8B-B14F-4D97-AF65-F5344CB8AC3E}">
-        <p14:creationId xmlns:p14="http://schemas.microsoft.com/office/powerpoint/2010/main" val="4221975140"/>
+        <p14:creationId xmlns:p14="http://schemas.microsoft.com/office/powerpoint/2010/main" val="3732072209"/>
       </p:ext>
     </p:extLst>
   </p:cSld>
   <p:clrMapOvr>
     <a:masterClrMapping/>
   </p:clrMapOvr>
+  <p:timing>
+    <p:tnLst>
+      <p:par>
+        <p:cTn id="1" dur="indefinite" restart="never" nodeType="tmRoot"/>
+      </p:par>
+    </p:tnLst>
+  </p:timing>
 </p:sld>
 </file>
 
@@ -10760,6 +10296,13 @@
   <p:clrMapOvr>
     <a:masterClrMapping/>
   </p:clrMapOvr>
+  <p:timing>
+    <p:tnLst>
+      <p:par>
+        <p:cTn id="1" dur="indefinite" restart="never" nodeType="tmRoot"/>
+      </p:par>
+    </p:tnLst>
+  </p:timing>
 </p:sld>
 </file>
 
@@ -10864,15 +10407,7 @@
             </a:pPr>
             <a:r>
               <a:rPr lang="en-US" sz="4000" dirty="0"/>
-              <a:t>                    parent: </a:t>
-            </a:r>
-            <a:r>
-              <a:rPr lang="en-US" sz="4000" dirty="0"/>
-              <a:t>null</a:t>
-            </a:r>
-            <a:r>
-              <a:rPr lang="en-US" sz="4000" dirty="0"/>
-              <a:t>,</a:t>
+              <a:t>                    parent: null,</a:t>
             </a:r>
           </a:p>
           <a:p>
@@ -11060,11 +10595,7 @@
             </a:pPr>
             <a:r>
               <a:rPr lang="en-US" sz="4000" dirty="0"/>
-              <a:t> </a:t>
-            </a:r>
-            <a:r>
-              <a:rPr lang="en-US" sz="4000" dirty="0"/>
-              <a:t>@foreach(var item in Model)</a:t>
+              <a:t> @foreach(var item in Model)</a:t>
             </a:r>
           </a:p>
           <a:p>
@@ -11285,11 +10816,7 @@
             </a:pPr>
             <a:r>
               <a:rPr lang="en-US" sz="4000" dirty="0"/>
-              <a:t> </a:t>
-            </a:r>
-            <a:r>
-              <a:rPr lang="en-US" sz="4000" dirty="0"/>
-              <a:t>@:items.push(newItem);</a:t>
+              <a:t> @:items.push(newItem);</a:t>
             </a:r>
           </a:p>
           <a:p>
@@ -11331,6 +10858,13 @@
   <p:clrMapOvr>
     <a:masterClrMapping/>
   </p:clrMapOvr>
+  <p:timing>
+    <p:tnLst>
+      <p:par>
+        <p:cTn id="1" dur="indefinite" restart="never" nodeType="tmRoot"/>
+      </p:par>
+    </p:tnLst>
+  </p:timing>
 </p:sld>
 </file>
 
@@ -12382,428 +11916,6 @@
 </file>
 
 <file path=ppt/slides/slide4.xml><?xml version="1.0" encoding="utf-8"?>
-<p:sld xmlns:a="http://schemas.openxmlformats.org/drawingml/2006/main" xmlns:r="http://schemas.openxmlformats.org/officeDocument/2006/relationships" xmlns:p="http://schemas.openxmlformats.org/presentationml/2006/main">
-  <p:cSld>
-    <p:spTree>
-      <p:nvGrpSpPr>
-        <p:cNvPr id="1" name=""/>
-        <p:cNvGrpSpPr/>
-        <p:nvPr/>
-      </p:nvGrpSpPr>
-      <p:grpSpPr>
-        <a:xfrm>
-          <a:off x="0" y="0"/>
-          <a:ext cx="0" cy="0"/>
-          <a:chOff x="0" y="0"/>
-          <a:chExt cx="0" cy="0"/>
-        </a:xfrm>
-      </p:grpSpPr>
-      <p:sp>
-        <p:nvSpPr>
-          <p:cNvPr id="2" name="Title 1"/>
-          <p:cNvSpPr>
-            <a:spLocks noGrp="1"/>
-          </p:cNvSpPr>
-          <p:nvPr>
-            <p:ph type="title"/>
-          </p:nvPr>
-        </p:nvSpPr>
-        <p:spPr/>
-        <p:txBody>
-          <a:bodyPr/>
-          <a:lstStyle/>
-          <a:p>
-            <a:endParaRPr lang="en-US" dirty="0"/>
-          </a:p>
-        </p:txBody>
-      </p:sp>
-      <p:sp>
-        <p:nvSpPr>
-          <p:cNvPr id="3" name="Content Placeholder 2"/>
-          <p:cNvSpPr>
-            <a:spLocks noGrp="1"/>
-          </p:cNvSpPr>
-          <p:nvPr>
-            <p:ph idx="1"/>
-          </p:nvPr>
-        </p:nvSpPr>
-        <p:spPr/>
-        <p:txBody>
-          <a:bodyPr/>
-          <a:lstStyle/>
-          <a:p>
-            <a:pPr marL="0" indent="0">
-              <a:buNone/>
-            </a:pPr>
-            <a:endParaRPr lang="en-US" dirty="0"/>
-          </a:p>
-        </p:txBody>
-      </p:sp>
-      <p:grpSp>
-        <p:nvGrpSpPr>
-          <p:cNvPr id="4" name="Canvas 1"/>
-          <p:cNvGrpSpPr/>
-          <p:nvPr/>
-        </p:nvGrpSpPr>
-        <p:grpSpPr>
-          <a:xfrm>
-            <a:off x="2117125" y="2430162"/>
-            <a:ext cx="5486400" cy="3200400"/>
-            <a:chOff x="0" y="0"/>
-            <a:chExt cx="5486400" cy="3200400"/>
-          </a:xfrm>
-        </p:grpSpPr>
-        <p:sp>
-          <p:nvSpPr>
-            <p:cNvPr id="5" name="Rectangle 4"/>
-            <p:cNvSpPr/>
-            <p:nvPr/>
-          </p:nvSpPr>
-          <p:spPr>
-            <a:xfrm>
-              <a:off x="0" y="0"/>
-              <a:ext cx="5486400" cy="3200400"/>
-            </a:xfrm>
-            <a:prstGeom prst="rect">
-              <a:avLst/>
-            </a:prstGeom>
-          </p:spPr>
-        </p:sp>
-        <p:sp>
-          <p:nvSpPr>
-            <p:cNvPr id="6" name="Rounded Rectangle 5"/>
-            <p:cNvSpPr/>
-            <p:nvPr/>
-          </p:nvSpPr>
-          <p:spPr>
-            <a:xfrm>
-              <a:off x="675861" y="278297"/>
-              <a:ext cx="3116911" cy="516834"/>
-            </a:xfrm>
-            <a:prstGeom prst="roundRect">
-              <a:avLst/>
-            </a:prstGeom>
-          </p:spPr>
-          <p:style>
-            <a:lnRef idx="1">
-              <a:schemeClr val="accent1"/>
-            </a:lnRef>
-            <a:fillRef idx="3">
-              <a:schemeClr val="accent1"/>
-            </a:fillRef>
-            <a:effectRef idx="2">
-              <a:schemeClr val="accent1"/>
-            </a:effectRef>
-            <a:fontRef idx="minor">
-              <a:schemeClr val="lt1"/>
-            </a:fontRef>
-          </p:style>
-          <p:txBody>
-            <a:bodyPr rot="0" spcFirstLastPara="0" vert="horz" wrap="square" lIns="91440" tIns="45720" rIns="91440" bIns="45720" numCol="1" spcCol="0" rtlCol="0" fromWordArt="0" anchor="ctr" anchorCtr="0" forceAA="0" compatLnSpc="1">
-              <a:prstTxWarp prst="textNoShape">
-                <a:avLst/>
-              </a:prstTxWarp>
-              <a:noAutofit/>
-            </a:bodyPr>
-            <a:lstStyle/>
-            <a:p>
-              <a:pPr marL="0" marR="0" algn="ctr">
-                <a:lnSpc>
-                  <a:spcPct val="107000"/>
-                </a:lnSpc>
-                <a:spcBef>
-                  <a:spcPts val="0"/>
-                </a:spcBef>
-                <a:spcAft>
-                  <a:spcPts val="800"/>
-                </a:spcAft>
-              </a:pPr>
-              <a:r>
-                <a:rPr lang="en-US" sz="1100">
-                  <a:effectLst/>
-                  <a:ea typeface="Calibri" panose="020F0502020204030204" pitchFamily="34" charset="0"/>
-                  <a:cs typeface="Times New Roman" panose="02020603050405020304" pitchFamily="18" charset="0"/>
-                </a:rPr>
-                <a:t>View</a:t>
-              </a:r>
-            </a:p>
-          </p:txBody>
-        </p:sp>
-        <p:sp>
-          <p:nvSpPr>
-            <p:cNvPr id="7" name="Rounded Rectangle 6"/>
-            <p:cNvSpPr/>
-            <p:nvPr/>
-          </p:nvSpPr>
-          <p:spPr>
-            <a:xfrm>
-              <a:off x="676192" y="847909"/>
-              <a:ext cx="3116580" cy="516255"/>
-            </a:xfrm>
-            <a:prstGeom prst="roundRect">
-              <a:avLst/>
-            </a:prstGeom>
-          </p:spPr>
-          <p:style>
-            <a:lnRef idx="1">
-              <a:schemeClr val="accent1"/>
-            </a:lnRef>
-            <a:fillRef idx="3">
-              <a:schemeClr val="accent1"/>
-            </a:fillRef>
-            <a:effectRef idx="2">
-              <a:schemeClr val="accent1"/>
-            </a:effectRef>
-            <a:fontRef idx="minor">
-              <a:schemeClr val="lt1"/>
-            </a:fontRef>
-          </p:style>
-          <p:txBody>
-            <a:bodyPr rot="0" spcFirstLastPara="0" vert="horz" wrap="square" lIns="91440" tIns="45720" rIns="91440" bIns="45720" numCol="1" spcCol="0" rtlCol="0" fromWordArt="0" anchor="ctr" anchorCtr="0" forceAA="0" compatLnSpc="1">
-              <a:prstTxWarp prst="textNoShape">
-                <a:avLst/>
-              </a:prstTxWarp>
-              <a:noAutofit/>
-            </a:bodyPr>
-            <a:lstStyle/>
-            <a:p>
-              <a:pPr marL="0" marR="0" algn="ctr">
-                <a:lnSpc>
-                  <a:spcPct val="106000"/>
-                </a:lnSpc>
-                <a:spcBef>
-                  <a:spcPts val="0"/>
-                </a:spcBef>
-                <a:spcAft>
-                  <a:spcPts val="800"/>
-                </a:spcAft>
-              </a:pPr>
-              <a:r>
-                <a:rPr lang="en-US" sz="1100">
-                  <a:effectLst/>
-                  <a:latin typeface="Times New Roman" panose="02020603050405020304" pitchFamily="18" charset="0"/>
-                  <a:ea typeface="Calibri" panose="020F0502020204030204" pitchFamily="34" charset="0"/>
-                </a:rPr>
-                <a:t>Action Controller</a:t>
-              </a:r>
-              <a:endParaRPr lang="en-US" sz="1200">
-                <a:effectLst/>
-                <a:latin typeface="Times New Roman" panose="02020603050405020304" pitchFamily="18" charset="0"/>
-                <a:ea typeface="Times New Roman" panose="02020603050405020304" pitchFamily="18" charset="0"/>
-              </a:endParaRPr>
-            </a:p>
-          </p:txBody>
-        </p:sp>
-        <p:sp>
-          <p:nvSpPr>
-            <p:cNvPr id="8" name="Rounded Rectangle 7"/>
-            <p:cNvSpPr/>
-            <p:nvPr/>
-          </p:nvSpPr>
-          <p:spPr>
-            <a:xfrm>
-              <a:off x="676192" y="1412453"/>
-              <a:ext cx="3116580" cy="516255"/>
-            </a:xfrm>
-            <a:prstGeom prst="roundRect">
-              <a:avLst/>
-            </a:prstGeom>
-          </p:spPr>
-          <p:style>
-            <a:lnRef idx="1">
-              <a:schemeClr val="accent1"/>
-            </a:lnRef>
-            <a:fillRef idx="3">
-              <a:schemeClr val="accent1"/>
-            </a:fillRef>
-            <a:effectRef idx="2">
-              <a:schemeClr val="accent1"/>
-            </a:effectRef>
-            <a:fontRef idx="minor">
-              <a:schemeClr val="lt1"/>
-            </a:fontRef>
-          </p:style>
-          <p:txBody>
-            <a:bodyPr rot="0" spcFirstLastPara="0" vert="horz" wrap="square" lIns="91440" tIns="45720" rIns="91440" bIns="45720" numCol="1" spcCol="0" rtlCol="0" fromWordArt="0" anchor="ctr" anchorCtr="0" forceAA="0" compatLnSpc="1">
-              <a:prstTxWarp prst="textNoShape">
-                <a:avLst/>
-              </a:prstTxWarp>
-              <a:noAutofit/>
-            </a:bodyPr>
-            <a:lstStyle/>
-            <a:p>
-              <a:pPr marL="0" marR="0" algn="ctr">
-                <a:lnSpc>
-                  <a:spcPct val="106000"/>
-                </a:lnSpc>
-                <a:spcBef>
-                  <a:spcPts val="0"/>
-                </a:spcBef>
-                <a:spcAft>
-                  <a:spcPts val="800"/>
-                </a:spcAft>
-              </a:pPr>
-              <a:r>
-                <a:rPr lang="en-US" sz="1100">
-                  <a:effectLst/>
-                  <a:latin typeface="Times New Roman" panose="02020603050405020304" pitchFamily="18" charset="0"/>
-                  <a:ea typeface="Calibri" panose="020F0502020204030204" pitchFamily="34" charset="0"/>
-                </a:rPr>
-                <a:t>Project Business Layer</a:t>
-              </a:r>
-              <a:endParaRPr lang="en-US" sz="1200">
-                <a:effectLst/>
-                <a:latin typeface="Times New Roman" panose="02020603050405020304" pitchFamily="18" charset="0"/>
-                <a:ea typeface="Times New Roman" panose="02020603050405020304" pitchFamily="18" charset="0"/>
-              </a:endParaRPr>
-            </a:p>
-          </p:txBody>
-        </p:sp>
-        <p:sp>
-          <p:nvSpPr>
-            <p:cNvPr id="9" name="Rounded Rectangle 8"/>
-            <p:cNvSpPr/>
-            <p:nvPr/>
-          </p:nvSpPr>
-          <p:spPr>
-            <a:xfrm>
-              <a:off x="676192" y="1976995"/>
-              <a:ext cx="3116580" cy="516255"/>
-            </a:xfrm>
-            <a:prstGeom prst="roundRect">
-              <a:avLst/>
-            </a:prstGeom>
-          </p:spPr>
-          <p:style>
-            <a:lnRef idx="1">
-              <a:schemeClr val="accent1"/>
-            </a:lnRef>
-            <a:fillRef idx="3">
-              <a:schemeClr val="accent1"/>
-            </a:fillRef>
-            <a:effectRef idx="2">
-              <a:schemeClr val="accent1"/>
-            </a:effectRef>
-            <a:fontRef idx="minor">
-              <a:schemeClr val="lt1"/>
-            </a:fontRef>
-          </p:style>
-          <p:txBody>
-            <a:bodyPr rot="0" spcFirstLastPara="0" vert="horz" wrap="square" lIns="91440" tIns="45720" rIns="91440" bIns="45720" numCol="1" spcCol="0" rtlCol="0" fromWordArt="0" anchor="ctr" anchorCtr="0" forceAA="0" compatLnSpc="1">
-              <a:prstTxWarp prst="textNoShape">
-                <a:avLst/>
-              </a:prstTxWarp>
-              <a:noAutofit/>
-            </a:bodyPr>
-            <a:lstStyle/>
-            <a:p>
-              <a:pPr marL="0" marR="0" algn="ctr">
-                <a:lnSpc>
-                  <a:spcPct val="106000"/>
-                </a:lnSpc>
-                <a:spcBef>
-                  <a:spcPts val="0"/>
-                </a:spcBef>
-                <a:spcAft>
-                  <a:spcPts val="800"/>
-                </a:spcAft>
-              </a:pPr>
-              <a:r>
-                <a:rPr lang="en-US" sz="1100">
-                  <a:effectLst/>
-                  <a:latin typeface="Times New Roman" panose="02020603050405020304" pitchFamily="18" charset="0"/>
-                  <a:ea typeface="Calibri" panose="020F0502020204030204" pitchFamily="34" charset="0"/>
-                </a:rPr>
-                <a:t>Project Data Layer</a:t>
-              </a:r>
-              <a:endParaRPr lang="en-US" sz="1200">
-                <a:effectLst/>
-                <a:latin typeface="Times New Roman" panose="02020603050405020304" pitchFamily="18" charset="0"/>
-                <a:ea typeface="Times New Roman" panose="02020603050405020304" pitchFamily="18" charset="0"/>
-              </a:endParaRPr>
-            </a:p>
-          </p:txBody>
-        </p:sp>
-        <p:sp>
-          <p:nvSpPr>
-            <p:cNvPr id="10" name="Rounded Rectangle 9"/>
-            <p:cNvSpPr/>
-            <p:nvPr/>
-          </p:nvSpPr>
-          <p:spPr>
-            <a:xfrm>
-              <a:off x="676192" y="2541537"/>
-              <a:ext cx="3116580" cy="516255"/>
-            </a:xfrm>
-            <a:prstGeom prst="roundRect">
-              <a:avLst/>
-            </a:prstGeom>
-          </p:spPr>
-          <p:style>
-            <a:lnRef idx="1">
-              <a:schemeClr val="accent1"/>
-            </a:lnRef>
-            <a:fillRef idx="3">
-              <a:schemeClr val="accent1"/>
-            </a:fillRef>
-            <a:effectRef idx="2">
-              <a:schemeClr val="accent1"/>
-            </a:effectRef>
-            <a:fontRef idx="minor">
-              <a:schemeClr val="lt1"/>
-            </a:fontRef>
-          </p:style>
-          <p:txBody>
-            <a:bodyPr rot="0" spcFirstLastPara="0" vert="horz" wrap="square" lIns="91440" tIns="45720" rIns="91440" bIns="45720" numCol="1" spcCol="0" rtlCol="0" fromWordArt="0" anchor="ctr" anchorCtr="0" forceAA="0" compatLnSpc="1">
-              <a:prstTxWarp prst="textNoShape">
-                <a:avLst/>
-              </a:prstTxWarp>
-              <a:noAutofit/>
-            </a:bodyPr>
-            <a:lstStyle/>
-            <a:p>
-              <a:pPr marL="0" marR="0" algn="ctr">
-                <a:lnSpc>
-                  <a:spcPct val="106000"/>
-                </a:lnSpc>
-                <a:spcBef>
-                  <a:spcPts val="0"/>
-                </a:spcBef>
-                <a:spcAft>
-                  <a:spcPts val="800"/>
-                </a:spcAft>
-              </a:pPr>
-              <a:r>
-                <a:rPr lang="en-US" sz="1100">
-                  <a:effectLst/>
-                  <a:latin typeface="Times New Roman" panose="02020603050405020304" pitchFamily="18" charset="0"/>
-                  <a:ea typeface="Calibri" panose="020F0502020204030204" pitchFamily="34" charset="0"/>
-                </a:rPr>
-                <a:t>Database</a:t>
-              </a:r>
-              <a:endParaRPr lang="en-US" sz="1200">
-                <a:effectLst/>
-                <a:latin typeface="Times New Roman" panose="02020603050405020304" pitchFamily="18" charset="0"/>
-                <a:ea typeface="Times New Roman" panose="02020603050405020304" pitchFamily="18" charset="0"/>
-              </a:endParaRPr>
-            </a:p>
-          </p:txBody>
-        </p:sp>
-      </p:grpSp>
-    </p:spTree>
-    <p:extLst>
-      <p:ext uri="{BB962C8B-B14F-4D97-AF65-F5344CB8AC3E}">
-        <p14:creationId xmlns:p14="http://schemas.microsoft.com/office/powerpoint/2010/main" val="3732072209"/>
-      </p:ext>
-    </p:extLst>
-  </p:cSld>
-  <p:clrMapOvr>
-    <a:masterClrMapping/>
-  </p:clrMapOvr>
-</p:sld>
-</file>
-
-<file path=ppt/slides/slide5.xml><?xml version="1.0" encoding="utf-8"?>
 <p:sld xmlns:a="http://schemas.openxmlformats.org/drawingml/2006/main" xmlns:r="http://schemas.openxmlformats.org/officeDocument/2006/relationships" xmlns:p="http://schemas.openxmlformats.org/presentationml/2006/main">
   <p:cSld>
     <p:spTree>
@@ -13839,7 +12951,7 @@
 </p:sld>
 </file>
 
-<file path=ppt/slides/slide6.xml><?xml version="1.0" encoding="utf-8"?>
+<file path=ppt/slides/slide5.xml><?xml version="1.0" encoding="utf-8"?>
 <p:sld xmlns:a="http://schemas.openxmlformats.org/drawingml/2006/main" xmlns:r="http://schemas.openxmlformats.org/officeDocument/2006/relationships" xmlns:p="http://schemas.openxmlformats.org/presentationml/2006/main">
   <p:cSld>
     <p:spTree>
@@ -15034,7 +14146,7 @@
 </p:sld>
 </file>
 
-<file path=ppt/slides/slide7.xml><?xml version="1.0" encoding="utf-8"?>
+<file path=ppt/slides/slide6.xml><?xml version="1.0" encoding="utf-8"?>
 <p:sld xmlns:a="http://schemas.openxmlformats.org/drawingml/2006/main" xmlns:r="http://schemas.openxmlformats.org/officeDocument/2006/relationships" xmlns:p="http://schemas.openxmlformats.org/presentationml/2006/main">
   <p:cSld>
     <p:spTree>
@@ -15116,7 +14228,7 @@
 </p:sld>
 </file>
 
-<file path=ppt/slides/slide8.xml><?xml version="1.0" encoding="utf-8"?>
+<file path=ppt/slides/slide7.xml><?xml version="1.0" encoding="utf-8"?>
 <p:sld xmlns:a="http://schemas.openxmlformats.org/drawingml/2006/main" xmlns:r="http://schemas.openxmlformats.org/officeDocument/2006/relationships" xmlns:p="http://schemas.openxmlformats.org/presentationml/2006/main">
   <p:cSld>
     <p:spTree>
@@ -15289,7 +14401,7 @@
 </p:sld>
 </file>
 
-<file path=ppt/slides/slide9.xml><?xml version="1.0" encoding="utf-8"?>
+<file path=ppt/slides/slide8.xml><?xml version="1.0" encoding="utf-8"?>
 <p:sld xmlns:a="http://schemas.openxmlformats.org/drawingml/2006/main" xmlns:r="http://schemas.openxmlformats.org/officeDocument/2006/relationships" xmlns:p="http://schemas.openxmlformats.org/presentationml/2006/main">
   <p:cSld>
     <p:spTree>
@@ -15367,6 +14479,1167 @@
         <p:cTn id="1" dur="indefinite" restart="never" nodeType="tmRoot"/>
       </p:par>
     </p:tnLst>
+  </p:timing>
+</p:sld>
+</file>
+
+<file path=ppt/slides/slide9.xml><?xml version="1.0" encoding="utf-8"?>
+<p:sld xmlns:a="http://schemas.openxmlformats.org/drawingml/2006/main" xmlns:r="http://schemas.openxmlformats.org/officeDocument/2006/relationships" xmlns:p="http://schemas.openxmlformats.org/presentationml/2006/main">
+  <p:cSld>
+    <p:spTree>
+      <p:nvGrpSpPr>
+        <p:cNvPr id="1" name=""/>
+        <p:cNvGrpSpPr/>
+        <p:nvPr/>
+      </p:nvGrpSpPr>
+      <p:grpSpPr>
+        <a:xfrm>
+          <a:off x="0" y="0"/>
+          <a:ext cx="0" cy="0"/>
+          <a:chOff x="0" y="0"/>
+          <a:chExt cx="0" cy="0"/>
+        </a:xfrm>
+      </p:grpSpPr>
+      <p:sp>
+        <p:nvSpPr>
+          <p:cNvPr id="2" name="Title 1"/>
+          <p:cNvSpPr>
+            <a:spLocks noGrp="1"/>
+          </p:cNvSpPr>
+          <p:nvPr>
+            <p:ph type="title"/>
+          </p:nvPr>
+        </p:nvSpPr>
+        <p:spPr/>
+        <p:txBody>
+          <a:bodyPr/>
+          <a:lstStyle/>
+          <a:p>
+            <a:r>
+              <a:rPr lang="en-US" dirty="0"/>
+              <a:t>Grading Scheme</a:t>
+            </a:r>
+          </a:p>
+        </p:txBody>
+      </p:sp>
+      <p:sp>
+        <p:nvSpPr>
+          <p:cNvPr id="3" name="Content Placeholder 2"/>
+          <p:cNvSpPr>
+            <a:spLocks noGrp="1"/>
+          </p:cNvSpPr>
+          <p:nvPr>
+            <p:ph idx="1"/>
+          </p:nvPr>
+        </p:nvSpPr>
+        <p:spPr>
+          <a:xfrm>
+            <a:off x="790769" y="1509637"/>
+            <a:ext cx="10515600" cy="4351338"/>
+          </a:xfrm>
+        </p:spPr>
+        <p:txBody>
+          <a:bodyPr/>
+          <a:lstStyle/>
+          <a:p>
+            <a:pPr marL="0" indent="0">
+              <a:buNone/>
+            </a:pPr>
+            <a:endParaRPr lang="en-US" dirty="0">
+              <a:solidFill>
+                <a:srgbClr val="000000"/>
+              </a:solidFill>
+              <a:latin typeface="Calibri"/>
+              <a:cs typeface="Calibri"/>
+            </a:endParaRPr>
+          </a:p>
+        </p:txBody>
+      </p:sp>
+      <p:pic>
+        <p:nvPicPr>
+          <p:cNvPr id="4" name="Picture 3"/>
+          <p:cNvPicPr>
+            <a:picLocks noChangeAspect="1"/>
+          </p:cNvPicPr>
+          <p:nvPr/>
+        </p:nvPicPr>
+        <p:blipFill>
+          <a:blip r:embed="rId3"/>
+          <a:stretch>
+            <a:fillRect/>
+          </a:stretch>
+        </p:blipFill>
+        <p:spPr>
+          <a:xfrm>
+            <a:off x="7089852" y="2285120"/>
+            <a:ext cx="1749312" cy="316989"/>
+          </a:xfrm>
+          <a:prstGeom prst="rect">
+            <a:avLst/>
+          </a:prstGeom>
+        </p:spPr>
+      </p:pic>
+      <p:pic>
+        <p:nvPicPr>
+          <p:cNvPr id="7" name="Picture 6"/>
+          <p:cNvPicPr>
+            <a:picLocks noChangeAspect="1"/>
+          </p:cNvPicPr>
+          <p:nvPr/>
+        </p:nvPicPr>
+        <p:blipFill>
+          <a:blip r:embed="rId4"/>
+          <a:stretch>
+            <a:fillRect/>
+          </a:stretch>
+        </p:blipFill>
+        <p:spPr>
+          <a:xfrm>
+            <a:off x="7081062" y="2547745"/>
+            <a:ext cx="1498187" cy="357974"/>
+          </a:xfrm>
+          <a:prstGeom prst="rect">
+            <a:avLst/>
+          </a:prstGeom>
+        </p:spPr>
+      </p:pic>
+      <p:pic>
+        <p:nvPicPr>
+          <p:cNvPr id="9" name="Picture 8"/>
+          <p:cNvPicPr>
+            <a:picLocks noChangeAspect="1"/>
+          </p:cNvPicPr>
+          <p:nvPr/>
+        </p:nvPicPr>
+        <p:blipFill>
+          <a:blip r:embed="rId5"/>
+          <a:stretch>
+            <a:fillRect/>
+          </a:stretch>
+        </p:blipFill>
+        <p:spPr>
+          <a:xfrm>
+            <a:off x="7098107" y="2832073"/>
+            <a:ext cx="1410168" cy="424420"/>
+          </a:xfrm>
+          <a:prstGeom prst="rect">
+            <a:avLst/>
+          </a:prstGeom>
+        </p:spPr>
+      </p:pic>
+      <p:pic>
+        <p:nvPicPr>
+          <p:cNvPr id="10" name="Picture 9"/>
+          <p:cNvPicPr>
+            <a:picLocks noChangeAspect="1"/>
+          </p:cNvPicPr>
+          <p:nvPr/>
+        </p:nvPicPr>
+        <p:blipFill>
+          <a:blip r:embed="rId6"/>
+          <a:stretch>
+            <a:fillRect/>
+          </a:stretch>
+        </p:blipFill>
+        <p:spPr>
+          <a:xfrm>
+            <a:off x="7120171" y="3164788"/>
+            <a:ext cx="2066847" cy="397964"/>
+          </a:xfrm>
+          <a:prstGeom prst="rect">
+            <a:avLst/>
+          </a:prstGeom>
+        </p:spPr>
+      </p:pic>
+      <p:pic>
+        <p:nvPicPr>
+          <p:cNvPr id="11" name="Picture 10"/>
+          <p:cNvPicPr>
+            <a:picLocks noChangeAspect="1"/>
+          </p:cNvPicPr>
+          <p:nvPr/>
+        </p:nvPicPr>
+        <p:blipFill>
+          <a:blip r:embed="rId7"/>
+          <a:stretch>
+            <a:fillRect/>
+          </a:stretch>
+        </p:blipFill>
+        <p:spPr>
+          <a:xfrm>
+            <a:off x="7098106" y="3468399"/>
+            <a:ext cx="1932683" cy="372132"/>
+          </a:xfrm>
+          <a:prstGeom prst="rect">
+            <a:avLst/>
+          </a:prstGeom>
+        </p:spPr>
+      </p:pic>
+      <p:pic>
+        <p:nvPicPr>
+          <p:cNvPr id="12" name="Picture 11"/>
+          <p:cNvPicPr>
+            <a:picLocks noChangeAspect="1"/>
+          </p:cNvPicPr>
+          <p:nvPr/>
+        </p:nvPicPr>
+        <p:blipFill>
+          <a:blip r:embed="rId8"/>
+          <a:stretch>
+            <a:fillRect/>
+          </a:stretch>
+        </p:blipFill>
+        <p:spPr>
+          <a:xfrm>
+            <a:off x="7089852" y="3785872"/>
+            <a:ext cx="1866603" cy="370673"/>
+          </a:xfrm>
+          <a:prstGeom prst="rect">
+            <a:avLst/>
+          </a:prstGeom>
+        </p:spPr>
+      </p:pic>
+      <p:pic>
+        <p:nvPicPr>
+          <p:cNvPr id="13" name="Picture 12"/>
+          <p:cNvPicPr>
+            <a:picLocks noChangeAspect="1"/>
+          </p:cNvPicPr>
+          <p:nvPr/>
+        </p:nvPicPr>
+        <p:blipFill>
+          <a:blip r:embed="rId9"/>
+          <a:stretch>
+            <a:fillRect/>
+          </a:stretch>
+        </p:blipFill>
+        <p:spPr>
+          <a:xfrm>
+            <a:off x="1229545" y="1908868"/>
+            <a:ext cx="5442404" cy="3219450"/>
+          </a:xfrm>
+          <a:prstGeom prst="rect">
+            <a:avLst/>
+          </a:prstGeom>
+        </p:spPr>
+      </p:pic>
+      <p:sp>
+        <p:nvSpPr>
+          <p:cNvPr id="5" name="Rectangle 4"/>
+          <p:cNvSpPr/>
+          <p:nvPr/>
+        </p:nvSpPr>
+        <p:spPr>
+          <a:xfrm>
+            <a:off x="4138889" y="2138748"/>
+            <a:ext cx="1509681" cy="461665"/>
+          </a:xfrm>
+          <a:prstGeom prst="rect">
+            <a:avLst/>
+          </a:prstGeom>
+          <a:noFill/>
+        </p:spPr>
+        <p:txBody>
+          <a:bodyPr wrap="square" lIns="91440" tIns="45720" rIns="91440" bIns="45720">
+            <a:spAutoFit/>
+          </a:bodyPr>
+          <a:lstStyle/>
+          <a:p>
+            <a:pPr algn="ctr"/>
+            <a:r>
+              <a:rPr lang="en-US" sz="2400" b="0" cap="none" spc="0" dirty="0" smtClean="0">
+                <a:ln w="0"/>
+                <a:solidFill>
+                  <a:schemeClr val="tx1"/>
+                </a:solidFill>
+                <a:effectLst>
+                  <a:outerShdw blurRad="38100" dist="19050" dir="2700000" algn="tl" rotWithShape="0">
+                    <a:schemeClr val="dk1">
+                      <a:alpha val="40000"/>
+                    </a:schemeClr>
+                  </a:outerShdw>
+                </a:effectLst>
+              </a:rPr>
+              <a:t>20%</a:t>
+            </a:r>
+            <a:endParaRPr lang="en-US" sz="2400" b="0" cap="none" spc="0" dirty="0">
+              <a:ln w="0"/>
+              <a:solidFill>
+                <a:schemeClr val="tx1"/>
+              </a:solidFill>
+              <a:effectLst>
+                <a:outerShdw blurRad="38100" dist="19050" dir="2700000" algn="tl" rotWithShape="0">
+                  <a:schemeClr val="dk1">
+                    <a:alpha val="40000"/>
+                  </a:schemeClr>
+                </a:outerShdw>
+              </a:effectLst>
+            </a:endParaRPr>
+          </a:p>
+        </p:txBody>
+      </p:sp>
+      <p:sp>
+        <p:nvSpPr>
+          <p:cNvPr id="6" name="Rectangle 5"/>
+          <p:cNvSpPr/>
+          <p:nvPr/>
+        </p:nvSpPr>
+        <p:spPr>
+          <a:xfrm>
+            <a:off x="5426645" y="2912698"/>
+            <a:ext cx="692167" cy="461665"/>
+          </a:xfrm>
+          <a:prstGeom prst="rect">
+            <a:avLst/>
+          </a:prstGeom>
+          <a:noFill/>
+        </p:spPr>
+        <p:txBody>
+          <a:bodyPr wrap="none" lIns="91440" tIns="45720" rIns="91440" bIns="45720">
+            <a:spAutoFit/>
+          </a:bodyPr>
+          <a:lstStyle/>
+          <a:p>
+            <a:pPr algn="ctr"/>
+            <a:r>
+              <a:rPr lang="en-US" sz="2400" b="0" cap="none" spc="0" dirty="0" smtClean="0">
+                <a:ln w="0"/>
+                <a:solidFill>
+                  <a:schemeClr val="tx1"/>
+                </a:solidFill>
+                <a:effectLst>
+                  <a:outerShdw blurRad="38100" dist="19050" dir="2700000" algn="tl" rotWithShape="0">
+                    <a:schemeClr val="dk1">
+                      <a:alpha val="40000"/>
+                    </a:schemeClr>
+                  </a:outerShdw>
+                </a:effectLst>
+              </a:rPr>
+              <a:t>15%</a:t>
+            </a:r>
+            <a:endParaRPr lang="en-US" sz="2400" b="0" cap="none" spc="0" dirty="0">
+              <a:ln w="0"/>
+              <a:solidFill>
+                <a:schemeClr val="tx1"/>
+              </a:solidFill>
+              <a:effectLst>
+                <a:outerShdw blurRad="38100" dist="19050" dir="2700000" algn="tl" rotWithShape="0">
+                  <a:schemeClr val="dk1">
+                    <a:alpha val="40000"/>
+                  </a:schemeClr>
+                </a:outerShdw>
+              </a:effectLst>
+            </a:endParaRPr>
+          </a:p>
+        </p:txBody>
+      </p:sp>
+      <p:sp>
+        <p:nvSpPr>
+          <p:cNvPr id="8" name="Rectangle 7"/>
+          <p:cNvSpPr/>
+          <p:nvPr/>
+        </p:nvSpPr>
+        <p:spPr>
+          <a:xfrm>
+            <a:off x="4418531" y="3518593"/>
+            <a:ext cx="692167" cy="461665"/>
+          </a:xfrm>
+          <a:prstGeom prst="rect">
+            <a:avLst/>
+          </a:prstGeom>
+          <a:noFill/>
+        </p:spPr>
+        <p:txBody>
+          <a:bodyPr wrap="none" lIns="91440" tIns="45720" rIns="91440" bIns="45720">
+            <a:spAutoFit/>
+          </a:bodyPr>
+          <a:lstStyle/>
+          <a:p>
+            <a:pPr algn="ctr"/>
+            <a:r>
+              <a:rPr lang="en-US" sz="2400" b="0" cap="none" spc="0" dirty="0" smtClean="0">
+                <a:ln w="0"/>
+                <a:solidFill>
+                  <a:schemeClr val="tx1"/>
+                </a:solidFill>
+                <a:effectLst>
+                  <a:outerShdw blurRad="38100" dist="19050" dir="2700000" algn="tl" rotWithShape="0">
+                    <a:schemeClr val="dk1">
+                      <a:alpha val="40000"/>
+                    </a:schemeClr>
+                  </a:outerShdw>
+                </a:effectLst>
+              </a:rPr>
+              <a:t>15%</a:t>
+            </a:r>
+            <a:endParaRPr lang="en-US" sz="2400" b="0" cap="none" spc="0" dirty="0">
+              <a:ln w="0"/>
+              <a:solidFill>
+                <a:schemeClr val="tx1"/>
+              </a:solidFill>
+              <a:effectLst>
+                <a:outerShdw blurRad="38100" dist="19050" dir="2700000" algn="tl" rotWithShape="0">
+                  <a:schemeClr val="dk1">
+                    <a:alpha val="40000"/>
+                  </a:schemeClr>
+                </a:outerShdw>
+              </a:effectLst>
+            </a:endParaRPr>
+          </a:p>
+        </p:txBody>
+      </p:sp>
+      <p:sp>
+        <p:nvSpPr>
+          <p:cNvPr id="14" name="Rectangle 13"/>
+          <p:cNvSpPr/>
+          <p:nvPr/>
+        </p:nvSpPr>
+        <p:spPr>
+          <a:xfrm>
+            <a:off x="2414738" y="3167134"/>
+            <a:ext cx="692167" cy="461665"/>
+          </a:xfrm>
+          <a:prstGeom prst="rect">
+            <a:avLst/>
+          </a:prstGeom>
+          <a:noFill/>
+        </p:spPr>
+        <p:txBody>
+          <a:bodyPr wrap="none" lIns="91440" tIns="45720" rIns="91440" bIns="45720">
+            <a:spAutoFit/>
+          </a:bodyPr>
+          <a:lstStyle/>
+          <a:p>
+            <a:pPr algn="ctr"/>
+            <a:r>
+              <a:rPr lang="en-US" sz="2400" b="0" cap="none" spc="0" dirty="0" smtClean="0">
+                <a:ln w="0"/>
+                <a:solidFill>
+                  <a:schemeClr val="tx1"/>
+                </a:solidFill>
+                <a:effectLst>
+                  <a:outerShdw blurRad="38100" dist="19050" dir="2700000" algn="tl" rotWithShape="0">
+                    <a:schemeClr val="dk1">
+                      <a:alpha val="40000"/>
+                    </a:schemeClr>
+                  </a:outerShdw>
+                </a:effectLst>
+              </a:rPr>
+              <a:t>30%</a:t>
+            </a:r>
+            <a:endParaRPr lang="en-US" sz="2400" b="0" cap="none" spc="0" dirty="0">
+              <a:ln w="0"/>
+              <a:solidFill>
+                <a:schemeClr val="tx1"/>
+              </a:solidFill>
+              <a:effectLst>
+                <a:outerShdw blurRad="38100" dist="19050" dir="2700000" algn="tl" rotWithShape="0">
+                  <a:schemeClr val="dk1">
+                    <a:alpha val="40000"/>
+                  </a:schemeClr>
+                </a:outerShdw>
+              </a:effectLst>
+            </a:endParaRPr>
+          </a:p>
+        </p:txBody>
+      </p:sp>
+      <p:sp>
+        <p:nvSpPr>
+          <p:cNvPr id="15" name="Rectangle 14"/>
+          <p:cNvSpPr/>
+          <p:nvPr/>
+        </p:nvSpPr>
+        <p:spPr>
+          <a:xfrm>
+            <a:off x="2254173" y="2275169"/>
+            <a:ext cx="692167" cy="461665"/>
+          </a:xfrm>
+          <a:prstGeom prst="rect">
+            <a:avLst/>
+          </a:prstGeom>
+          <a:noFill/>
+        </p:spPr>
+        <p:txBody>
+          <a:bodyPr wrap="none" lIns="91440" tIns="45720" rIns="91440" bIns="45720">
+            <a:spAutoFit/>
+          </a:bodyPr>
+          <a:lstStyle/>
+          <a:p>
+            <a:pPr algn="ctr"/>
+            <a:r>
+              <a:rPr lang="en-US" sz="2400" b="0" cap="none" spc="0" dirty="0" smtClean="0">
+                <a:ln w="0"/>
+                <a:solidFill>
+                  <a:schemeClr val="tx1"/>
+                </a:solidFill>
+                <a:effectLst>
+                  <a:outerShdw blurRad="38100" dist="19050" dir="2700000" algn="tl" rotWithShape="0">
+                    <a:schemeClr val="dk1">
+                      <a:alpha val="40000"/>
+                    </a:schemeClr>
+                  </a:outerShdw>
+                </a:effectLst>
+              </a:rPr>
+              <a:t>10%</a:t>
+            </a:r>
+            <a:endParaRPr lang="en-US" sz="2400" b="0" cap="none" spc="0" dirty="0">
+              <a:ln w="0"/>
+              <a:solidFill>
+                <a:schemeClr val="tx1"/>
+              </a:solidFill>
+              <a:effectLst>
+                <a:outerShdw blurRad="38100" dist="19050" dir="2700000" algn="tl" rotWithShape="0">
+                  <a:schemeClr val="dk1">
+                    <a:alpha val="40000"/>
+                  </a:schemeClr>
+                </a:outerShdw>
+              </a:effectLst>
+            </a:endParaRPr>
+          </a:p>
+        </p:txBody>
+      </p:sp>
+      <p:sp>
+        <p:nvSpPr>
+          <p:cNvPr id="16" name="Rectangle 15"/>
+          <p:cNvSpPr/>
+          <p:nvPr/>
+        </p:nvSpPr>
+        <p:spPr>
+          <a:xfrm>
+            <a:off x="3166330" y="2017900"/>
+            <a:ext cx="692167" cy="461665"/>
+          </a:xfrm>
+          <a:prstGeom prst="rect">
+            <a:avLst/>
+          </a:prstGeom>
+          <a:noFill/>
+        </p:spPr>
+        <p:txBody>
+          <a:bodyPr wrap="none" lIns="91440" tIns="45720" rIns="91440" bIns="45720">
+            <a:spAutoFit/>
+          </a:bodyPr>
+          <a:lstStyle/>
+          <a:p>
+            <a:pPr algn="ctr"/>
+            <a:r>
+              <a:rPr lang="en-US" sz="2400" b="0" cap="none" spc="0" dirty="0" smtClean="0">
+                <a:ln w="0"/>
+                <a:solidFill>
+                  <a:schemeClr val="tx1"/>
+                </a:solidFill>
+                <a:effectLst>
+                  <a:outerShdw blurRad="38100" dist="19050" dir="2700000" algn="tl" rotWithShape="0">
+                    <a:schemeClr val="dk1">
+                      <a:alpha val="40000"/>
+                    </a:schemeClr>
+                  </a:outerShdw>
+                </a:effectLst>
+              </a:rPr>
+              <a:t>10%</a:t>
+            </a:r>
+            <a:endParaRPr lang="en-US" sz="2400" b="0" cap="none" spc="0" dirty="0">
+              <a:ln w="0"/>
+              <a:solidFill>
+                <a:schemeClr val="tx1"/>
+              </a:solidFill>
+              <a:effectLst>
+                <a:outerShdw blurRad="38100" dist="19050" dir="2700000" algn="tl" rotWithShape="0">
+                  <a:schemeClr val="dk1">
+                    <a:alpha val="40000"/>
+                  </a:schemeClr>
+                </a:outerShdw>
+              </a:effectLst>
+            </a:endParaRPr>
+          </a:p>
+        </p:txBody>
+      </p:sp>
+    </p:spTree>
+    <p:extLst>
+      <p:ext uri="{BB962C8B-B14F-4D97-AF65-F5344CB8AC3E}">
+        <p14:creationId xmlns:p14="http://schemas.microsoft.com/office/powerpoint/2010/main" val="1315062242"/>
+      </p:ext>
+    </p:extLst>
+  </p:cSld>
+  <p:clrMapOvr>
+    <a:masterClrMapping/>
+  </p:clrMapOvr>
+  <p:timing>
+    <p:tnLst>
+      <p:par>
+        <p:cTn id="1" dur="indefinite" restart="never" nodeType="tmRoot">
+          <p:childTnLst>
+            <p:seq concurrent="1" nextAc="seek">
+              <p:cTn id="2" dur="indefinite" nodeType="mainSeq">
+                <p:childTnLst>
+                  <p:par>
+                    <p:cTn id="3" fill="hold">
+                      <p:stCondLst>
+                        <p:cond delay="indefinite"/>
+                        <p:cond evt="onBegin" delay="0">
+                          <p:tn val="2"/>
+                        </p:cond>
+                      </p:stCondLst>
+                      <p:childTnLst>
+                        <p:par>
+                          <p:cTn id="4" fill="hold">
+                            <p:stCondLst>
+                              <p:cond delay="0"/>
+                            </p:stCondLst>
+                            <p:childTnLst>
+                              <p:par>
+                                <p:cTn id="5" presetID="10" presetClass="entr" presetSubtype="0" fill="hold" grpId="0" nodeType="afterEffect">
+                                  <p:stCondLst>
+                                    <p:cond delay="500"/>
+                                  </p:stCondLst>
+                                  <p:childTnLst>
+                                    <p:set>
+                                      <p:cBhvr>
+                                        <p:cTn id="6" dur="1" fill="hold">
+                                          <p:stCondLst>
+                                            <p:cond delay="0"/>
+                                          </p:stCondLst>
+                                        </p:cTn>
+                                        <p:tgtEl>
+                                          <p:spTgt spid="5"/>
+                                        </p:tgtEl>
+                                        <p:attrNameLst>
+                                          <p:attrName>style.visibility</p:attrName>
+                                        </p:attrNameLst>
+                                      </p:cBhvr>
+                                      <p:to>
+                                        <p:strVal val="visible"/>
+                                      </p:to>
+                                    </p:set>
+                                    <p:animEffect transition="in" filter="fade">
+                                      <p:cBhvr>
+                                        <p:cTn id="7" dur="500"/>
+                                        <p:tgtEl>
+                                          <p:spTgt spid="5"/>
+                                        </p:tgtEl>
+                                      </p:cBhvr>
+                                    </p:animEffect>
+                                  </p:childTnLst>
+                                </p:cTn>
+                              </p:par>
+                            </p:childTnLst>
+                          </p:cTn>
+                        </p:par>
+                        <p:par>
+                          <p:cTn id="8" fill="hold">
+                            <p:stCondLst>
+                              <p:cond delay="1000"/>
+                            </p:stCondLst>
+                            <p:childTnLst>
+                              <p:par>
+                                <p:cTn id="9" presetID="10" presetClass="entr" presetSubtype="0" fill="hold" nodeType="afterEffect">
+                                  <p:stCondLst>
+                                    <p:cond delay="0"/>
+                                  </p:stCondLst>
+                                  <p:childTnLst>
+                                    <p:set>
+                                      <p:cBhvr>
+                                        <p:cTn id="10" dur="1" fill="hold">
+                                          <p:stCondLst>
+                                            <p:cond delay="0"/>
+                                          </p:stCondLst>
+                                        </p:cTn>
+                                        <p:tgtEl>
+                                          <p:spTgt spid="4"/>
+                                        </p:tgtEl>
+                                        <p:attrNameLst>
+                                          <p:attrName>style.visibility</p:attrName>
+                                        </p:attrNameLst>
+                                      </p:cBhvr>
+                                      <p:to>
+                                        <p:strVal val="visible"/>
+                                      </p:to>
+                                    </p:set>
+                                    <p:animEffect transition="in" filter="fade">
+                                      <p:cBhvr>
+                                        <p:cTn id="11" dur="250"/>
+                                        <p:tgtEl>
+                                          <p:spTgt spid="4"/>
+                                        </p:tgtEl>
+                                      </p:cBhvr>
+                                    </p:animEffect>
+                                  </p:childTnLst>
+                                </p:cTn>
+                              </p:par>
+                            </p:childTnLst>
+                          </p:cTn>
+                        </p:par>
+                      </p:childTnLst>
+                    </p:cTn>
+                  </p:par>
+                  <p:par>
+                    <p:cTn id="12" fill="hold">
+                      <p:stCondLst>
+                        <p:cond delay="indefinite"/>
+                      </p:stCondLst>
+                      <p:childTnLst>
+                        <p:par>
+                          <p:cTn id="13" fill="hold">
+                            <p:stCondLst>
+                              <p:cond delay="0"/>
+                            </p:stCondLst>
+                            <p:childTnLst>
+                              <p:par>
+                                <p:cTn id="14" presetID="10" presetClass="entr" presetSubtype="0" fill="hold" nodeType="clickEffect">
+                                  <p:stCondLst>
+                                    <p:cond delay="0"/>
+                                  </p:stCondLst>
+                                  <p:childTnLst>
+                                    <p:set>
+                                      <p:cBhvr>
+                                        <p:cTn id="15" dur="1" fill="hold">
+                                          <p:stCondLst>
+                                            <p:cond delay="0"/>
+                                          </p:stCondLst>
+                                        </p:cTn>
+                                        <p:tgtEl>
+                                          <p:spTgt spid="7"/>
+                                        </p:tgtEl>
+                                        <p:attrNameLst>
+                                          <p:attrName>style.visibility</p:attrName>
+                                        </p:attrNameLst>
+                                      </p:cBhvr>
+                                      <p:to>
+                                        <p:strVal val="visible"/>
+                                      </p:to>
+                                    </p:set>
+                                    <p:animEffect transition="in" filter="fade">
+                                      <p:cBhvr>
+                                        <p:cTn id="16" dur="500"/>
+                                        <p:tgtEl>
+                                          <p:spTgt spid="7"/>
+                                        </p:tgtEl>
+                                      </p:cBhvr>
+                                    </p:animEffect>
+                                  </p:childTnLst>
+                                </p:cTn>
+                              </p:par>
+                              <p:par>
+                                <p:cTn id="17" presetID="10" presetClass="entr" presetSubtype="0" fill="hold" grpId="0" nodeType="withEffect">
+                                  <p:stCondLst>
+                                    <p:cond delay="0"/>
+                                  </p:stCondLst>
+                                  <p:childTnLst>
+                                    <p:set>
+                                      <p:cBhvr>
+                                        <p:cTn id="18" dur="1" fill="hold">
+                                          <p:stCondLst>
+                                            <p:cond delay="0"/>
+                                          </p:stCondLst>
+                                        </p:cTn>
+                                        <p:tgtEl>
+                                          <p:spTgt spid="6"/>
+                                        </p:tgtEl>
+                                        <p:attrNameLst>
+                                          <p:attrName>style.visibility</p:attrName>
+                                        </p:attrNameLst>
+                                      </p:cBhvr>
+                                      <p:to>
+                                        <p:strVal val="visible"/>
+                                      </p:to>
+                                    </p:set>
+                                    <p:animEffect transition="in" filter="fade">
+                                      <p:cBhvr>
+                                        <p:cTn id="19" dur="500"/>
+                                        <p:tgtEl>
+                                          <p:spTgt spid="6"/>
+                                        </p:tgtEl>
+                                      </p:cBhvr>
+                                    </p:animEffect>
+                                  </p:childTnLst>
+                                </p:cTn>
+                              </p:par>
+                            </p:childTnLst>
+                          </p:cTn>
+                        </p:par>
+                      </p:childTnLst>
+                    </p:cTn>
+                  </p:par>
+                  <p:par>
+                    <p:cTn id="20" fill="hold">
+                      <p:stCondLst>
+                        <p:cond delay="indefinite"/>
+                      </p:stCondLst>
+                      <p:childTnLst>
+                        <p:par>
+                          <p:cTn id="21" fill="hold">
+                            <p:stCondLst>
+                              <p:cond delay="0"/>
+                            </p:stCondLst>
+                            <p:childTnLst>
+                              <p:par>
+                                <p:cTn id="22" presetID="10" presetClass="entr" presetSubtype="0" fill="hold" nodeType="clickEffect">
+                                  <p:stCondLst>
+                                    <p:cond delay="0"/>
+                                  </p:stCondLst>
+                                  <p:childTnLst>
+                                    <p:set>
+                                      <p:cBhvr>
+                                        <p:cTn id="23" dur="1" fill="hold">
+                                          <p:stCondLst>
+                                            <p:cond delay="0"/>
+                                          </p:stCondLst>
+                                        </p:cTn>
+                                        <p:tgtEl>
+                                          <p:spTgt spid="9"/>
+                                        </p:tgtEl>
+                                        <p:attrNameLst>
+                                          <p:attrName>style.visibility</p:attrName>
+                                        </p:attrNameLst>
+                                      </p:cBhvr>
+                                      <p:to>
+                                        <p:strVal val="visible"/>
+                                      </p:to>
+                                    </p:set>
+                                    <p:animEffect transition="in" filter="fade">
+                                      <p:cBhvr>
+                                        <p:cTn id="24" dur="500"/>
+                                        <p:tgtEl>
+                                          <p:spTgt spid="9"/>
+                                        </p:tgtEl>
+                                      </p:cBhvr>
+                                    </p:animEffect>
+                                  </p:childTnLst>
+                                </p:cTn>
+                              </p:par>
+                              <p:par>
+                                <p:cTn id="25" presetID="10" presetClass="entr" presetSubtype="0" fill="hold" grpId="0" nodeType="withEffect">
+                                  <p:stCondLst>
+                                    <p:cond delay="0"/>
+                                  </p:stCondLst>
+                                  <p:childTnLst>
+                                    <p:set>
+                                      <p:cBhvr>
+                                        <p:cTn id="26" dur="1" fill="hold">
+                                          <p:stCondLst>
+                                            <p:cond delay="0"/>
+                                          </p:stCondLst>
+                                        </p:cTn>
+                                        <p:tgtEl>
+                                          <p:spTgt spid="8"/>
+                                        </p:tgtEl>
+                                        <p:attrNameLst>
+                                          <p:attrName>style.visibility</p:attrName>
+                                        </p:attrNameLst>
+                                      </p:cBhvr>
+                                      <p:to>
+                                        <p:strVal val="visible"/>
+                                      </p:to>
+                                    </p:set>
+                                    <p:animEffect transition="in" filter="fade">
+                                      <p:cBhvr>
+                                        <p:cTn id="27" dur="500"/>
+                                        <p:tgtEl>
+                                          <p:spTgt spid="8"/>
+                                        </p:tgtEl>
+                                      </p:cBhvr>
+                                    </p:animEffect>
+                                  </p:childTnLst>
+                                </p:cTn>
+                              </p:par>
+                            </p:childTnLst>
+                          </p:cTn>
+                        </p:par>
+                      </p:childTnLst>
+                    </p:cTn>
+                  </p:par>
+                  <p:par>
+                    <p:cTn id="28" fill="hold">
+                      <p:stCondLst>
+                        <p:cond delay="indefinite"/>
+                      </p:stCondLst>
+                      <p:childTnLst>
+                        <p:par>
+                          <p:cTn id="29" fill="hold">
+                            <p:stCondLst>
+                              <p:cond delay="0"/>
+                            </p:stCondLst>
+                            <p:childTnLst>
+                              <p:par>
+                                <p:cTn id="30" presetID="10" presetClass="entr" presetSubtype="0" fill="hold" nodeType="clickEffect">
+                                  <p:stCondLst>
+                                    <p:cond delay="0"/>
+                                  </p:stCondLst>
+                                  <p:childTnLst>
+                                    <p:set>
+                                      <p:cBhvr>
+                                        <p:cTn id="31" dur="1" fill="hold">
+                                          <p:stCondLst>
+                                            <p:cond delay="0"/>
+                                          </p:stCondLst>
+                                        </p:cTn>
+                                        <p:tgtEl>
+                                          <p:spTgt spid="10"/>
+                                        </p:tgtEl>
+                                        <p:attrNameLst>
+                                          <p:attrName>style.visibility</p:attrName>
+                                        </p:attrNameLst>
+                                      </p:cBhvr>
+                                      <p:to>
+                                        <p:strVal val="visible"/>
+                                      </p:to>
+                                    </p:set>
+                                    <p:animEffect transition="in" filter="fade">
+                                      <p:cBhvr>
+                                        <p:cTn id="32" dur="500"/>
+                                        <p:tgtEl>
+                                          <p:spTgt spid="10"/>
+                                        </p:tgtEl>
+                                      </p:cBhvr>
+                                    </p:animEffect>
+                                  </p:childTnLst>
+                                </p:cTn>
+                              </p:par>
+                              <p:par>
+                                <p:cTn id="33" presetID="10" presetClass="entr" presetSubtype="0" fill="hold" grpId="0" nodeType="withEffect">
+                                  <p:stCondLst>
+                                    <p:cond delay="0"/>
+                                  </p:stCondLst>
+                                  <p:childTnLst>
+                                    <p:set>
+                                      <p:cBhvr>
+                                        <p:cTn id="34" dur="1" fill="hold">
+                                          <p:stCondLst>
+                                            <p:cond delay="0"/>
+                                          </p:stCondLst>
+                                        </p:cTn>
+                                        <p:tgtEl>
+                                          <p:spTgt spid="14"/>
+                                        </p:tgtEl>
+                                        <p:attrNameLst>
+                                          <p:attrName>style.visibility</p:attrName>
+                                        </p:attrNameLst>
+                                      </p:cBhvr>
+                                      <p:to>
+                                        <p:strVal val="visible"/>
+                                      </p:to>
+                                    </p:set>
+                                    <p:animEffect transition="in" filter="fade">
+                                      <p:cBhvr>
+                                        <p:cTn id="35" dur="500"/>
+                                        <p:tgtEl>
+                                          <p:spTgt spid="14"/>
+                                        </p:tgtEl>
+                                      </p:cBhvr>
+                                    </p:animEffect>
+                                  </p:childTnLst>
+                                </p:cTn>
+                              </p:par>
+                            </p:childTnLst>
+                          </p:cTn>
+                        </p:par>
+                      </p:childTnLst>
+                    </p:cTn>
+                  </p:par>
+                  <p:par>
+                    <p:cTn id="36" fill="hold">
+                      <p:stCondLst>
+                        <p:cond delay="indefinite"/>
+                      </p:stCondLst>
+                      <p:childTnLst>
+                        <p:par>
+                          <p:cTn id="37" fill="hold">
+                            <p:stCondLst>
+                              <p:cond delay="0"/>
+                            </p:stCondLst>
+                            <p:childTnLst>
+                              <p:par>
+                                <p:cTn id="38" presetID="10" presetClass="entr" presetSubtype="0" fill="hold" nodeType="clickEffect">
+                                  <p:stCondLst>
+                                    <p:cond delay="0"/>
+                                  </p:stCondLst>
+                                  <p:childTnLst>
+                                    <p:set>
+                                      <p:cBhvr>
+                                        <p:cTn id="39" dur="1" fill="hold">
+                                          <p:stCondLst>
+                                            <p:cond delay="0"/>
+                                          </p:stCondLst>
+                                        </p:cTn>
+                                        <p:tgtEl>
+                                          <p:spTgt spid="11"/>
+                                        </p:tgtEl>
+                                        <p:attrNameLst>
+                                          <p:attrName>style.visibility</p:attrName>
+                                        </p:attrNameLst>
+                                      </p:cBhvr>
+                                      <p:to>
+                                        <p:strVal val="visible"/>
+                                      </p:to>
+                                    </p:set>
+                                    <p:animEffect transition="in" filter="fade">
+                                      <p:cBhvr>
+                                        <p:cTn id="40" dur="500"/>
+                                        <p:tgtEl>
+                                          <p:spTgt spid="11"/>
+                                        </p:tgtEl>
+                                      </p:cBhvr>
+                                    </p:animEffect>
+                                  </p:childTnLst>
+                                </p:cTn>
+                              </p:par>
+                              <p:par>
+                                <p:cTn id="41" presetID="10" presetClass="entr" presetSubtype="0" fill="hold" grpId="0" nodeType="withEffect">
+                                  <p:stCondLst>
+                                    <p:cond delay="0"/>
+                                  </p:stCondLst>
+                                  <p:childTnLst>
+                                    <p:set>
+                                      <p:cBhvr>
+                                        <p:cTn id="42" dur="1" fill="hold">
+                                          <p:stCondLst>
+                                            <p:cond delay="0"/>
+                                          </p:stCondLst>
+                                        </p:cTn>
+                                        <p:tgtEl>
+                                          <p:spTgt spid="15"/>
+                                        </p:tgtEl>
+                                        <p:attrNameLst>
+                                          <p:attrName>style.visibility</p:attrName>
+                                        </p:attrNameLst>
+                                      </p:cBhvr>
+                                      <p:to>
+                                        <p:strVal val="visible"/>
+                                      </p:to>
+                                    </p:set>
+                                    <p:animEffect transition="in" filter="fade">
+                                      <p:cBhvr>
+                                        <p:cTn id="43" dur="500"/>
+                                        <p:tgtEl>
+                                          <p:spTgt spid="15"/>
+                                        </p:tgtEl>
+                                      </p:cBhvr>
+                                    </p:animEffect>
+                                  </p:childTnLst>
+                                </p:cTn>
+                              </p:par>
+                            </p:childTnLst>
+                          </p:cTn>
+                        </p:par>
+                      </p:childTnLst>
+                    </p:cTn>
+                  </p:par>
+                  <p:par>
+                    <p:cTn id="44" fill="hold">
+                      <p:stCondLst>
+                        <p:cond delay="indefinite"/>
+                      </p:stCondLst>
+                      <p:childTnLst>
+                        <p:par>
+                          <p:cTn id="45" fill="hold">
+                            <p:stCondLst>
+                              <p:cond delay="0"/>
+                            </p:stCondLst>
+                            <p:childTnLst>
+                              <p:par>
+                                <p:cTn id="46" presetID="10" presetClass="entr" presetSubtype="0" fill="hold" nodeType="clickEffect">
+                                  <p:stCondLst>
+                                    <p:cond delay="0"/>
+                                  </p:stCondLst>
+                                  <p:childTnLst>
+                                    <p:set>
+                                      <p:cBhvr>
+                                        <p:cTn id="47" dur="1" fill="hold">
+                                          <p:stCondLst>
+                                            <p:cond delay="0"/>
+                                          </p:stCondLst>
+                                        </p:cTn>
+                                        <p:tgtEl>
+                                          <p:spTgt spid="12"/>
+                                        </p:tgtEl>
+                                        <p:attrNameLst>
+                                          <p:attrName>style.visibility</p:attrName>
+                                        </p:attrNameLst>
+                                      </p:cBhvr>
+                                      <p:to>
+                                        <p:strVal val="visible"/>
+                                      </p:to>
+                                    </p:set>
+                                    <p:animEffect transition="in" filter="fade">
+                                      <p:cBhvr>
+                                        <p:cTn id="48" dur="500"/>
+                                        <p:tgtEl>
+                                          <p:spTgt spid="12"/>
+                                        </p:tgtEl>
+                                      </p:cBhvr>
+                                    </p:animEffect>
+                                  </p:childTnLst>
+                                </p:cTn>
+                              </p:par>
+                              <p:par>
+                                <p:cTn id="49" presetID="10" presetClass="entr" presetSubtype="0" fill="hold" grpId="0" nodeType="withEffect">
+                                  <p:stCondLst>
+                                    <p:cond delay="0"/>
+                                  </p:stCondLst>
+                                  <p:childTnLst>
+                                    <p:set>
+                                      <p:cBhvr>
+                                        <p:cTn id="50" dur="1" fill="hold">
+                                          <p:stCondLst>
+                                            <p:cond delay="0"/>
+                                          </p:stCondLst>
+                                        </p:cTn>
+                                        <p:tgtEl>
+                                          <p:spTgt spid="16"/>
+                                        </p:tgtEl>
+                                        <p:attrNameLst>
+                                          <p:attrName>style.visibility</p:attrName>
+                                        </p:attrNameLst>
+                                      </p:cBhvr>
+                                      <p:to>
+                                        <p:strVal val="visible"/>
+                                      </p:to>
+                                    </p:set>
+                                    <p:animEffect transition="in" filter="fade">
+                                      <p:cBhvr>
+                                        <p:cTn id="51" dur="500"/>
+                                        <p:tgtEl>
+                                          <p:spTgt spid="16"/>
+                                        </p:tgtEl>
+                                      </p:cBhvr>
+                                    </p:animEffect>
+                                  </p:childTnLst>
+                                </p:cTn>
+                              </p:par>
+                            </p:childTnLst>
+                          </p:cTn>
+                        </p:par>
+                      </p:childTnLst>
+                    </p:cTn>
+                  </p:par>
+                </p:childTnLst>
+              </p:cTn>
+              <p:prevCondLst>
+                <p:cond evt="onPrev" delay="0">
+                  <p:tgtEl>
+                    <p:sldTgt/>
+                  </p:tgtEl>
+                </p:cond>
+              </p:prevCondLst>
+              <p:nextCondLst>
+                <p:cond evt="onNext" delay="0">
+                  <p:tgtEl>
+                    <p:sldTgt/>
+                  </p:tgtEl>
+                </p:cond>
+              </p:nextCondLst>
+            </p:seq>
+          </p:childTnLst>
+        </p:cTn>
+      </p:par>
+    </p:tnLst>
+    <p:bldLst>
+      <p:bldP spid="5" grpId="0"/>
+      <p:bldP spid="6" grpId="0"/>
+      <p:bldP spid="8" grpId="0"/>
+      <p:bldP spid="14" grpId="0"/>
+      <p:bldP spid="15" grpId="0"/>
+      <p:bldP spid="16" grpId="0"/>
+    </p:bldLst>
   </p:timing>
 </p:sld>
 </file>

</xml_diff>

<commit_message>
PP changes from meeting
</commit_message>
<xml_diff>
--- a/Final Project Documentation/CSC521.pptx
+++ b/Final Project Documentation/CSC521.pptx
@@ -5,7 +5,7 @@
     <p:sldMasterId id="2147483678" r:id="rId1"/>
   </p:sldMasterIdLst>
   <p:notesMasterIdLst>
-    <p:notesMasterId r:id="rId17"/>
+    <p:notesMasterId r:id="rId21"/>
   </p:notesMasterIdLst>
   <p:sldIdLst>
     <p:sldId id="276" r:id="rId2"/>
@@ -15,14 +15,18 @@
     <p:sldId id="291" r:id="rId6"/>
     <p:sldId id="261" r:id="rId7"/>
     <p:sldId id="297" r:id="rId8"/>
-    <p:sldId id="265" r:id="rId9"/>
-    <p:sldId id="264" r:id="rId10"/>
-    <p:sldId id="290" r:id="rId11"/>
-    <p:sldId id="296" r:id="rId12"/>
-    <p:sldId id="295" r:id="rId13"/>
-    <p:sldId id="299" r:id="rId14"/>
-    <p:sldId id="298" r:id="rId15"/>
-    <p:sldId id="300" r:id="rId16"/>
+    <p:sldId id="264" r:id="rId9"/>
+    <p:sldId id="296" r:id="rId10"/>
+    <p:sldId id="299" r:id="rId11"/>
+    <p:sldId id="301" r:id="rId12"/>
+    <p:sldId id="302" r:id="rId13"/>
+    <p:sldId id="303" r:id="rId14"/>
+    <p:sldId id="300" r:id="rId15"/>
+    <p:sldId id="298" r:id="rId16"/>
+    <p:sldId id="295" r:id="rId17"/>
+    <p:sldId id="304" r:id="rId18"/>
+    <p:sldId id="305" r:id="rId19"/>
+    <p:sldId id="290" r:id="rId20"/>
   </p:sldIdLst>
   <p:sldSz cx="12192000" cy="6858000"/>
   <p:notesSz cx="6858000" cy="9144000"/>
@@ -413,109 +417,6 @@
 </p:notes>
 </file>
 
-<file path=ppt/notesSlides/notesSlide10.xml><?xml version="1.0" encoding="utf-8"?>
-<p:notes xmlns:a="http://schemas.openxmlformats.org/drawingml/2006/main" xmlns:r="http://schemas.openxmlformats.org/officeDocument/2006/relationships" xmlns:p="http://schemas.openxmlformats.org/presentationml/2006/main">
-  <p:cSld>
-    <p:spTree>
-      <p:nvGrpSpPr>
-        <p:cNvPr id="1" name=""/>
-        <p:cNvGrpSpPr/>
-        <p:nvPr/>
-      </p:nvGrpSpPr>
-      <p:grpSpPr>
-        <a:xfrm>
-          <a:off x="0" y="0"/>
-          <a:ext cx="0" cy="0"/>
-          <a:chOff x="0" y="0"/>
-          <a:chExt cx="0" cy="0"/>
-        </a:xfrm>
-      </p:grpSpPr>
-      <p:sp>
-        <p:nvSpPr>
-          <p:cNvPr id="2" name="Slide Image Placeholder 1"/>
-          <p:cNvSpPr>
-            <a:spLocks noGrp="1" noRot="1" noChangeAspect="1"/>
-          </p:cNvSpPr>
-          <p:nvPr>
-            <p:ph type="sldImg"/>
-          </p:nvPr>
-        </p:nvSpPr>
-        <p:spPr>
-          <a:xfrm>
-            <a:off x="685800" y="1143000"/>
-            <a:ext cx="5486400" cy="3086100"/>
-          </a:xfrm>
-          <a:prstGeom prst="rect">
-            <a:avLst/>
-          </a:prstGeom>
-          <a:noFill/>
-          <a:ln w="12700">
-            <a:solidFill>
-              <a:prstClr val="black"/>
-            </a:solidFill>
-          </a:ln>
-        </p:spPr>
-      </p:sp>
-      <p:sp>
-        <p:nvSpPr>
-          <p:cNvPr id="3" name="Notes Placeholder 2"/>
-          <p:cNvSpPr>
-            <a:spLocks noGrp="1"/>
-          </p:cNvSpPr>
-          <p:nvPr>
-            <p:ph type="body" idx="1"/>
-          </p:nvPr>
-        </p:nvSpPr>
-        <p:spPr>
-          <a:xfrm>
-            <a:off x="685800" y="4400550"/>
-            <a:ext cx="5486400" cy="3600450"/>
-          </a:xfrm>
-          <a:prstGeom prst="rect">
-            <a:avLst/>
-          </a:prstGeom>
-        </p:spPr>
-        <p:txBody>
-          <a:bodyPr/>
-          <a:lstStyle/>
-          <a:p>
-            <a:r>
-              <a:rPr lang="en-US" sz="1200" kern="1200" dirty="0" smtClean="0">
-                <a:solidFill>
-                  <a:schemeClr val="tx1"/>
-                </a:solidFill>
-                <a:effectLst/>
-                <a:latin typeface="+mn-lt"/>
-                <a:ea typeface="+mn-ea"/>
-                <a:cs typeface="+mn-cs"/>
-              </a:rPr>
-              <a:t>We would like to thank you for your time, and this brings us to the conclusion of our presentation. Do we have any questions?</a:t>
-            </a:r>
-            <a:endParaRPr lang="en-US" sz="1200" kern="1200" dirty="0">
-              <a:solidFill>
-                <a:schemeClr val="tx1"/>
-              </a:solidFill>
-              <a:effectLst/>
-              <a:latin typeface="+mn-lt"/>
-              <a:ea typeface="+mn-ea"/>
-              <a:cs typeface="+mn-cs"/>
-            </a:endParaRPr>
-          </a:p>
-        </p:txBody>
-      </p:sp>
-    </p:spTree>
-    <p:extLst>
-      <p:ext uri="{BB962C8B-B14F-4D97-AF65-F5344CB8AC3E}">
-        <p14:creationId xmlns:p14="http://schemas.microsoft.com/office/powerpoint/2010/main" val="971011799"/>
-      </p:ext>
-    </p:extLst>
-  </p:cSld>
-  <p:clrMapOvr>
-    <a:masterClrMapping/>
-  </p:clrMapOvr>
-</p:notes>
-</file>
-
 <file path=ppt/notesSlides/notesSlide2.xml><?xml version="1.0" encoding="utf-8"?>
 <p:notes xmlns:a="http://schemas.openxmlformats.org/drawingml/2006/main" xmlns:r="http://schemas.openxmlformats.org/officeDocument/2006/relationships" xmlns:p="http://schemas.openxmlformats.org/presentationml/2006/main">
   <p:cSld>
@@ -1738,58 +1639,145 @@
           <a:lstStyle/>
           <a:p>
             <a:r>
-              <a:rPr lang="en-US">
-                <a:cs typeface="Calibri"/>
-              </a:rPr>
-              <a:t>website</a:t>
-            </a:r>
-          </a:p>
-          <a:p>
-            <a:r>
-              <a:rPr lang="en-US">
-                <a:cs typeface="Calibri"/>
-              </a:rPr>
-              <a:t>functionality</a:t>
-            </a:r>
-          </a:p>
-          <a:p>
-            <a:r>
-              <a:rPr lang="en-US">
-                <a:cs typeface="Calibri"/>
-              </a:rPr>
-              <a:t>From Beth:</a:t>
-            </a:r>
-          </a:p>
-          <a:p>
-            <a:r>
-              <a:rPr lang="en-US">
-                <a:cs typeface="Calibri"/>
-              </a:rPr>
-              <a:t>If you explain at the beginning that there are uncertainties and show how there is a range of time that you expect these things to be done in, then when you reevaluate you should be more certain and have a better view of how long it's going to take so that the time range should be more narrow.  We need to acknowledge during the presentation that the first couple of sprints are experimental and will have a better feel of what we can acomplish. </a:t>
-            </a:r>
-          </a:p>
-          <a:p>
-            <a:r>
-              <a:rPr lang="en-US">
-                <a:cs typeface="Calibri"/>
-              </a:rPr>
-              <a:t/>
-            </a:r>
-            <a:br>
-              <a:rPr lang="en-US">
-                <a:cs typeface="Calibri"/>
-              </a:rPr>
-            </a:br>
-            <a:endParaRPr lang="en-US">
-              <a:cs typeface="Calibri"/>
+              <a:rPr lang="en-US" dirty="0" smtClean="0"/>
+              <a:t>We </a:t>
+            </a:r>
+            <a:r>
+              <a:rPr lang="en-US" dirty="0"/>
+              <a:t>assigned specification 20% because we felt it was one of the most important parts of our project and considering we all took the software engineering track we were able to understand its importance.</a:t>
+            </a:r>
+          </a:p>
+          <a:p>
+            <a:endParaRPr lang="en-US" dirty="0">
+              <a:solidFill>
+                <a:srgbClr val="FF0000"/>
+              </a:solidFill>
+              <a:latin typeface="Times New Roman"/>
+              <a:cs typeface="Times New Roman"/>
             </a:endParaRPr>
+          </a:p>
+          <a:p>
+            <a:r>
+              <a:rPr lang="en-US" dirty="0"/>
+              <a:t>&lt;Next/&gt;</a:t>
+            </a:r>
+          </a:p>
+          <a:p>
+            <a:r>
+              <a:rPr lang="en-US" dirty="0"/>
+              <a:t>Following up with analysis we assigned it a slightly smaller number because we didn’t feel it was as important as specifications but at the same time we felt pulling out our classes and having a good understanding of the functional flow was important for scalability and maintainability in later workflows.</a:t>
+            </a:r>
+          </a:p>
+          <a:p>
+            <a:endParaRPr lang="en-US" dirty="0">
+              <a:latin typeface="Times New Roman"/>
+              <a:cs typeface="Times New Roman"/>
+            </a:endParaRPr>
+          </a:p>
+          <a:p>
+            <a:r>
+              <a:rPr lang="en-US" dirty="0"/>
+              <a:t>&lt;Next/&gt;</a:t>
+            </a:r>
+          </a:p>
+          <a:p>
+            <a:r>
+              <a:rPr lang="en-US" dirty="0"/>
+              <a:t>Design was given the same level of effort as analysis because at this point we will have already spent </a:t>
+            </a:r>
+            <a:r>
+              <a:rPr lang="en-US" dirty="0" smtClean="0"/>
+              <a:t>half of</a:t>
+            </a:r>
+            <a:r>
+              <a:rPr lang="en-US" baseline="0" dirty="0" smtClean="0"/>
+              <a:t> our</a:t>
+            </a:r>
+            <a:r>
+              <a:rPr lang="en-US" dirty="0" smtClean="0"/>
+              <a:t> </a:t>
+            </a:r>
+            <a:r>
+              <a:rPr lang="en-US" dirty="0"/>
+              <a:t>time on </a:t>
+            </a:r>
+            <a:r>
+              <a:rPr lang="en-US" dirty="0" smtClean="0"/>
+              <a:t>planning, </a:t>
+            </a:r>
+            <a:r>
+              <a:rPr lang="en-US" dirty="0"/>
+              <a:t>so continuing to make sure we keep on track and work on our design before implementation seemed appropriate. </a:t>
+            </a:r>
+          </a:p>
+          <a:p>
+            <a:endParaRPr lang="en-US" dirty="0">
+              <a:latin typeface="Times New Roman"/>
+              <a:cs typeface="Times New Roman"/>
+            </a:endParaRPr>
+          </a:p>
+          <a:p>
+            <a:r>
+              <a:rPr lang="en-US" dirty="0"/>
+              <a:t>&lt;Next/&gt;</a:t>
+            </a:r>
+          </a:p>
+          <a:p>
+            <a:r>
+              <a:rPr lang="en-US" dirty="0"/>
+              <a:t>Implementation came in at 30%. Although the largest individual assignment, we have still assigned the majority of the project to planning.</a:t>
+            </a:r>
+          </a:p>
+          <a:p>
+            <a:endParaRPr lang="en-US" dirty="0">
+              <a:latin typeface="Times New Roman"/>
+              <a:cs typeface="Times New Roman"/>
+            </a:endParaRPr>
+          </a:p>
+          <a:p>
+            <a:r>
+              <a:rPr lang="en-US" dirty="0"/>
+              <a:t>&lt;Next/&gt;</a:t>
+            </a:r>
+          </a:p>
+          <a:p>
+            <a:r>
+              <a:rPr lang="en-US" dirty="0"/>
+              <a:t>Documentation </a:t>
+            </a:r>
+            <a:r>
+              <a:rPr lang="en-US" dirty="0" smtClean="0"/>
+              <a:t>has earned </a:t>
+            </a:r>
+            <a:r>
+              <a:rPr lang="en-US" dirty="0"/>
+              <a:t>it's self 10% because as a real world software experience we understand that in order for a group to function properly, we can’t be wasting our time trying to understand what our colleague’s code is supposed to do.</a:t>
+            </a:r>
+          </a:p>
+          <a:p>
+            <a:endParaRPr lang="en-US" dirty="0">
+              <a:latin typeface="Times New Roman"/>
+              <a:cs typeface="Times New Roman"/>
+            </a:endParaRPr>
+          </a:p>
+          <a:p>
+            <a:r>
+              <a:rPr lang="en-US" dirty="0"/>
+              <a:t>&lt;Next/&gt;</a:t>
+            </a:r>
+          </a:p>
+          <a:p>
+            <a:r>
+              <a:rPr lang="en-US" dirty="0"/>
+              <a:t>And finally we have assigned our presentation 10% because our goal is to not just to deliver a piece of software but deliver a quality and engaging product presentation. </a:t>
+            </a:r>
           </a:p>
         </p:txBody>
       </p:sp>
     </p:spTree>
     <p:extLst>
       <p:ext uri="{BB962C8B-B14F-4D97-AF65-F5344CB8AC3E}">
-        <p14:creationId xmlns:p14="http://schemas.microsoft.com/office/powerpoint/2010/main" val="2858488278"/>
+        <p14:creationId xmlns:p14="http://schemas.microsoft.com/office/powerpoint/2010/main" val="3049396755"/>
       </p:ext>
     </p:extLst>
   </p:cSld>
@@ -1866,145 +1854,33 @@
           <a:lstStyle/>
           <a:p>
             <a:r>
-              <a:rPr lang="en-US" dirty="0" smtClean="0"/>
-              <a:t>We </a:t>
-            </a:r>
-            <a:r>
-              <a:rPr lang="en-US" dirty="0"/>
-              <a:t>assigned specification 20% because we felt it was one of the most important parts of our project and considering we all took the software engineering track we were able to understand its importance.</a:t>
-            </a:r>
-          </a:p>
-          <a:p>
-            <a:endParaRPr lang="en-US" dirty="0">
+              <a:rPr lang="en-US" sz="1200" kern="1200" dirty="0" smtClean="0">
+                <a:solidFill>
+                  <a:schemeClr val="tx1"/>
+                </a:solidFill>
+                <a:effectLst/>
+                <a:latin typeface="+mn-lt"/>
+                <a:ea typeface="+mn-ea"/>
+                <a:cs typeface="+mn-cs"/>
+              </a:rPr>
+              <a:t>We would like to thank you for your time, and this brings us to the conclusion of our presentation. Do we have any questions?</a:t>
+            </a:r>
+            <a:endParaRPr lang="en-US" sz="1200" kern="1200" dirty="0">
               <a:solidFill>
-                <a:srgbClr val="FF0000"/>
+                <a:schemeClr val="tx1"/>
               </a:solidFill>
-              <a:latin typeface="Times New Roman"/>
-              <a:cs typeface="Times New Roman"/>
+              <a:effectLst/>
+              <a:latin typeface="+mn-lt"/>
+              <a:ea typeface="+mn-ea"/>
+              <a:cs typeface="+mn-cs"/>
             </a:endParaRPr>
-          </a:p>
-          <a:p>
-            <a:r>
-              <a:rPr lang="en-US" dirty="0"/>
-              <a:t>&lt;Next/&gt;</a:t>
-            </a:r>
-          </a:p>
-          <a:p>
-            <a:r>
-              <a:rPr lang="en-US" dirty="0"/>
-              <a:t>Following up with analysis we assigned it a slightly smaller number because we didn’t feel it was as important as specifications but at the same time we felt pulling out our classes and having a good understanding of the functional flow was important for scalability and maintainability in later workflows.</a:t>
-            </a:r>
-          </a:p>
-          <a:p>
-            <a:endParaRPr lang="en-US" dirty="0">
-              <a:latin typeface="Times New Roman"/>
-              <a:cs typeface="Times New Roman"/>
-            </a:endParaRPr>
-          </a:p>
-          <a:p>
-            <a:r>
-              <a:rPr lang="en-US" dirty="0"/>
-              <a:t>&lt;Next/&gt;</a:t>
-            </a:r>
-          </a:p>
-          <a:p>
-            <a:r>
-              <a:rPr lang="en-US" dirty="0"/>
-              <a:t>Design was given the same level of effort as analysis because at this point we will have already spent </a:t>
-            </a:r>
-            <a:r>
-              <a:rPr lang="en-US" dirty="0" smtClean="0"/>
-              <a:t>half of</a:t>
-            </a:r>
-            <a:r>
-              <a:rPr lang="en-US" baseline="0" dirty="0" smtClean="0"/>
-              <a:t> our</a:t>
-            </a:r>
-            <a:r>
-              <a:rPr lang="en-US" dirty="0" smtClean="0"/>
-              <a:t> </a:t>
-            </a:r>
-            <a:r>
-              <a:rPr lang="en-US" dirty="0"/>
-              <a:t>time on </a:t>
-            </a:r>
-            <a:r>
-              <a:rPr lang="en-US" dirty="0" smtClean="0"/>
-              <a:t>planning, </a:t>
-            </a:r>
-            <a:r>
-              <a:rPr lang="en-US" dirty="0"/>
-              <a:t>so continuing to make sure we keep on track and work on our design before implementation seemed appropriate. </a:t>
-            </a:r>
-          </a:p>
-          <a:p>
-            <a:endParaRPr lang="en-US" dirty="0">
-              <a:latin typeface="Times New Roman"/>
-              <a:cs typeface="Times New Roman"/>
-            </a:endParaRPr>
-          </a:p>
-          <a:p>
-            <a:r>
-              <a:rPr lang="en-US" dirty="0"/>
-              <a:t>&lt;Next/&gt;</a:t>
-            </a:r>
-          </a:p>
-          <a:p>
-            <a:r>
-              <a:rPr lang="en-US" dirty="0"/>
-              <a:t>Implementation came in at 30%. Although the largest individual assignment, we have still assigned the majority of the project to planning.</a:t>
-            </a:r>
-          </a:p>
-          <a:p>
-            <a:endParaRPr lang="en-US" dirty="0">
-              <a:latin typeface="Times New Roman"/>
-              <a:cs typeface="Times New Roman"/>
-            </a:endParaRPr>
-          </a:p>
-          <a:p>
-            <a:r>
-              <a:rPr lang="en-US" dirty="0"/>
-              <a:t>&lt;Next/&gt;</a:t>
-            </a:r>
-          </a:p>
-          <a:p>
-            <a:r>
-              <a:rPr lang="en-US" dirty="0"/>
-              <a:t>Documentation </a:t>
-            </a:r>
-            <a:r>
-              <a:rPr lang="en-US" dirty="0" smtClean="0"/>
-              <a:t>has earned </a:t>
-            </a:r>
-            <a:r>
-              <a:rPr lang="en-US" dirty="0"/>
-              <a:t>it's self 10% because as a real world software experience we understand that in order for a group to function properly, we can’t be wasting our time trying to understand what our colleague’s code is supposed to do.</a:t>
-            </a:r>
-          </a:p>
-          <a:p>
-            <a:endParaRPr lang="en-US" dirty="0">
-              <a:latin typeface="Times New Roman"/>
-              <a:cs typeface="Times New Roman"/>
-            </a:endParaRPr>
-          </a:p>
-          <a:p>
-            <a:r>
-              <a:rPr lang="en-US" dirty="0"/>
-              <a:t>&lt;Next/&gt;</a:t>
-            </a:r>
-          </a:p>
-          <a:p>
-            <a:r>
-              <a:rPr lang="en-US" dirty="0"/>
-              <a:t>And finally we have assigned our presentation 10% because our goal is to not just to deliver a piece of software but deliver a quality and engaging product presentation. </a:t>
-            </a:r>
           </a:p>
         </p:txBody>
       </p:sp>
     </p:spTree>
     <p:extLst>
       <p:ext uri="{BB962C8B-B14F-4D97-AF65-F5344CB8AC3E}">
-        <p14:creationId xmlns:p14="http://schemas.microsoft.com/office/powerpoint/2010/main" val="3049396755"/>
+        <p14:creationId xmlns:p14="http://schemas.microsoft.com/office/powerpoint/2010/main" val="971011799"/>
       </p:ext>
     </p:extLst>
   </p:cSld>
@@ -9019,14 +8895,14 @@
           <a:p>
             <a:pPr algn="ctr"/>
             <a:r>
-              <a:rPr lang="en-US" sz="7200" dirty="0" err="1" smtClean="0">
+              <a:rPr lang="en-US" sz="7200" dirty="0" smtClean="0">
                 <a:latin typeface="Big Caslon"/>
                 <a:cs typeface="Big Caslon"/>
               </a:rPr>
               <a:t>Plan</a:t>
             </a:r>
             <a:r>
-              <a:rPr lang="en-US" sz="7200" i="1" dirty="0" err="1" smtClean="0">
+              <a:rPr lang="en-US" sz="7200" i="1" dirty="0" smtClean="0">
                 <a:solidFill>
                   <a:srgbClr val="7F7F7F"/>
                 </a:solidFill>
@@ -9149,386 +9025,6 @@
 </file>
 
 <file path=ppt/slides/slide10.xml><?xml version="1.0" encoding="utf-8"?>
-<p:sld xmlns:a="http://schemas.openxmlformats.org/drawingml/2006/main" xmlns:r="http://schemas.openxmlformats.org/officeDocument/2006/relationships" xmlns:p="http://schemas.openxmlformats.org/presentationml/2006/main">
-  <p:cSld>
-    <p:spTree>
-      <p:nvGrpSpPr>
-        <p:cNvPr id="1" name=""/>
-        <p:cNvGrpSpPr/>
-        <p:nvPr/>
-      </p:nvGrpSpPr>
-      <p:grpSpPr>
-        <a:xfrm>
-          <a:off x="0" y="0"/>
-          <a:ext cx="0" cy="0"/>
-          <a:chOff x="0" y="0"/>
-          <a:chExt cx="0" cy="0"/>
-        </a:xfrm>
-      </p:grpSpPr>
-      <p:sp>
-        <p:nvSpPr>
-          <p:cNvPr id="2" name="Title 1"/>
-          <p:cNvSpPr>
-            <a:spLocks noGrp="1"/>
-          </p:cNvSpPr>
-          <p:nvPr>
-            <p:ph type="ctrTitle"/>
-          </p:nvPr>
-        </p:nvSpPr>
-        <p:spPr>
-          <a:xfrm>
-            <a:off x="1298046" y="1911287"/>
-            <a:ext cx="7766936" cy="1646302"/>
-          </a:xfrm>
-        </p:spPr>
-        <p:txBody>
-          <a:bodyPr>
-            <a:normAutofit/>
-          </a:bodyPr>
-          <a:lstStyle/>
-          <a:p>
-            <a:pPr algn="ctr"/>
-            <a:r>
-              <a:rPr lang="en-US" sz="7200" dirty="0" smtClean="0">
-                <a:latin typeface="Big Caslon"/>
-                <a:cs typeface="Big Caslon"/>
-              </a:rPr>
-              <a:t>Plan</a:t>
-            </a:r>
-            <a:r>
-              <a:rPr lang="en-US" sz="7200" i="1" dirty="0" smtClean="0">
-                <a:solidFill>
-                  <a:srgbClr val="7F7F7F"/>
-                </a:solidFill>
-                <a:latin typeface="Big Caslon"/>
-                <a:cs typeface="Big Caslon"/>
-              </a:rPr>
-              <a:t>it</a:t>
-            </a:r>
-            <a:r>
-              <a:rPr lang="en-US" sz="7200" dirty="0" smtClean="0">
-                <a:solidFill>
-                  <a:srgbClr val="7F7F7F"/>
-                </a:solidFill>
-                <a:latin typeface="Big Caslon"/>
-                <a:cs typeface="Big Caslon"/>
-              </a:rPr>
-              <a:t>!</a:t>
-            </a:r>
-            <a:endParaRPr lang="en-US" sz="7200" dirty="0">
-              <a:solidFill>
-                <a:srgbClr val="7F7F7F"/>
-              </a:solidFill>
-              <a:latin typeface="Big Caslon"/>
-              <a:cs typeface="Big Caslon"/>
-            </a:endParaRPr>
-          </a:p>
-        </p:txBody>
-      </p:sp>
-      <p:sp>
-        <p:nvSpPr>
-          <p:cNvPr id="6" name="Rectangle 5"/>
-          <p:cNvSpPr/>
-          <p:nvPr/>
-        </p:nvSpPr>
-        <p:spPr>
-          <a:xfrm>
-            <a:off x="3919267" y="3393071"/>
-            <a:ext cx="2405850" cy="400110"/>
-          </a:xfrm>
-          <a:prstGeom prst="rect">
-            <a:avLst/>
-          </a:prstGeom>
-        </p:spPr>
-        <p:txBody>
-          <a:bodyPr wrap="none">
-            <a:spAutoFit/>
-          </a:bodyPr>
-          <a:lstStyle/>
-          <a:p>
-            <a:pPr algn="ctr"/>
-            <a:r>
-              <a:rPr lang="en-US" sz="2000" dirty="0">
-                <a:solidFill>
-                  <a:srgbClr val="70AD47"/>
-                </a:solidFill>
-              </a:rPr>
-              <a:t>We’re Here to Help</a:t>
-            </a:r>
-          </a:p>
-        </p:txBody>
-      </p:sp>
-    </p:spTree>
-    <p:extLst>
-      <p:ext uri="{BB962C8B-B14F-4D97-AF65-F5344CB8AC3E}">
-        <p14:creationId xmlns:p14="http://schemas.microsoft.com/office/powerpoint/2010/main" val="2624175973"/>
-      </p:ext>
-    </p:extLst>
-  </p:cSld>
-  <p:clrMapOvr>
-    <a:masterClrMapping/>
-  </p:clrMapOvr>
-  <p:timing>
-    <p:tnLst>
-      <p:par>
-        <p:cTn id="1" dur="indefinite" restart="never" nodeType="tmRoot"/>
-      </p:par>
-    </p:tnLst>
-  </p:timing>
-</p:sld>
-</file>
-
-<file path=ppt/slides/slide11.xml><?xml version="1.0" encoding="utf-8"?>
-<p:sld xmlns:a="http://schemas.openxmlformats.org/drawingml/2006/main" xmlns:r="http://schemas.openxmlformats.org/officeDocument/2006/relationships" xmlns:p="http://schemas.openxmlformats.org/presentationml/2006/main">
-  <p:cSld>
-    <p:spTree>
-      <p:nvGrpSpPr>
-        <p:cNvPr id="1" name=""/>
-        <p:cNvGrpSpPr/>
-        <p:nvPr/>
-      </p:nvGrpSpPr>
-      <p:grpSpPr>
-        <a:xfrm>
-          <a:off x="0" y="0"/>
-          <a:ext cx="0" cy="0"/>
-          <a:chOff x="0" y="0"/>
-          <a:chExt cx="0" cy="0"/>
-        </a:xfrm>
-      </p:grpSpPr>
-      <p:sp>
-        <p:nvSpPr>
-          <p:cNvPr id="2" name="Title 1"/>
-          <p:cNvSpPr>
-            <a:spLocks noGrp="1"/>
-          </p:cNvSpPr>
-          <p:nvPr>
-            <p:ph type="title"/>
-          </p:nvPr>
-        </p:nvSpPr>
-        <p:spPr/>
-        <p:txBody>
-          <a:bodyPr/>
-          <a:lstStyle/>
-          <a:p>
-            <a:endParaRPr lang="en-US" dirty="0"/>
-          </a:p>
-        </p:txBody>
-      </p:sp>
-      <p:sp>
-        <p:nvSpPr>
-          <p:cNvPr id="3" name="Content Placeholder 2"/>
-          <p:cNvSpPr>
-            <a:spLocks noGrp="1"/>
-          </p:cNvSpPr>
-          <p:nvPr>
-            <p:ph idx="1"/>
-          </p:nvPr>
-        </p:nvSpPr>
-        <p:spPr/>
-        <p:txBody>
-          <a:bodyPr>
-            <a:normAutofit/>
-          </a:bodyPr>
-          <a:lstStyle/>
-          <a:p>
-            <a:r>
-              <a:rPr lang="en-US" b="1" dirty="0" smtClean="0"/>
-              <a:t>Doing </a:t>
-            </a:r>
-            <a:r>
-              <a:rPr lang="en-US" b="1" dirty="0"/>
-              <a:t>the first walkthrough of deploying to </a:t>
-            </a:r>
-            <a:r>
-              <a:rPr lang="en-US" b="1" dirty="0" smtClean="0"/>
-              <a:t>Azure Devin</a:t>
-            </a:r>
-            <a:endParaRPr lang="en-US" dirty="0"/>
-          </a:p>
-          <a:p>
-            <a:r>
-              <a:rPr lang="en-US" b="1" dirty="0"/>
-              <a:t>Integrating JQuery plugins into MVC </a:t>
-            </a:r>
-            <a:r>
-              <a:rPr lang="en-US" b="1" dirty="0" smtClean="0"/>
-              <a:t>project Albert</a:t>
-            </a:r>
-          </a:p>
-          <a:p>
-            <a:r>
-              <a:rPr lang="en-US" b="1" dirty="0" smtClean="0"/>
-              <a:t>The </a:t>
-            </a:r>
-            <a:r>
-              <a:rPr lang="en-US" b="1" dirty="0"/>
-              <a:t>GIT Bash Learning curve - Living in </a:t>
-            </a:r>
-            <a:r>
-              <a:rPr lang="en-US" b="1" dirty="0" err="1"/>
-              <a:t>GITHub</a:t>
-            </a:r>
-            <a:r>
-              <a:rPr lang="en-US" b="1" dirty="0"/>
-              <a:t> and working in </a:t>
-            </a:r>
-            <a:r>
-              <a:rPr lang="en-US" b="1" dirty="0" smtClean="0"/>
-              <a:t>GIT Albert</a:t>
-            </a:r>
-            <a:endParaRPr lang="en-US" dirty="0"/>
-          </a:p>
-          <a:p>
-            <a:r>
-              <a:rPr lang="en-US" b="1" dirty="0"/>
-              <a:t>Database </a:t>
-            </a:r>
-            <a:endParaRPr lang="en-US" dirty="0"/>
-          </a:p>
-          <a:p>
-            <a:r>
-              <a:rPr lang="en-US" b="1" dirty="0"/>
-              <a:t>Integrating the MVC “free” User Authentication</a:t>
-            </a:r>
-            <a:endParaRPr lang="en-US" dirty="0"/>
-          </a:p>
-          <a:p>
-            <a:r>
-              <a:rPr lang="en-US" b="1" dirty="0" smtClean="0"/>
-              <a:t>Sprints</a:t>
-            </a:r>
-            <a:r>
-              <a:rPr lang="en-US" b="1" dirty="0"/>
-              <a:t>, deadlines, formal testing and documentation – not so much….</a:t>
-            </a:r>
-            <a:endParaRPr lang="en-US" dirty="0"/>
-          </a:p>
-          <a:p>
-            <a:r>
-              <a:rPr lang="en-US" b="1" dirty="0"/>
-              <a:t>Scheduling, Teamwork and meetings</a:t>
-            </a:r>
-            <a:endParaRPr lang="en-US" dirty="0"/>
-          </a:p>
-          <a:p>
-            <a:r>
-              <a:rPr lang="en-US" b="1" dirty="0"/>
-              <a:t>Beta Testing by Family and </a:t>
-            </a:r>
-            <a:r>
-              <a:rPr lang="en-US" b="1"/>
-              <a:t>Friends</a:t>
-            </a:r>
-            <a:r>
-              <a:rPr lang="en-US"/>
-              <a:t> </a:t>
-            </a:r>
-            <a:r>
-              <a:rPr lang="en-US" smtClean="0"/>
-              <a:t>Devin</a:t>
-            </a:r>
-            <a:endParaRPr lang="en-US" dirty="0"/>
-          </a:p>
-          <a:p>
-            <a:r>
-              <a:rPr lang="en-US" b="1" dirty="0"/>
-              <a:t>What would we do differently?</a:t>
-            </a:r>
-            <a:endParaRPr lang="en-US" dirty="0"/>
-          </a:p>
-          <a:p>
-            <a:endParaRPr lang="en-US" dirty="0"/>
-          </a:p>
-        </p:txBody>
-      </p:sp>
-    </p:spTree>
-    <p:extLst>
-      <p:ext uri="{BB962C8B-B14F-4D97-AF65-F5344CB8AC3E}">
-        <p14:creationId xmlns:p14="http://schemas.microsoft.com/office/powerpoint/2010/main" val="2116137551"/>
-      </p:ext>
-    </p:extLst>
-  </p:cSld>
-  <p:clrMapOvr>
-    <a:masterClrMapping/>
-  </p:clrMapOvr>
-  <p:timing>
-    <p:tnLst>
-      <p:par>
-        <p:cTn id="1" dur="indefinite" restart="never" nodeType="tmRoot"/>
-      </p:par>
-    </p:tnLst>
-  </p:timing>
-</p:sld>
-</file>
-
-<file path=ppt/slides/slide12.xml><?xml version="1.0" encoding="utf-8"?>
-<p:sld xmlns:a="http://schemas.openxmlformats.org/drawingml/2006/main" xmlns:r="http://schemas.openxmlformats.org/officeDocument/2006/relationships" xmlns:p="http://schemas.openxmlformats.org/presentationml/2006/main">
-  <p:cSld>
-    <p:spTree>
-      <p:nvGrpSpPr>
-        <p:cNvPr id="1" name=""/>
-        <p:cNvGrpSpPr/>
-        <p:nvPr/>
-      </p:nvGrpSpPr>
-      <p:grpSpPr>
-        <a:xfrm>
-          <a:off x="0" y="0"/>
-          <a:ext cx="0" cy="0"/>
-          <a:chOff x="0" y="0"/>
-          <a:chExt cx="0" cy="0"/>
-        </a:xfrm>
-      </p:grpSpPr>
-      <p:sp>
-        <p:nvSpPr>
-          <p:cNvPr id="2" name="Title 1"/>
-          <p:cNvSpPr>
-            <a:spLocks noGrp="1"/>
-          </p:cNvSpPr>
-          <p:nvPr>
-            <p:ph type="title"/>
-          </p:nvPr>
-        </p:nvSpPr>
-        <p:spPr>
-          <a:xfrm>
-            <a:off x="677334" y="609600"/>
-            <a:ext cx="8596668" cy="774357"/>
-          </a:xfrm>
-        </p:spPr>
-        <p:txBody>
-          <a:bodyPr>
-            <a:noAutofit/>
-          </a:bodyPr>
-          <a:lstStyle/>
-          <a:p>
-            <a:r>
-              <a:rPr lang="en-US" sz="5400" dirty="0" smtClean="0"/>
-              <a:t>Backlog</a:t>
-            </a:r>
-            <a:endParaRPr lang="en-US" sz="5400" dirty="0"/>
-          </a:p>
-        </p:txBody>
-      </p:sp>
-    </p:spTree>
-    <p:extLst>
-      <p:ext uri="{BB962C8B-B14F-4D97-AF65-F5344CB8AC3E}">
-        <p14:creationId xmlns:p14="http://schemas.microsoft.com/office/powerpoint/2010/main" val="4221975140"/>
-      </p:ext>
-    </p:extLst>
-  </p:cSld>
-  <p:clrMapOvr>
-    <a:masterClrMapping/>
-  </p:clrMapOvr>
-  <p:timing>
-    <p:tnLst>
-      <p:par>
-        <p:cTn id="1" dur="indefinite" restart="never" nodeType="tmRoot"/>
-      </p:par>
-    </p:tnLst>
-  </p:timing>
-</p:sld>
-</file>
-
-<file path=ppt/slides/slide13.xml><?xml version="1.0" encoding="utf-8"?>
 <p:sld xmlns:a="http://schemas.openxmlformats.org/drawingml/2006/main" xmlns:r="http://schemas.openxmlformats.org/officeDocument/2006/relationships" xmlns:p="http://schemas.openxmlformats.org/presentationml/2006/main">
   <p:cSld>
     <p:spTree>
@@ -10020,14 +9516,7 @@
                 <a:latin typeface="Times New Roman" panose="02020603050405020304" pitchFamily="18" charset="0"/>
                 <a:ea typeface="Times New Roman" panose="02020603050405020304" pitchFamily="18" charset="0"/>
               </a:rPr>
-              <a:t>MS SQL </a:t>
-            </a:r>
-            <a:r>
-              <a:rPr lang="en-US" sz="1400" dirty="0" smtClean="0">
-                <a:latin typeface="Times New Roman" panose="02020603050405020304" pitchFamily="18" charset="0"/>
-                <a:ea typeface="Times New Roman" panose="02020603050405020304" pitchFamily="18" charset="0"/>
-              </a:rPr>
-              <a:t>Azure</a:t>
+              <a:t>MS SQL Azure</a:t>
             </a:r>
             <a:endParaRPr lang="en-US" sz="1600" dirty="0">
               <a:effectLst/>
@@ -10211,7 +9700,7 @@
 </p:sld>
 </file>
 
-<file path=ppt/slides/slide14.xml><?xml version="1.0" encoding="utf-8"?>
+<file path=ppt/slides/slide11.xml><?xml version="1.0" encoding="utf-8"?>
 <p:sld xmlns:a="http://schemas.openxmlformats.org/drawingml/2006/main" xmlns:r="http://schemas.openxmlformats.org/officeDocument/2006/relationships" xmlns:p="http://schemas.openxmlformats.org/presentationml/2006/main">
   <p:cSld>
     <p:spTree>
@@ -10246,16 +9735,16 @@
           <a:lstStyle/>
           <a:p>
             <a:r>
+              <a:rPr lang="en-US" b="1" dirty="0"/>
+              <a:t>Doing the first walkthrough of deploying to Azure Devin</a:t>
+            </a:r>
+            <a:r>
               <a:rPr lang="en-US" dirty="0"/>
               <a:t/>
             </a:r>
             <a:br>
               <a:rPr lang="en-US" dirty="0"/>
             </a:br>
-            <a:r>
-              <a:rPr lang="en-US" b="1" dirty="0"/>
-              <a:t>No change is a standalone change Beth</a:t>
-            </a:r>
             <a:r>
               <a:rPr lang="en-US" dirty="0"/>
               <a:t/>
@@ -10282,14 +9771,747 @@
           <a:bodyPr/>
           <a:lstStyle/>
           <a:p>
-            <a:endParaRPr lang="en-US" dirty="0"/>
+            <a:endParaRPr lang="en-US"/>
           </a:p>
         </p:txBody>
       </p:sp>
     </p:spTree>
     <p:extLst>
       <p:ext uri="{BB962C8B-B14F-4D97-AF65-F5344CB8AC3E}">
-        <p14:creationId xmlns:p14="http://schemas.microsoft.com/office/powerpoint/2010/main" val="165046885"/>
+        <p14:creationId xmlns:p14="http://schemas.microsoft.com/office/powerpoint/2010/main" val="284592902"/>
+      </p:ext>
+    </p:extLst>
+  </p:cSld>
+  <p:clrMapOvr>
+    <a:masterClrMapping/>
+  </p:clrMapOvr>
+</p:sld>
+</file>
+
+<file path=ppt/slides/slide12.xml><?xml version="1.0" encoding="utf-8"?>
+<p:sld xmlns:a="http://schemas.openxmlformats.org/drawingml/2006/main" xmlns:r="http://schemas.openxmlformats.org/officeDocument/2006/relationships" xmlns:p="http://schemas.openxmlformats.org/presentationml/2006/main">
+  <p:cSld>
+    <p:spTree>
+      <p:nvGrpSpPr>
+        <p:cNvPr id="1" name=""/>
+        <p:cNvGrpSpPr/>
+        <p:nvPr/>
+      </p:nvGrpSpPr>
+      <p:grpSpPr>
+        <a:xfrm>
+          <a:off x="0" y="0"/>
+          <a:ext cx="0" cy="0"/>
+          <a:chOff x="0" y="0"/>
+          <a:chExt cx="0" cy="0"/>
+        </a:xfrm>
+      </p:grpSpPr>
+      <p:sp>
+        <p:nvSpPr>
+          <p:cNvPr id="2" name="Title 1"/>
+          <p:cNvSpPr>
+            <a:spLocks noGrp="1"/>
+          </p:cNvSpPr>
+          <p:nvPr>
+            <p:ph type="title"/>
+          </p:nvPr>
+        </p:nvSpPr>
+        <p:spPr/>
+        <p:txBody>
+          <a:bodyPr/>
+          <a:lstStyle/>
+          <a:p>
+            <a:endParaRPr lang="en-US"/>
+          </a:p>
+        </p:txBody>
+      </p:sp>
+      <p:sp>
+        <p:nvSpPr>
+          <p:cNvPr id="3" name="Content Placeholder 2"/>
+          <p:cNvSpPr>
+            <a:spLocks noGrp="1"/>
+          </p:cNvSpPr>
+          <p:nvPr>
+            <p:ph sz="half" idx="1"/>
+          </p:nvPr>
+        </p:nvSpPr>
+        <p:spPr/>
+        <p:txBody>
+          <a:bodyPr/>
+          <a:lstStyle/>
+          <a:p>
+            <a:endParaRPr lang="en-US"/>
+          </a:p>
+        </p:txBody>
+      </p:sp>
+      <p:sp>
+        <p:nvSpPr>
+          <p:cNvPr id="4" name="Content Placeholder 3"/>
+          <p:cNvSpPr>
+            <a:spLocks noGrp="1"/>
+          </p:cNvSpPr>
+          <p:nvPr>
+            <p:ph sz="half" idx="2"/>
+          </p:nvPr>
+        </p:nvSpPr>
+        <p:spPr/>
+        <p:txBody>
+          <a:bodyPr/>
+          <a:lstStyle/>
+          <a:p>
+            <a:endParaRPr lang="en-US"/>
+          </a:p>
+        </p:txBody>
+      </p:sp>
+    </p:spTree>
+    <p:extLst>
+      <p:ext uri="{BB962C8B-B14F-4D97-AF65-F5344CB8AC3E}">
+        <p14:creationId xmlns:p14="http://schemas.microsoft.com/office/powerpoint/2010/main" val="3466366651"/>
+      </p:ext>
+    </p:extLst>
+  </p:cSld>
+  <p:clrMapOvr>
+    <a:masterClrMapping/>
+  </p:clrMapOvr>
+</p:sld>
+</file>
+
+<file path=ppt/slides/slide13.xml><?xml version="1.0" encoding="utf-8"?>
+<p:sld xmlns:a="http://schemas.openxmlformats.org/drawingml/2006/main" xmlns:r="http://schemas.openxmlformats.org/officeDocument/2006/relationships" xmlns:p="http://schemas.openxmlformats.org/presentationml/2006/main">
+  <p:cSld>
+    <p:spTree>
+      <p:nvGrpSpPr>
+        <p:cNvPr id="1" name=""/>
+        <p:cNvGrpSpPr/>
+        <p:nvPr/>
+      </p:nvGrpSpPr>
+      <p:grpSpPr>
+        <a:xfrm>
+          <a:off x="0" y="0"/>
+          <a:ext cx="0" cy="0"/>
+          <a:chOff x="0" y="0"/>
+          <a:chExt cx="0" cy="0"/>
+        </a:xfrm>
+      </p:grpSpPr>
+      <p:sp>
+        <p:nvSpPr>
+          <p:cNvPr id="2" name="Title 1"/>
+          <p:cNvSpPr>
+            <a:spLocks noGrp="1"/>
+          </p:cNvSpPr>
+          <p:nvPr>
+            <p:ph type="title"/>
+          </p:nvPr>
+        </p:nvSpPr>
+        <p:spPr/>
+        <p:txBody>
+          <a:bodyPr/>
+          <a:lstStyle/>
+          <a:p>
+            <a:endParaRPr lang="en-US"/>
+          </a:p>
+        </p:txBody>
+      </p:sp>
+      <p:sp>
+        <p:nvSpPr>
+          <p:cNvPr id="3" name="Content Placeholder 2"/>
+          <p:cNvSpPr>
+            <a:spLocks noGrp="1"/>
+          </p:cNvSpPr>
+          <p:nvPr>
+            <p:ph sz="half" idx="1"/>
+          </p:nvPr>
+        </p:nvSpPr>
+        <p:spPr/>
+        <p:txBody>
+          <a:bodyPr/>
+          <a:lstStyle/>
+          <a:p>
+            <a:endParaRPr lang="en-US"/>
+          </a:p>
+        </p:txBody>
+      </p:sp>
+      <p:sp>
+        <p:nvSpPr>
+          <p:cNvPr id="4" name="Content Placeholder 3"/>
+          <p:cNvSpPr>
+            <a:spLocks noGrp="1"/>
+          </p:cNvSpPr>
+          <p:nvPr>
+            <p:ph sz="half" idx="2"/>
+          </p:nvPr>
+        </p:nvSpPr>
+        <p:spPr/>
+        <p:txBody>
+          <a:bodyPr/>
+          <a:lstStyle/>
+          <a:p>
+            <a:endParaRPr lang="en-US"/>
+          </a:p>
+        </p:txBody>
+      </p:sp>
+    </p:spTree>
+    <p:extLst>
+      <p:ext uri="{BB962C8B-B14F-4D97-AF65-F5344CB8AC3E}">
+        <p14:creationId xmlns:p14="http://schemas.microsoft.com/office/powerpoint/2010/main" val="3889570862"/>
+      </p:ext>
+    </p:extLst>
+  </p:cSld>
+  <p:clrMapOvr>
+    <a:masterClrMapping/>
+  </p:clrMapOvr>
+</p:sld>
+</file>
+
+<file path=ppt/slides/slide14.xml><?xml version="1.0" encoding="utf-8"?>
+<p:sld xmlns:a="http://schemas.openxmlformats.org/drawingml/2006/main" xmlns:r="http://schemas.openxmlformats.org/officeDocument/2006/relationships" xmlns:p="http://schemas.openxmlformats.org/presentationml/2006/main">
+  <p:cSld>
+    <p:spTree>
+      <p:nvGrpSpPr>
+        <p:cNvPr id="1" name=""/>
+        <p:cNvGrpSpPr/>
+        <p:nvPr/>
+      </p:nvGrpSpPr>
+      <p:grpSpPr>
+        <a:xfrm>
+          <a:off x="0" y="0"/>
+          <a:ext cx="0" cy="0"/>
+          <a:chOff x="0" y="0"/>
+          <a:chExt cx="0" cy="0"/>
+        </a:xfrm>
+      </p:grpSpPr>
+      <p:sp>
+        <p:nvSpPr>
+          <p:cNvPr id="2" name="Title 1"/>
+          <p:cNvSpPr>
+            <a:spLocks noGrp="1"/>
+          </p:cNvSpPr>
+          <p:nvPr>
+            <p:ph type="title"/>
+          </p:nvPr>
+        </p:nvSpPr>
+        <p:spPr/>
+        <p:txBody>
+          <a:bodyPr/>
+          <a:lstStyle/>
+          <a:p>
+            <a:r>
+              <a:rPr lang="en-US" b="1" dirty="0"/>
+              <a:t>Integrating </a:t>
+            </a:r>
+            <a:r>
+              <a:rPr lang="en-US" b="1" dirty="0" smtClean="0"/>
+              <a:t>JQuery Plugin into MVC/Razor/Html</a:t>
+            </a:r>
+            <a:endParaRPr lang="en-US" dirty="0"/>
+          </a:p>
+        </p:txBody>
+      </p:sp>
+      <p:sp>
+        <p:nvSpPr>
+          <p:cNvPr id="3" name="Content Placeholder 2"/>
+          <p:cNvSpPr>
+            <a:spLocks noGrp="1"/>
+          </p:cNvSpPr>
+          <p:nvPr>
+            <p:ph sz="half" idx="1"/>
+          </p:nvPr>
+        </p:nvSpPr>
+        <p:spPr/>
+        <p:txBody>
+          <a:bodyPr>
+            <a:normAutofit fontScale="25000" lnSpcReduction="20000"/>
+          </a:bodyPr>
+          <a:lstStyle/>
+          <a:p>
+            <a:pPr marL="0" indent="0">
+              <a:buNone/>
+            </a:pPr>
+            <a:r>
+              <a:rPr lang="en-US" sz="4000" b="1" dirty="0"/>
+              <a:t> </a:t>
+            </a:r>
+            <a:r>
+              <a:rPr lang="en-US" sz="4000" dirty="0"/>
+              <a:t>var</a:t>
+            </a:r>
+            <a:r>
+              <a:rPr lang="en-US" sz="4000" b="1" dirty="0"/>
+              <a:t> </a:t>
+            </a:r>
+            <a:r>
+              <a:rPr lang="en-US" sz="4000" dirty="0"/>
+              <a:t>items = [</a:t>
+            </a:r>
+          </a:p>
+          <a:p>
+            <a:pPr marL="0" indent="0">
+              <a:buNone/>
+            </a:pPr>
+            <a:r>
+              <a:rPr lang="en-US" sz="4000" dirty="0"/>
+              <a:t>             new primitives.orgdiagram.ItemConfig({</a:t>
+            </a:r>
+          </a:p>
+          <a:p>
+            <a:pPr marL="0" indent="0">
+              <a:buNone/>
+            </a:pPr>
+            <a:r>
+              <a:rPr lang="en-US" sz="4000" dirty="0"/>
+              <a:t>                    id: 0,</a:t>
+            </a:r>
+          </a:p>
+          <a:p>
+            <a:pPr marL="0" indent="0">
+              <a:buNone/>
+            </a:pPr>
+            <a:r>
+              <a:rPr lang="en-US" sz="4000" dirty="0"/>
+              <a:t>                    parent: null,</a:t>
+            </a:r>
+          </a:p>
+          <a:p>
+            <a:pPr marL="0" indent="0">
+              <a:buNone/>
+            </a:pPr>
+            <a:r>
+              <a:rPr lang="en-US" sz="4000" dirty="0"/>
+              <a:t>                    title: "Root Project here",</a:t>
+            </a:r>
+          </a:p>
+          <a:p>
+            <a:pPr marL="0" indent="0">
+              <a:buNone/>
+            </a:pPr>
+            <a:r>
+              <a:rPr lang="en-US" sz="4000" dirty="0"/>
+              <a:t>                    description: "Project Tree",</a:t>
+            </a:r>
+          </a:p>
+          <a:p>
+            <a:pPr marL="0" indent="0">
+              <a:buNone/>
+            </a:pPr>
+            <a:r>
+              <a:rPr lang="en-US" sz="4000" dirty="0"/>
+              <a:t>                    image: "demo/images/photos/a.png"</a:t>
+            </a:r>
+          </a:p>
+          <a:p>
+            <a:pPr marL="0" indent="0">
+              <a:buNone/>
+            </a:pPr>
+            <a:r>
+              <a:rPr lang="en-US" sz="4000" dirty="0"/>
+              <a:t>                }),</a:t>
+            </a:r>
+          </a:p>
+          <a:p>
+            <a:pPr marL="0" indent="0">
+              <a:buNone/>
+            </a:pPr>
+            <a:r>
+              <a:rPr lang="en-US" sz="4000" dirty="0"/>
+              <a:t>             new primitives.orgdiagram.ItemConfig({</a:t>
+            </a:r>
+          </a:p>
+          <a:p>
+            <a:pPr marL="0" indent="0">
+              <a:buNone/>
+            </a:pPr>
+            <a:r>
+              <a:rPr lang="en-US" sz="4000" dirty="0"/>
+              <a:t>                    id: 2,</a:t>
+            </a:r>
+          </a:p>
+          <a:p>
+            <a:pPr marL="0" indent="0">
+              <a:buNone/>
+            </a:pPr>
+            <a:r>
+              <a:rPr lang="en-US" sz="4000" dirty="0"/>
+              <a:t>                    parent: 0,</a:t>
+            </a:r>
+          </a:p>
+          <a:p>
+            <a:pPr marL="0" indent="0">
+              <a:buNone/>
+            </a:pPr>
+            <a:r>
+              <a:rPr lang="en-US" sz="4000" dirty="0"/>
+              <a:t>                    title: "Senior Project",</a:t>
+            </a:r>
+          </a:p>
+          <a:p>
+            <a:pPr marL="0" indent="0">
+              <a:buNone/>
+            </a:pPr>
+            <a:r>
+              <a:rPr lang="en-US" sz="4000" dirty="0"/>
+              <a:t>                    description: "Fabulous",</a:t>
+            </a:r>
+          </a:p>
+          <a:p>
+            <a:pPr marL="0" indent="0">
+              <a:buNone/>
+            </a:pPr>
+            <a:r>
+              <a:rPr lang="en-US" sz="4000" dirty="0"/>
+              <a:t>                    image: "demo/images/photos/c.png"</a:t>
+            </a:r>
+          </a:p>
+          <a:p>
+            <a:pPr marL="0" indent="0">
+              <a:buNone/>
+            </a:pPr>
+            <a:r>
+              <a:rPr lang="en-US" sz="4000" dirty="0"/>
+              <a:t>                </a:t>
+            </a:r>
+            <a:r>
+              <a:rPr lang="en-US" sz="4000" dirty="0" smtClean="0"/>
+              <a:t>})</a:t>
+            </a:r>
+            <a:endParaRPr lang="en-US" sz="4000" dirty="0"/>
+          </a:p>
+          <a:p>
+            <a:pPr marL="0" indent="0">
+              <a:buNone/>
+            </a:pPr>
+            <a:r>
+              <a:rPr lang="en-US" sz="4000" dirty="0"/>
+              <a:t>            ];</a:t>
+            </a:r>
+          </a:p>
+          <a:p>
+            <a:pPr marL="0" indent="0">
+              <a:buNone/>
+            </a:pPr>
+            <a:r>
+              <a:rPr lang="en-US" dirty="0"/>
+              <a:t> </a:t>
+            </a:r>
+          </a:p>
+          <a:p>
+            <a:endParaRPr lang="en-US" dirty="0"/>
+          </a:p>
+        </p:txBody>
+      </p:sp>
+      <p:sp>
+        <p:nvSpPr>
+          <p:cNvPr id="4" name="Content Placeholder 3"/>
+          <p:cNvSpPr>
+            <a:spLocks noGrp="1"/>
+          </p:cNvSpPr>
+          <p:nvPr>
+            <p:ph sz="half" idx="2"/>
+          </p:nvPr>
+        </p:nvSpPr>
+        <p:spPr/>
+        <p:txBody>
+          <a:bodyPr>
+            <a:normAutofit fontScale="25000" lnSpcReduction="20000"/>
+          </a:bodyPr>
+          <a:lstStyle/>
+          <a:p>
+            <a:pPr marL="0" indent="0">
+              <a:lnSpc>
+                <a:spcPct val="120000"/>
+              </a:lnSpc>
+              <a:spcBef>
+                <a:spcPts val="600"/>
+              </a:spcBef>
+              <a:buNone/>
+            </a:pPr>
+            <a:r>
+              <a:rPr lang="en-US" sz="4000" dirty="0"/>
+              <a:t>var newItem ;</a:t>
+            </a:r>
+          </a:p>
+          <a:p>
+            <a:pPr marL="0" indent="0">
+              <a:lnSpc>
+                <a:spcPct val="120000"/>
+              </a:lnSpc>
+              <a:spcBef>
+                <a:spcPts val="600"/>
+              </a:spcBef>
+              <a:buNone/>
+            </a:pPr>
+            <a:r>
+              <a:rPr lang="en-US" sz="4000" dirty="0"/>
+              <a:t>var items = [ ];</a:t>
+            </a:r>
+          </a:p>
+          <a:p>
+            <a:pPr marL="0" indent="0">
+              <a:lnSpc>
+                <a:spcPct val="120000"/>
+              </a:lnSpc>
+              <a:spcBef>
+                <a:spcPts val="600"/>
+              </a:spcBef>
+              <a:buNone/>
+            </a:pPr>
+            <a:r>
+              <a:rPr lang="en-US" sz="4000" dirty="0"/>
+              <a:t> @foreach(var item in Model)</a:t>
+            </a:r>
+          </a:p>
+          <a:p>
+            <a:pPr marL="0" indent="0">
+              <a:lnSpc>
+                <a:spcPct val="120000"/>
+              </a:lnSpc>
+              <a:spcBef>
+                <a:spcPts val="600"/>
+              </a:spcBef>
+              <a:buNone/>
+            </a:pPr>
+            <a:r>
+              <a:rPr lang="en-US" sz="4000" dirty="0" smtClean="0"/>
+              <a:t>   </a:t>
+            </a:r>
+            <a:r>
+              <a:rPr lang="en-US" sz="4000" dirty="0"/>
+              <a:t>{</a:t>
+            </a:r>
+          </a:p>
+          <a:p>
+            <a:pPr marL="0" indent="0">
+              <a:lnSpc>
+                <a:spcPct val="120000"/>
+              </a:lnSpc>
+              <a:spcBef>
+                <a:spcPts val="600"/>
+              </a:spcBef>
+              <a:buNone/>
+            </a:pPr>
+            <a:r>
+              <a:rPr lang="en-US" sz="4000" dirty="0" smtClean="0"/>
+              <a:t>    </a:t>
+            </a:r>
+            <a:r>
+              <a:rPr lang="en-US" sz="4000" dirty="0"/>
+              <a:t>@:newItem = new primitives.orgdiagram.ItemConfig</a:t>
+            </a:r>
+            <a:r>
+              <a:rPr lang="en-US" sz="4000" dirty="0" smtClean="0"/>
+              <a:t>({</a:t>
+            </a:r>
+          </a:p>
+          <a:p>
+            <a:pPr marL="0" indent="0">
+              <a:lnSpc>
+                <a:spcPct val="120000"/>
+              </a:lnSpc>
+              <a:spcBef>
+                <a:spcPts val="600"/>
+              </a:spcBef>
+              <a:buNone/>
+            </a:pPr>
+            <a:r>
+              <a:rPr lang="en-US" sz="4000" dirty="0" smtClean="0"/>
+              <a:t>          </a:t>
+            </a:r>
+            <a:r>
+              <a:rPr lang="en-US" sz="4000" dirty="0"/>
+              <a:t>id: '@(item.ID</a:t>
+            </a:r>
+            <a:r>
+              <a:rPr lang="en-US" sz="4000" dirty="0" smtClean="0"/>
+              <a:t>)',</a:t>
+            </a:r>
+          </a:p>
+          <a:p>
+            <a:pPr marL="0" indent="0">
+              <a:lnSpc>
+                <a:spcPct val="120000"/>
+              </a:lnSpc>
+              <a:spcBef>
+                <a:spcPts val="600"/>
+              </a:spcBef>
+              <a:buNone/>
+            </a:pPr>
+            <a:r>
+              <a:rPr lang="en-US" sz="4000" dirty="0" smtClean="0"/>
+              <a:t>          parent</a:t>
+            </a:r>
+            <a:r>
+              <a:rPr lang="en-US" sz="4000" dirty="0"/>
+              <a:t>: '@(item.ParentID)', </a:t>
+            </a:r>
+            <a:endParaRPr lang="en-US" sz="4000" dirty="0" smtClean="0"/>
+          </a:p>
+          <a:p>
+            <a:pPr marL="0" indent="0">
+              <a:lnSpc>
+                <a:spcPct val="120000"/>
+              </a:lnSpc>
+              <a:spcBef>
+                <a:spcPts val="600"/>
+              </a:spcBef>
+              <a:buNone/>
+            </a:pPr>
+            <a:r>
+              <a:rPr lang="en-US" sz="4000" dirty="0" smtClean="0"/>
+              <a:t>          title</a:t>
+            </a:r>
+            <a:r>
+              <a:rPr lang="en-US" sz="4000" dirty="0"/>
+              <a:t>: '@(item.Title)', </a:t>
+            </a:r>
+            <a:endParaRPr lang="en-US" sz="4000" dirty="0" smtClean="0"/>
+          </a:p>
+          <a:p>
+            <a:pPr marL="0" indent="0">
+              <a:lnSpc>
+                <a:spcPct val="120000"/>
+              </a:lnSpc>
+              <a:spcBef>
+                <a:spcPts val="600"/>
+              </a:spcBef>
+              <a:buNone/>
+            </a:pPr>
+            <a:r>
+              <a:rPr lang="en-US" sz="4000" dirty="0" smtClean="0"/>
+              <a:t>          description</a:t>
+            </a:r>
+            <a:r>
+              <a:rPr lang="en-US" sz="4000" dirty="0"/>
+              <a:t>: '@(item.Note)' </a:t>
+            </a:r>
+            <a:endParaRPr lang="en-US" sz="4000" dirty="0" smtClean="0"/>
+          </a:p>
+          <a:p>
+            <a:pPr marL="0" indent="0">
+              <a:lnSpc>
+                <a:spcPct val="120000"/>
+              </a:lnSpc>
+              <a:spcBef>
+                <a:spcPts val="600"/>
+              </a:spcBef>
+              <a:buNone/>
+            </a:pPr>
+            <a:r>
+              <a:rPr lang="en-US" sz="4000" dirty="0" smtClean="0"/>
+              <a:t>    });</a:t>
+            </a:r>
+            <a:endParaRPr lang="en-US" sz="4000" dirty="0"/>
+          </a:p>
+          <a:p>
+            <a:pPr marL="0" indent="0">
+              <a:lnSpc>
+                <a:spcPct val="120000"/>
+              </a:lnSpc>
+              <a:spcBef>
+                <a:spcPts val="600"/>
+              </a:spcBef>
+              <a:buNone/>
+            </a:pPr>
+            <a:r>
+              <a:rPr lang="en-US" sz="4000" dirty="0"/>
+              <a:t> @:if('@item.ParentID' == '0') </a:t>
+            </a:r>
+            <a:endParaRPr lang="en-US" sz="4000" dirty="0" smtClean="0"/>
+          </a:p>
+          <a:p>
+            <a:pPr marL="0" indent="0">
+              <a:lnSpc>
+                <a:spcPct val="120000"/>
+              </a:lnSpc>
+              <a:spcBef>
+                <a:spcPts val="600"/>
+              </a:spcBef>
+              <a:buNone/>
+            </a:pPr>
+            <a:r>
+              <a:rPr lang="en-US" sz="4000" dirty="0" smtClean="0"/>
+              <a:t> @: {@: </a:t>
+            </a:r>
+            <a:r>
+              <a:rPr lang="en-US" sz="4000" dirty="0"/>
+              <a:t>var headparent =  0 ;</a:t>
+            </a:r>
+          </a:p>
+          <a:p>
+            <a:pPr marL="0" indent="0">
+              <a:lnSpc>
+                <a:spcPct val="120000"/>
+              </a:lnSpc>
+              <a:spcBef>
+                <a:spcPts val="600"/>
+              </a:spcBef>
+              <a:buNone/>
+            </a:pPr>
+            <a:r>
+              <a:rPr lang="en-US" sz="4000" dirty="0"/>
+              <a:t> @: newItem.parent =  null ;</a:t>
+            </a:r>
+          </a:p>
+          <a:p>
+            <a:pPr marL="0" indent="0">
+              <a:lnSpc>
+                <a:spcPct val="120000"/>
+              </a:lnSpc>
+              <a:spcBef>
+                <a:spcPts val="600"/>
+              </a:spcBef>
+              <a:buNone/>
+            </a:pPr>
+            <a:r>
+              <a:rPr lang="en-US" sz="4000" dirty="0"/>
+              <a:t> @: } </a:t>
+            </a:r>
+          </a:p>
+          <a:p>
+            <a:pPr marL="0" indent="0">
+              <a:lnSpc>
+                <a:spcPct val="120000"/>
+              </a:lnSpc>
+              <a:spcBef>
+                <a:spcPts val="600"/>
+              </a:spcBef>
+              <a:buNone/>
+            </a:pPr>
+            <a:r>
+              <a:rPr lang="en-US" sz="4000" dirty="0"/>
+              <a:t> @:items.push(newItem);</a:t>
+            </a:r>
+          </a:p>
+          <a:p>
+            <a:pPr marL="0" indent="0">
+              <a:lnSpc>
+                <a:spcPct val="120000"/>
+              </a:lnSpc>
+              <a:spcBef>
+                <a:spcPts val="600"/>
+              </a:spcBef>
+              <a:buNone/>
+            </a:pPr>
+            <a:r>
+              <a:rPr lang="en-US" sz="4000" dirty="0"/>
+              <a:t> }</a:t>
+            </a:r>
+          </a:p>
+          <a:p>
+            <a:pPr marL="0" indent="0">
+              <a:lnSpc>
+                <a:spcPct val="120000"/>
+              </a:lnSpc>
+              <a:spcBef>
+                <a:spcPts val="600"/>
+              </a:spcBef>
+              <a:buNone/>
+            </a:pPr>
+            <a:endParaRPr lang="en-US" dirty="0"/>
+          </a:p>
+        </p:txBody>
+      </p:sp>
+    </p:spTree>
+    <p:extLst>
+      <p:ext uri="{BB962C8B-B14F-4D97-AF65-F5344CB8AC3E}">
+        <p14:creationId xmlns:p14="http://schemas.microsoft.com/office/powerpoint/2010/main" val="117463408"/>
       </p:ext>
     </p:extLst>
   </p:cSld>
@@ -10335,13 +10557,29 @@
         </p:nvSpPr>
         <p:spPr/>
         <p:txBody>
-          <a:bodyPr/>
+          <a:bodyPr>
+            <a:normAutofit fontScale="90000"/>
+          </a:bodyPr>
           <a:lstStyle/>
           <a:p>
             <a:r>
-              <a:rPr lang="en-US" b="1" dirty="0"/>
-              <a:t>Integrating javascript code into MVC/Razor/Html Model Beth</a:t>
-            </a:r>
+              <a:rPr lang="en-US" dirty="0"/>
+              <a:t/>
+            </a:r>
+            <a:br>
+              <a:rPr lang="en-US" dirty="0"/>
+            </a:br>
+            <a:r>
+              <a:rPr lang="en-US" b="1" dirty="0" smtClean="0"/>
+              <a:t>No change is a standalone change</a:t>
+            </a:r>
+            <a:r>
+              <a:rPr lang="en-US" dirty="0" smtClean="0"/>
+              <a:t/>
+            </a:r>
+            <a:br>
+              <a:rPr lang="en-US" dirty="0" smtClean="0"/>
+            </a:br>
             <a:endParaRPr lang="en-US" dirty="0"/>
           </a:p>
         </p:txBody>
@@ -10353,497 +10591,14 @@
             <a:spLocks noGrp="1"/>
           </p:cNvSpPr>
           <p:nvPr>
-            <p:ph sz="half" idx="1"/>
+            <p:ph idx="1"/>
           </p:nvPr>
         </p:nvSpPr>
         <p:spPr/>
         <p:txBody>
-          <a:bodyPr>
-            <a:normAutofit fontScale="25000" lnSpcReduction="20000"/>
-          </a:bodyPr>
+          <a:bodyPr/>
           <a:lstStyle/>
           <a:p>
-            <a:pPr marL="0" indent="0">
-              <a:buNone/>
-            </a:pPr>
-            <a:r>
-              <a:rPr lang="en-US" sz="4000" b="1" dirty="0"/>
-              <a:t> </a:t>
-            </a:r>
-            <a:r>
-              <a:rPr lang="en-US" sz="4000" dirty="0"/>
-              <a:t>var</a:t>
-            </a:r>
-            <a:r>
-              <a:rPr lang="en-US" sz="4000" b="1" dirty="0"/>
-              <a:t> </a:t>
-            </a:r>
-            <a:r>
-              <a:rPr lang="en-US" sz="4000" dirty="0"/>
-              <a:t>items = [</a:t>
-            </a:r>
-          </a:p>
-          <a:p>
-            <a:pPr marL="0" indent="0">
-              <a:buNone/>
-            </a:pPr>
-            <a:r>
-              <a:rPr lang="en-US" sz="4000" dirty="0"/>
-              <a:t>             new primitives.orgdiagram.ItemConfig({</a:t>
-            </a:r>
-          </a:p>
-          <a:p>
-            <a:pPr marL="0" indent="0">
-              <a:buNone/>
-            </a:pPr>
-            <a:r>
-              <a:rPr lang="en-US" sz="4000" dirty="0"/>
-              <a:t>                    id: 0,</a:t>
-            </a:r>
-          </a:p>
-          <a:p>
-            <a:pPr marL="0" indent="0">
-              <a:buNone/>
-            </a:pPr>
-            <a:r>
-              <a:rPr lang="en-US" sz="4000" dirty="0"/>
-              <a:t>                    parent: null,</a:t>
-            </a:r>
-          </a:p>
-          <a:p>
-            <a:pPr marL="0" indent="0">
-              <a:buNone/>
-            </a:pPr>
-            <a:r>
-              <a:rPr lang="en-US" sz="4000" dirty="0"/>
-              <a:t>                    title: "Root Project here",</a:t>
-            </a:r>
-          </a:p>
-          <a:p>
-            <a:pPr marL="0" indent="0">
-              <a:buNone/>
-            </a:pPr>
-            <a:r>
-              <a:rPr lang="en-US" sz="4000" dirty="0"/>
-              <a:t>                    description: "Project Tree",</a:t>
-            </a:r>
-          </a:p>
-          <a:p>
-            <a:pPr marL="0" indent="0">
-              <a:buNone/>
-            </a:pPr>
-            <a:r>
-              <a:rPr lang="en-US" sz="4000" dirty="0"/>
-              <a:t>                    image: "demo/images/photos/a.png"</a:t>
-            </a:r>
-          </a:p>
-          <a:p>
-            <a:pPr marL="0" indent="0">
-              <a:buNone/>
-            </a:pPr>
-            <a:r>
-              <a:rPr lang="en-US" sz="4000" dirty="0"/>
-              <a:t>                }),</a:t>
-            </a:r>
-          </a:p>
-          <a:p>
-            <a:pPr marL="0" indent="0">
-              <a:buNone/>
-            </a:pPr>
-            <a:r>
-              <a:rPr lang="en-US" sz="4000" dirty="0"/>
-              <a:t>             new primitives.orgdiagram.ItemConfig({</a:t>
-            </a:r>
-          </a:p>
-          <a:p>
-            <a:pPr marL="0" indent="0">
-              <a:buNone/>
-            </a:pPr>
-            <a:r>
-              <a:rPr lang="en-US" sz="4000" dirty="0"/>
-              <a:t>                    id: 2,</a:t>
-            </a:r>
-          </a:p>
-          <a:p>
-            <a:pPr marL="0" indent="0">
-              <a:buNone/>
-            </a:pPr>
-            <a:r>
-              <a:rPr lang="en-US" sz="4000" dirty="0"/>
-              <a:t>                    parent: 0,</a:t>
-            </a:r>
-          </a:p>
-          <a:p>
-            <a:pPr marL="0" indent="0">
-              <a:buNone/>
-            </a:pPr>
-            <a:r>
-              <a:rPr lang="en-US" sz="4000" dirty="0"/>
-              <a:t>                    title: "Senior Project",</a:t>
-            </a:r>
-          </a:p>
-          <a:p>
-            <a:pPr marL="0" indent="0">
-              <a:buNone/>
-            </a:pPr>
-            <a:r>
-              <a:rPr lang="en-US" sz="4000" dirty="0"/>
-              <a:t>                    description: "Fabulous",</a:t>
-            </a:r>
-          </a:p>
-          <a:p>
-            <a:pPr marL="0" indent="0">
-              <a:buNone/>
-            </a:pPr>
-            <a:r>
-              <a:rPr lang="en-US" sz="4000" dirty="0"/>
-              <a:t>                    image: "demo/images/photos/c.png"</a:t>
-            </a:r>
-          </a:p>
-          <a:p>
-            <a:pPr marL="0" indent="0">
-              <a:buNone/>
-            </a:pPr>
-            <a:r>
-              <a:rPr lang="en-US" sz="4000" dirty="0"/>
-              <a:t>                </a:t>
-            </a:r>
-            <a:r>
-              <a:rPr lang="en-US" sz="4000" dirty="0" smtClean="0"/>
-              <a:t>})</a:t>
-            </a:r>
-            <a:endParaRPr lang="en-US" sz="4000" dirty="0"/>
-          </a:p>
-          <a:p>
-            <a:pPr marL="0" indent="0">
-              <a:buNone/>
-            </a:pPr>
-            <a:r>
-              <a:rPr lang="en-US" sz="4000" dirty="0"/>
-              <a:t>            ];</a:t>
-            </a:r>
-          </a:p>
-          <a:p>
-            <a:pPr marL="0" indent="0">
-              <a:buNone/>
-            </a:pPr>
-            <a:r>
-              <a:rPr lang="en-US" dirty="0"/>
-              <a:t> </a:t>
-            </a:r>
-          </a:p>
-          <a:p>
-            <a:endParaRPr lang="en-US" dirty="0"/>
-          </a:p>
-        </p:txBody>
-      </p:sp>
-      <p:sp>
-        <p:nvSpPr>
-          <p:cNvPr id="4" name="Content Placeholder 3"/>
-          <p:cNvSpPr>
-            <a:spLocks noGrp="1"/>
-          </p:cNvSpPr>
-          <p:nvPr>
-            <p:ph sz="half" idx="2"/>
-          </p:nvPr>
-        </p:nvSpPr>
-        <p:spPr/>
-        <p:txBody>
-          <a:bodyPr>
-            <a:normAutofit fontScale="25000" lnSpcReduction="20000"/>
-          </a:bodyPr>
-          <a:lstStyle/>
-          <a:p>
-            <a:pPr marL="0" indent="0">
-              <a:lnSpc>
-                <a:spcPct val="120000"/>
-              </a:lnSpc>
-              <a:spcBef>
-                <a:spcPts val="600"/>
-              </a:spcBef>
-              <a:buNone/>
-            </a:pPr>
-            <a:r>
-              <a:rPr lang="en-US" sz="4000" dirty="0"/>
-              <a:t>var newItem ;</a:t>
-            </a:r>
-          </a:p>
-          <a:p>
-            <a:pPr marL="0" indent="0">
-              <a:lnSpc>
-                <a:spcPct val="120000"/>
-              </a:lnSpc>
-              <a:spcBef>
-                <a:spcPts val="600"/>
-              </a:spcBef>
-              <a:buNone/>
-            </a:pPr>
-            <a:r>
-              <a:rPr lang="en-US" sz="4000" dirty="0"/>
-              <a:t>var items = [ ];</a:t>
-            </a:r>
-          </a:p>
-          <a:p>
-            <a:pPr marL="0" indent="0">
-              <a:lnSpc>
-                <a:spcPct val="120000"/>
-              </a:lnSpc>
-              <a:spcBef>
-                <a:spcPts val="600"/>
-              </a:spcBef>
-              <a:buNone/>
-            </a:pPr>
-            <a:r>
-              <a:rPr lang="en-US" sz="4000" dirty="0"/>
-              <a:t> @foreach(var item in Model)</a:t>
-            </a:r>
-          </a:p>
-          <a:p>
-            <a:pPr marL="0" indent="0">
-              <a:lnSpc>
-                <a:spcPct val="120000"/>
-              </a:lnSpc>
-              <a:spcBef>
-                <a:spcPts val="600"/>
-              </a:spcBef>
-              <a:buNone/>
-            </a:pPr>
-            <a:r>
-              <a:rPr lang="en-US" sz="4000" dirty="0" smtClean="0"/>
-              <a:t>   </a:t>
-            </a:r>
-            <a:r>
-              <a:rPr lang="en-US" sz="4000" dirty="0"/>
-              <a:t>{</a:t>
-            </a:r>
-          </a:p>
-          <a:p>
-            <a:pPr marL="0" indent="0">
-              <a:lnSpc>
-                <a:spcPct val="120000"/>
-              </a:lnSpc>
-              <a:spcBef>
-                <a:spcPts val="600"/>
-              </a:spcBef>
-              <a:buNone/>
-            </a:pPr>
-            <a:r>
-              <a:rPr lang="en-US" sz="4000" dirty="0" smtClean="0"/>
-              <a:t>    </a:t>
-            </a:r>
-            <a:r>
-              <a:rPr lang="en-US" sz="4000" dirty="0"/>
-              <a:t>@:newItem = new primitives.orgdiagram.ItemConfig</a:t>
-            </a:r>
-            <a:r>
-              <a:rPr lang="en-US" sz="4000" dirty="0" smtClean="0"/>
-              <a:t>({</a:t>
-            </a:r>
-          </a:p>
-          <a:p>
-            <a:pPr marL="0" indent="0">
-              <a:lnSpc>
-                <a:spcPct val="120000"/>
-              </a:lnSpc>
-              <a:spcBef>
-                <a:spcPts val="600"/>
-              </a:spcBef>
-              <a:buNone/>
-            </a:pPr>
-            <a:r>
-              <a:rPr lang="en-US" sz="4000" dirty="0" smtClean="0"/>
-              <a:t>          </a:t>
-            </a:r>
-            <a:r>
-              <a:rPr lang="en-US" sz="4000" dirty="0"/>
-              <a:t>id: '@(item.ID</a:t>
-            </a:r>
-            <a:r>
-              <a:rPr lang="en-US" sz="4000" dirty="0" smtClean="0"/>
-              <a:t>)',</a:t>
-            </a:r>
-          </a:p>
-          <a:p>
-            <a:pPr marL="0" indent="0">
-              <a:lnSpc>
-                <a:spcPct val="120000"/>
-              </a:lnSpc>
-              <a:spcBef>
-                <a:spcPts val="600"/>
-              </a:spcBef>
-              <a:buNone/>
-            </a:pPr>
-            <a:r>
-              <a:rPr lang="en-US" sz="4000" dirty="0" smtClean="0"/>
-              <a:t>          parent</a:t>
-            </a:r>
-            <a:r>
-              <a:rPr lang="en-US" sz="4000" dirty="0"/>
-              <a:t>: '@(item.ParentID)', </a:t>
-            </a:r>
-            <a:endParaRPr lang="en-US" sz="4000" dirty="0" smtClean="0"/>
-          </a:p>
-          <a:p>
-            <a:pPr marL="0" indent="0">
-              <a:lnSpc>
-                <a:spcPct val="120000"/>
-              </a:lnSpc>
-              <a:spcBef>
-                <a:spcPts val="600"/>
-              </a:spcBef>
-              <a:buNone/>
-            </a:pPr>
-            <a:r>
-              <a:rPr lang="en-US" sz="4000" dirty="0" smtClean="0"/>
-              <a:t>          title</a:t>
-            </a:r>
-            <a:r>
-              <a:rPr lang="en-US" sz="4000" dirty="0"/>
-              <a:t>: '@(item.Title)', </a:t>
-            </a:r>
-            <a:endParaRPr lang="en-US" sz="4000" dirty="0" smtClean="0"/>
-          </a:p>
-          <a:p>
-            <a:pPr marL="0" indent="0">
-              <a:lnSpc>
-                <a:spcPct val="120000"/>
-              </a:lnSpc>
-              <a:spcBef>
-                <a:spcPts val="600"/>
-              </a:spcBef>
-              <a:buNone/>
-            </a:pPr>
-            <a:r>
-              <a:rPr lang="en-US" sz="4000" dirty="0" smtClean="0"/>
-              <a:t>          description</a:t>
-            </a:r>
-            <a:r>
-              <a:rPr lang="en-US" sz="4000" dirty="0"/>
-              <a:t>: '@(item.Note)' </a:t>
-            </a:r>
-            <a:endParaRPr lang="en-US" sz="4000" dirty="0" smtClean="0"/>
-          </a:p>
-          <a:p>
-            <a:pPr marL="0" indent="0">
-              <a:lnSpc>
-                <a:spcPct val="120000"/>
-              </a:lnSpc>
-              <a:spcBef>
-                <a:spcPts val="600"/>
-              </a:spcBef>
-              <a:buNone/>
-            </a:pPr>
-            <a:r>
-              <a:rPr lang="en-US" sz="4000" dirty="0" smtClean="0"/>
-              <a:t>    });</a:t>
-            </a:r>
-            <a:endParaRPr lang="en-US" sz="4000" dirty="0"/>
-          </a:p>
-          <a:p>
-            <a:pPr marL="0" indent="0">
-              <a:lnSpc>
-                <a:spcPct val="120000"/>
-              </a:lnSpc>
-              <a:spcBef>
-                <a:spcPts val="600"/>
-              </a:spcBef>
-              <a:buNone/>
-            </a:pPr>
-            <a:r>
-              <a:rPr lang="en-US" sz="4000" dirty="0"/>
-              <a:t> @:if('@item.ParentID' == '0') </a:t>
-            </a:r>
-            <a:endParaRPr lang="en-US" sz="4000" dirty="0" smtClean="0"/>
-          </a:p>
-          <a:p>
-            <a:pPr marL="0" indent="0">
-              <a:lnSpc>
-                <a:spcPct val="120000"/>
-              </a:lnSpc>
-              <a:spcBef>
-                <a:spcPts val="600"/>
-              </a:spcBef>
-              <a:buNone/>
-            </a:pPr>
-            <a:r>
-              <a:rPr lang="en-US" sz="4000" dirty="0" smtClean="0"/>
-              <a:t> @: {@: </a:t>
-            </a:r>
-            <a:r>
-              <a:rPr lang="en-US" sz="4000" dirty="0"/>
-              <a:t>var headparent =  0 ;</a:t>
-            </a:r>
-          </a:p>
-          <a:p>
-            <a:pPr marL="0" indent="0">
-              <a:lnSpc>
-                <a:spcPct val="120000"/>
-              </a:lnSpc>
-              <a:spcBef>
-                <a:spcPts val="600"/>
-              </a:spcBef>
-              <a:buNone/>
-            </a:pPr>
-            <a:r>
-              <a:rPr lang="en-US" sz="4000" dirty="0"/>
-              <a:t> @: newItem.parent =  null ;</a:t>
-            </a:r>
-          </a:p>
-          <a:p>
-            <a:pPr marL="0" indent="0">
-              <a:lnSpc>
-                <a:spcPct val="120000"/>
-              </a:lnSpc>
-              <a:spcBef>
-                <a:spcPts val="600"/>
-              </a:spcBef>
-              <a:buNone/>
-            </a:pPr>
-            <a:r>
-              <a:rPr lang="en-US" sz="4000" dirty="0"/>
-              <a:t> @: } </a:t>
-            </a:r>
-          </a:p>
-          <a:p>
-            <a:pPr marL="0" indent="0">
-              <a:lnSpc>
-                <a:spcPct val="120000"/>
-              </a:lnSpc>
-              <a:spcBef>
-                <a:spcPts val="600"/>
-              </a:spcBef>
-              <a:buNone/>
-            </a:pPr>
-            <a:r>
-              <a:rPr lang="en-US" sz="4000" dirty="0"/>
-              <a:t> @:items.push(newItem);</a:t>
-            </a:r>
-          </a:p>
-          <a:p>
-            <a:pPr marL="0" indent="0">
-              <a:lnSpc>
-                <a:spcPct val="120000"/>
-              </a:lnSpc>
-              <a:spcBef>
-                <a:spcPts val="600"/>
-              </a:spcBef>
-              <a:buNone/>
-            </a:pPr>
-            <a:r>
-              <a:rPr lang="en-US" sz="4000" dirty="0"/>
-              <a:t> }</a:t>
-            </a:r>
-          </a:p>
-          <a:p>
-            <a:pPr marL="0" indent="0">
-              <a:lnSpc>
-                <a:spcPct val="120000"/>
-              </a:lnSpc>
-              <a:spcBef>
-                <a:spcPts val="600"/>
-              </a:spcBef>
-              <a:buNone/>
-            </a:pPr>
             <a:endParaRPr lang="en-US" dirty="0"/>
           </a:p>
         </p:txBody>
@@ -10851,7 +10606,590 @@
     </p:spTree>
     <p:extLst>
       <p:ext uri="{BB962C8B-B14F-4D97-AF65-F5344CB8AC3E}">
-        <p14:creationId xmlns:p14="http://schemas.microsoft.com/office/powerpoint/2010/main" val="117463408"/>
+        <p14:creationId xmlns:p14="http://schemas.microsoft.com/office/powerpoint/2010/main" val="165046885"/>
+      </p:ext>
+    </p:extLst>
+  </p:cSld>
+  <p:clrMapOvr>
+    <a:masterClrMapping/>
+  </p:clrMapOvr>
+  <p:timing>
+    <p:tnLst>
+      <p:par>
+        <p:cTn id="1" dur="indefinite" restart="never" nodeType="tmRoot"/>
+      </p:par>
+    </p:tnLst>
+  </p:timing>
+</p:sld>
+</file>
+
+<file path=ppt/slides/slide16.xml><?xml version="1.0" encoding="utf-8"?>
+<p:sld xmlns:a="http://schemas.openxmlformats.org/drawingml/2006/main" xmlns:r="http://schemas.openxmlformats.org/officeDocument/2006/relationships" xmlns:p="http://schemas.openxmlformats.org/presentationml/2006/main">
+  <p:cSld>
+    <p:spTree>
+      <p:nvGrpSpPr>
+        <p:cNvPr id="1" name=""/>
+        <p:cNvGrpSpPr/>
+        <p:nvPr/>
+      </p:nvGrpSpPr>
+      <p:grpSpPr>
+        <a:xfrm>
+          <a:off x="0" y="0"/>
+          <a:ext cx="0" cy="0"/>
+          <a:chOff x="0" y="0"/>
+          <a:chExt cx="0" cy="0"/>
+        </a:xfrm>
+      </p:grpSpPr>
+      <p:sp>
+        <p:nvSpPr>
+          <p:cNvPr id="2" name="Title 1"/>
+          <p:cNvSpPr>
+            <a:spLocks noGrp="1"/>
+          </p:cNvSpPr>
+          <p:nvPr>
+            <p:ph type="title"/>
+          </p:nvPr>
+        </p:nvSpPr>
+        <p:spPr>
+          <a:xfrm>
+            <a:off x="-105261" y="2232454"/>
+            <a:ext cx="8596668" cy="774357"/>
+          </a:xfrm>
+        </p:spPr>
+        <p:txBody>
+          <a:bodyPr>
+            <a:noAutofit/>
+          </a:bodyPr>
+          <a:lstStyle/>
+          <a:p>
+            <a:pPr algn="ctr"/>
+            <a:r>
+              <a:rPr lang="en-US" sz="5400" dirty="0" smtClean="0"/>
+              <a:t>Demo</a:t>
+            </a:r>
+            <a:br>
+              <a:rPr lang="en-US" sz="5400" dirty="0" smtClean="0"/>
+            </a:br>
+            <a:r>
+              <a:rPr lang="en-US" sz="5400" dirty="0" smtClean="0"/>
+              <a:t>Backlog</a:t>
+            </a:r>
+            <a:endParaRPr lang="en-US" sz="5400" dirty="0"/>
+          </a:p>
+        </p:txBody>
+      </p:sp>
+    </p:spTree>
+    <p:extLst>
+      <p:ext uri="{BB962C8B-B14F-4D97-AF65-F5344CB8AC3E}">
+        <p14:creationId xmlns:p14="http://schemas.microsoft.com/office/powerpoint/2010/main" val="4221975140"/>
+      </p:ext>
+    </p:extLst>
+  </p:cSld>
+  <p:clrMapOvr>
+    <a:masterClrMapping/>
+  </p:clrMapOvr>
+  <p:timing>
+    <p:tnLst>
+      <p:par>
+        <p:cTn id="1" dur="indefinite" restart="never" nodeType="tmRoot"/>
+      </p:par>
+    </p:tnLst>
+  </p:timing>
+</p:sld>
+</file>
+
+<file path=ppt/slides/slide17.xml><?xml version="1.0" encoding="utf-8"?>
+<p:sld xmlns:a="http://schemas.openxmlformats.org/drawingml/2006/main" xmlns:r="http://schemas.openxmlformats.org/officeDocument/2006/relationships" xmlns:p="http://schemas.openxmlformats.org/presentationml/2006/main">
+  <p:cSld>
+    <p:spTree>
+      <p:nvGrpSpPr>
+        <p:cNvPr id="1" name=""/>
+        <p:cNvGrpSpPr/>
+        <p:nvPr/>
+      </p:nvGrpSpPr>
+      <p:grpSpPr>
+        <a:xfrm>
+          <a:off x="0" y="0"/>
+          <a:ext cx="0" cy="0"/>
+          <a:chOff x="0" y="0"/>
+          <a:chExt cx="0" cy="0"/>
+        </a:xfrm>
+      </p:grpSpPr>
+      <p:sp>
+        <p:nvSpPr>
+          <p:cNvPr id="5" name="Rectangle 4"/>
+          <p:cNvSpPr/>
+          <p:nvPr/>
+        </p:nvSpPr>
+        <p:spPr>
+          <a:xfrm>
+            <a:off x="1285103" y="2577381"/>
+            <a:ext cx="6096000" cy="2679836"/>
+          </a:xfrm>
+          <a:prstGeom prst="rect">
+            <a:avLst/>
+          </a:prstGeom>
+        </p:spPr>
+        <p:txBody>
+          <a:bodyPr>
+            <a:spAutoFit/>
+          </a:bodyPr>
+          <a:lstStyle/>
+          <a:p>
+            <a:pPr>
+              <a:lnSpc>
+                <a:spcPct val="107000"/>
+              </a:lnSpc>
+              <a:spcAft>
+                <a:spcPts val="800"/>
+              </a:spcAft>
+            </a:pPr>
+            <a:r>
+              <a:rPr lang="en-US" dirty="0">
+                <a:latin typeface="Calibri" panose="020F0502020204030204" pitchFamily="34" charset="0"/>
+                <a:ea typeface="Calibri" panose="020F0502020204030204" pitchFamily="34" charset="0"/>
+                <a:cs typeface="Times New Roman" panose="02020603050405020304" pitchFamily="18" charset="0"/>
+              </a:rPr>
+              <a:t>Start implementation sooner.</a:t>
+            </a:r>
+          </a:p>
+          <a:p>
+            <a:pPr>
+              <a:lnSpc>
+                <a:spcPct val="107000"/>
+              </a:lnSpc>
+              <a:spcAft>
+                <a:spcPts val="800"/>
+              </a:spcAft>
+            </a:pPr>
+            <a:r>
+              <a:rPr lang="en-US" dirty="0">
+                <a:latin typeface="Calibri" panose="020F0502020204030204" pitchFamily="34" charset="0"/>
+                <a:ea typeface="Calibri" panose="020F0502020204030204" pitchFamily="34" charset="0"/>
+                <a:cs typeface="Times New Roman" panose="02020603050405020304" pitchFamily="18" charset="0"/>
+              </a:rPr>
+              <a:t>Waste less time </a:t>
+            </a:r>
+            <a:r>
+              <a:rPr lang="en-US" strike="sngStrike" dirty="0">
+                <a:latin typeface="Calibri" panose="020F0502020204030204" pitchFamily="34" charset="0"/>
+                <a:ea typeface="Calibri" panose="020F0502020204030204" pitchFamily="34" charset="0"/>
+                <a:cs typeface="Times New Roman" panose="02020603050405020304" pitchFamily="18" charset="0"/>
+              </a:rPr>
+              <a:t>arguing </a:t>
+            </a:r>
+            <a:r>
+              <a:rPr lang="en-US" dirty="0">
+                <a:latin typeface="Calibri" panose="020F0502020204030204" pitchFamily="34" charset="0"/>
+                <a:ea typeface="Calibri" panose="020F0502020204030204" pitchFamily="34" charset="0"/>
+                <a:cs typeface="Times New Roman" panose="02020603050405020304" pitchFamily="18" charset="0"/>
+              </a:rPr>
+              <a:t>discussing details before we’ve actually implemented anything.</a:t>
+            </a:r>
+          </a:p>
+          <a:p>
+            <a:pPr>
+              <a:lnSpc>
+                <a:spcPct val="107000"/>
+              </a:lnSpc>
+              <a:spcAft>
+                <a:spcPts val="800"/>
+              </a:spcAft>
+            </a:pPr>
+            <a:r>
+              <a:rPr lang="en-US" dirty="0">
+                <a:latin typeface="Calibri" panose="020F0502020204030204" pitchFamily="34" charset="0"/>
+                <a:ea typeface="Calibri" panose="020F0502020204030204" pitchFamily="34" charset="0"/>
+                <a:cs typeface="Times New Roman" panose="02020603050405020304" pitchFamily="18" charset="0"/>
+              </a:rPr>
+              <a:t>Use backlog tools sooner.</a:t>
+            </a:r>
+          </a:p>
+          <a:p>
+            <a:pPr>
+              <a:lnSpc>
+                <a:spcPct val="107000"/>
+              </a:lnSpc>
+              <a:spcAft>
+                <a:spcPts val="800"/>
+              </a:spcAft>
+            </a:pPr>
+            <a:r>
+              <a:rPr lang="en-US" dirty="0" smtClean="0">
+                <a:latin typeface="Calibri" panose="020F0502020204030204" pitchFamily="34" charset="0"/>
+                <a:ea typeface="Calibri" panose="020F0502020204030204" pitchFamily="34" charset="0"/>
+                <a:cs typeface="Times New Roman" panose="02020603050405020304" pitchFamily="18" charset="0"/>
+              </a:rPr>
+              <a:t>Work </a:t>
+            </a:r>
+            <a:r>
+              <a:rPr lang="en-US" dirty="0">
+                <a:latin typeface="Calibri" panose="020F0502020204030204" pitchFamily="34" charset="0"/>
+                <a:ea typeface="Calibri" panose="020F0502020204030204" pitchFamily="34" charset="0"/>
+                <a:cs typeface="Times New Roman" panose="02020603050405020304" pitchFamily="18" charset="0"/>
+              </a:rPr>
+              <a:t>hard to prioritize the work effort towards getting functionality before increasing design complexity</a:t>
+            </a:r>
+            <a:r>
+              <a:rPr lang="en-US" dirty="0" smtClean="0">
+                <a:latin typeface="Calibri" panose="020F0502020204030204" pitchFamily="34" charset="0"/>
+                <a:ea typeface="Calibri" panose="020F0502020204030204" pitchFamily="34" charset="0"/>
+                <a:cs typeface="Times New Roman" panose="02020603050405020304" pitchFamily="18" charset="0"/>
+              </a:rPr>
+              <a:t>.</a:t>
+            </a:r>
+          </a:p>
+          <a:p>
+            <a:pPr>
+              <a:lnSpc>
+                <a:spcPct val="107000"/>
+              </a:lnSpc>
+              <a:spcAft>
+                <a:spcPts val="800"/>
+              </a:spcAft>
+            </a:pPr>
+            <a:endParaRPr lang="en-US" dirty="0">
+              <a:latin typeface="Calibri" panose="020F0502020204030204" pitchFamily="34" charset="0"/>
+              <a:ea typeface="Calibri" panose="020F0502020204030204" pitchFamily="34" charset="0"/>
+              <a:cs typeface="Times New Roman" panose="02020603050405020304" pitchFamily="18" charset="0"/>
+            </a:endParaRPr>
+          </a:p>
+        </p:txBody>
+      </p:sp>
+      <p:sp>
+        <p:nvSpPr>
+          <p:cNvPr id="6" name="Title 1"/>
+          <p:cNvSpPr txBox="1">
+            <a:spLocks/>
+          </p:cNvSpPr>
+          <p:nvPr/>
+        </p:nvSpPr>
+        <p:spPr>
+          <a:xfrm>
+            <a:off x="1138653" y="980303"/>
+            <a:ext cx="8596668" cy="1320800"/>
+          </a:xfrm>
+          <a:prstGeom prst="rect">
+            <a:avLst/>
+          </a:prstGeom>
+        </p:spPr>
+        <p:txBody>
+          <a:bodyPr vert="horz" lIns="91440" tIns="45720" rIns="91440" bIns="45720" rtlCol="0" anchor="b">
+            <a:normAutofit fontScale="60000" lnSpcReduction="20000"/>
+          </a:bodyPr>
+          <a:lstStyle>
+            <a:lvl1pPr algn="r" defTabSz="457200" rtl="0" eaLnBrk="1" latinLnBrk="0" hangingPunct="1">
+              <a:spcBef>
+                <a:spcPct val="0"/>
+              </a:spcBef>
+              <a:buNone/>
+              <a:defRPr sz="5400" kern="1200">
+                <a:solidFill>
+                  <a:schemeClr val="accent1"/>
+                </a:solidFill>
+                <a:latin typeface="+mj-lt"/>
+                <a:ea typeface="+mj-ea"/>
+                <a:cs typeface="+mj-cs"/>
+              </a:defRPr>
+            </a:lvl1pPr>
+            <a:lvl2pPr eaLnBrk="1" hangingPunct="1">
+              <a:defRPr>
+                <a:solidFill>
+                  <a:schemeClr val="tx2"/>
+                </a:solidFill>
+              </a:defRPr>
+            </a:lvl2pPr>
+            <a:lvl3pPr eaLnBrk="1" hangingPunct="1">
+              <a:defRPr>
+                <a:solidFill>
+                  <a:schemeClr val="tx2"/>
+                </a:solidFill>
+              </a:defRPr>
+            </a:lvl3pPr>
+            <a:lvl4pPr eaLnBrk="1" hangingPunct="1">
+              <a:defRPr>
+                <a:solidFill>
+                  <a:schemeClr val="tx2"/>
+                </a:solidFill>
+              </a:defRPr>
+            </a:lvl4pPr>
+            <a:lvl5pPr eaLnBrk="1" hangingPunct="1">
+              <a:defRPr>
+                <a:solidFill>
+                  <a:schemeClr val="tx2"/>
+                </a:solidFill>
+              </a:defRPr>
+            </a:lvl5pPr>
+            <a:lvl6pPr eaLnBrk="1" hangingPunct="1">
+              <a:defRPr>
+                <a:solidFill>
+                  <a:schemeClr val="tx2"/>
+                </a:solidFill>
+              </a:defRPr>
+            </a:lvl6pPr>
+            <a:lvl7pPr eaLnBrk="1" hangingPunct="1">
+              <a:defRPr>
+                <a:solidFill>
+                  <a:schemeClr val="tx2"/>
+                </a:solidFill>
+              </a:defRPr>
+            </a:lvl7pPr>
+            <a:lvl8pPr eaLnBrk="1" hangingPunct="1">
+              <a:defRPr>
+                <a:solidFill>
+                  <a:schemeClr val="tx2"/>
+                </a:solidFill>
+              </a:defRPr>
+            </a:lvl8pPr>
+            <a:lvl9pPr eaLnBrk="1" hangingPunct="1">
+              <a:defRPr>
+                <a:solidFill>
+                  <a:schemeClr val="tx2"/>
+                </a:solidFill>
+              </a:defRPr>
+            </a:lvl9pPr>
+          </a:lstStyle>
+          <a:p>
+            <a:pPr algn="l"/>
+            <a:r>
+              <a:rPr lang="en-US" dirty="0" smtClean="0"/>
+              <a:t/>
+            </a:r>
+            <a:br>
+              <a:rPr lang="en-US" dirty="0" smtClean="0"/>
+            </a:br>
+            <a:r>
+              <a:rPr lang="en-US" b="1" dirty="0" smtClean="0"/>
+              <a:t>What we would do differently</a:t>
+            </a:r>
+            <a:r>
+              <a:rPr lang="en-US" dirty="0" smtClean="0"/>
+              <a:t/>
+            </a:r>
+            <a:br>
+              <a:rPr lang="en-US" dirty="0" smtClean="0"/>
+            </a:br>
+            <a:endParaRPr lang="en-US" dirty="0"/>
+          </a:p>
+        </p:txBody>
+      </p:sp>
+    </p:spTree>
+    <p:extLst>
+      <p:ext uri="{BB962C8B-B14F-4D97-AF65-F5344CB8AC3E}">
+        <p14:creationId xmlns:p14="http://schemas.microsoft.com/office/powerpoint/2010/main" val="3775469547"/>
+      </p:ext>
+    </p:extLst>
+  </p:cSld>
+  <p:clrMapOvr>
+    <a:masterClrMapping/>
+  </p:clrMapOvr>
+</p:sld>
+</file>
+
+<file path=ppt/slides/slide18.xml><?xml version="1.0" encoding="utf-8"?>
+<p:sld xmlns:a="http://schemas.openxmlformats.org/drawingml/2006/main" xmlns:r="http://schemas.openxmlformats.org/officeDocument/2006/relationships" xmlns:p="http://schemas.openxmlformats.org/presentationml/2006/main">
+  <p:cSld>
+    <p:spTree>
+      <p:nvGrpSpPr>
+        <p:cNvPr id="1" name=""/>
+        <p:cNvGrpSpPr/>
+        <p:nvPr/>
+      </p:nvGrpSpPr>
+      <p:grpSpPr>
+        <a:xfrm>
+          <a:off x="0" y="0"/>
+          <a:ext cx="0" cy="0"/>
+          <a:chOff x="0" y="0"/>
+          <a:chExt cx="0" cy="0"/>
+        </a:xfrm>
+      </p:grpSpPr>
+      <p:sp>
+        <p:nvSpPr>
+          <p:cNvPr id="2" name="Title 1"/>
+          <p:cNvSpPr>
+            <a:spLocks noGrp="1"/>
+          </p:cNvSpPr>
+          <p:nvPr>
+            <p:ph type="ctrTitle"/>
+          </p:nvPr>
+        </p:nvSpPr>
+        <p:spPr>
+          <a:xfrm>
+            <a:off x="1309359" y="2808188"/>
+            <a:ext cx="7766936" cy="1646302"/>
+          </a:xfrm>
+        </p:spPr>
+        <p:txBody>
+          <a:bodyPr/>
+          <a:lstStyle/>
+          <a:p>
+            <a:pPr lvl="0" algn="l" defTabSz="914400">
+              <a:lnSpc>
+                <a:spcPct val="107000"/>
+              </a:lnSpc>
+              <a:spcBef>
+                <a:spcPts val="0"/>
+              </a:spcBef>
+              <a:spcAft>
+                <a:spcPts val="800"/>
+              </a:spcAft>
+            </a:pPr>
+            <a:r>
+              <a:rPr lang="en-US" sz="2400" dirty="0">
+                <a:solidFill>
+                  <a:srgbClr val="70AD47"/>
+                </a:solidFill>
+                <a:latin typeface="Calibri" panose="020F0502020204030204" pitchFamily="34" charset="0"/>
+                <a:ea typeface="Calibri" panose="020F0502020204030204" pitchFamily="34" charset="0"/>
+                <a:cs typeface="Times New Roman" panose="02020603050405020304" pitchFamily="18" charset="0"/>
+              </a:rPr>
+              <a:t>We spent a lot of time upfront, developing a common vision of what we were doing. That early effort sustained us through some of the more challenging decisions.</a:t>
+            </a:r>
+            <a:br>
+              <a:rPr lang="en-US" sz="2400" dirty="0">
+                <a:solidFill>
+                  <a:srgbClr val="70AD47"/>
+                </a:solidFill>
+                <a:latin typeface="Calibri" panose="020F0502020204030204" pitchFamily="34" charset="0"/>
+                <a:ea typeface="Calibri" panose="020F0502020204030204" pitchFamily="34" charset="0"/>
+                <a:cs typeface="Times New Roman" panose="02020603050405020304" pitchFamily="18" charset="0"/>
+              </a:rPr>
+            </a:br>
+            <a:endParaRPr lang="en-US" sz="2400" dirty="0">
+              <a:solidFill>
+                <a:srgbClr val="70AD47"/>
+              </a:solidFill>
+            </a:endParaRPr>
+          </a:p>
+        </p:txBody>
+      </p:sp>
+    </p:spTree>
+    <p:extLst>
+      <p:ext uri="{BB962C8B-B14F-4D97-AF65-F5344CB8AC3E}">
+        <p14:creationId xmlns:p14="http://schemas.microsoft.com/office/powerpoint/2010/main" val="2797598185"/>
+      </p:ext>
+    </p:extLst>
+  </p:cSld>
+  <p:clrMapOvr>
+    <a:masterClrMapping/>
+  </p:clrMapOvr>
+</p:sld>
+</file>
+
+<file path=ppt/slides/slide19.xml><?xml version="1.0" encoding="utf-8"?>
+<p:sld xmlns:a="http://schemas.openxmlformats.org/drawingml/2006/main" xmlns:r="http://schemas.openxmlformats.org/officeDocument/2006/relationships" xmlns:p="http://schemas.openxmlformats.org/presentationml/2006/main">
+  <p:cSld>
+    <p:spTree>
+      <p:nvGrpSpPr>
+        <p:cNvPr id="1" name=""/>
+        <p:cNvGrpSpPr/>
+        <p:nvPr/>
+      </p:nvGrpSpPr>
+      <p:grpSpPr>
+        <a:xfrm>
+          <a:off x="0" y="0"/>
+          <a:ext cx="0" cy="0"/>
+          <a:chOff x="0" y="0"/>
+          <a:chExt cx="0" cy="0"/>
+        </a:xfrm>
+      </p:grpSpPr>
+      <p:sp>
+        <p:nvSpPr>
+          <p:cNvPr id="2" name="Title 1"/>
+          <p:cNvSpPr>
+            <a:spLocks noGrp="1"/>
+          </p:cNvSpPr>
+          <p:nvPr>
+            <p:ph type="ctrTitle"/>
+          </p:nvPr>
+        </p:nvSpPr>
+        <p:spPr>
+          <a:xfrm>
+            <a:off x="1298046" y="1911287"/>
+            <a:ext cx="7766936" cy="1646302"/>
+          </a:xfrm>
+        </p:spPr>
+        <p:txBody>
+          <a:bodyPr>
+            <a:normAutofit/>
+          </a:bodyPr>
+          <a:lstStyle/>
+          <a:p>
+            <a:pPr algn="ctr"/>
+            <a:r>
+              <a:rPr lang="en-US" sz="7200" dirty="0" smtClean="0">
+                <a:latin typeface="Big Caslon"/>
+                <a:cs typeface="Big Caslon"/>
+              </a:rPr>
+              <a:t>Plan</a:t>
+            </a:r>
+            <a:r>
+              <a:rPr lang="en-US" sz="7200" i="1" dirty="0" smtClean="0">
+                <a:solidFill>
+                  <a:srgbClr val="7F7F7F"/>
+                </a:solidFill>
+                <a:latin typeface="Big Caslon"/>
+                <a:cs typeface="Big Caslon"/>
+              </a:rPr>
+              <a:t>it</a:t>
+            </a:r>
+            <a:r>
+              <a:rPr lang="en-US" sz="7200" dirty="0" smtClean="0">
+                <a:solidFill>
+                  <a:srgbClr val="7F7F7F"/>
+                </a:solidFill>
+                <a:latin typeface="Big Caslon"/>
+                <a:cs typeface="Big Caslon"/>
+              </a:rPr>
+              <a:t>!</a:t>
+            </a:r>
+            <a:endParaRPr lang="en-US" sz="7200" dirty="0">
+              <a:solidFill>
+                <a:srgbClr val="7F7F7F"/>
+              </a:solidFill>
+              <a:latin typeface="Big Caslon"/>
+              <a:cs typeface="Big Caslon"/>
+            </a:endParaRPr>
+          </a:p>
+        </p:txBody>
+      </p:sp>
+      <p:sp>
+        <p:nvSpPr>
+          <p:cNvPr id="6" name="Rectangle 5"/>
+          <p:cNvSpPr/>
+          <p:nvPr/>
+        </p:nvSpPr>
+        <p:spPr>
+          <a:xfrm>
+            <a:off x="3919267" y="3393071"/>
+            <a:ext cx="2405850" cy="400110"/>
+          </a:xfrm>
+          <a:prstGeom prst="rect">
+            <a:avLst/>
+          </a:prstGeom>
+        </p:spPr>
+        <p:txBody>
+          <a:bodyPr wrap="none">
+            <a:spAutoFit/>
+          </a:bodyPr>
+          <a:lstStyle/>
+          <a:p>
+            <a:pPr algn="ctr"/>
+            <a:r>
+              <a:rPr lang="en-US" sz="2000" dirty="0">
+                <a:solidFill>
+                  <a:srgbClr val="70AD47"/>
+                </a:solidFill>
+              </a:rPr>
+              <a:t>We’re Here to Help</a:t>
+            </a:r>
+          </a:p>
+        </p:txBody>
+      </p:sp>
+    </p:spTree>
+    <p:extLst>
+      <p:ext uri="{BB962C8B-B14F-4D97-AF65-F5344CB8AC3E}">
+        <p14:creationId xmlns:p14="http://schemas.microsoft.com/office/powerpoint/2010/main" val="2624175973"/>
       </p:ext>
     </p:extLst>
   </p:cSld>
@@ -10893,8 +11231,8 @@
         </p:nvSpPr>
         <p:spPr>
           <a:xfrm>
-            <a:off x="2206498" y="612845"/>
-            <a:ext cx="6033454" cy="5599674"/>
+            <a:off x="1638087" y="1238921"/>
+            <a:ext cx="6033454" cy="4278094"/>
           </a:xfrm>
           <a:prstGeom prst="rect">
             <a:avLst/>
@@ -10906,82 +11244,110 @@
           </a:bodyPr>
           <a:lstStyle/>
           <a:p>
-            <a:pPr algn="ctr"/>
+            <a:r>
+              <a:rPr lang="en-US" sz="3600" dirty="0" smtClean="0">
+                <a:cs typeface="Calibri"/>
+              </a:rPr>
+              <a:t>Proposal Recap</a:t>
+            </a:r>
             <a:endParaRPr lang="en-US" sz="3600" dirty="0">
               <a:cs typeface="Calibri"/>
             </a:endParaRPr>
           </a:p>
           <a:p>
-            <a:pPr algn="ctr"/>
-            <a:r>
-              <a:rPr lang="en-US" sz="3600" dirty="0">
+            <a:pPr lvl="1"/>
+            <a:r>
+              <a:rPr lang="en-US" sz="3200" dirty="0">
                 <a:cs typeface="Calibri"/>
               </a:rPr>
               <a:t>Objectives</a:t>
             </a:r>
           </a:p>
           <a:p>
-            <a:pPr algn="ctr"/>
-            <a:r>
-              <a:rPr lang="en-US" sz="3600" dirty="0">
+            <a:pPr lvl="1"/>
+            <a:r>
+              <a:rPr lang="en-US" sz="3200" dirty="0" smtClean="0">
                 <a:cs typeface="Calibri"/>
               </a:rPr>
-              <a:t>Problem Specification</a:t>
-            </a:r>
-          </a:p>
-          <a:p>
-            <a:pPr algn="ctr"/>
-            <a:r>
-              <a:rPr lang="en-US" sz="3600" dirty="0">
+              <a:t>Tools </a:t>
+            </a:r>
+            <a:r>
+              <a:rPr lang="en-US" sz="3200" dirty="0">
                 <a:cs typeface="Calibri"/>
               </a:rPr>
-              <a:t>Solution Process/Design</a:t>
-            </a:r>
-          </a:p>
-          <a:p>
-            <a:pPr algn="ctr"/>
-            <a:r>
-              <a:rPr lang="en-US" sz="3600" dirty="0">
-                <a:cs typeface="Calibri"/>
-              </a:rPr>
-              <a:t>Tools List</a:t>
-            </a:r>
-          </a:p>
-          <a:p>
-            <a:pPr algn="ctr"/>
-            <a:r>
-              <a:rPr lang="en-US" sz="3600" dirty="0">
+              <a:t>List</a:t>
+            </a:r>
+          </a:p>
+          <a:p>
+            <a:pPr lvl="1"/>
+            <a:r>
+              <a:rPr lang="en-US" sz="3200" dirty="0">
                 <a:cs typeface="Calibri"/>
               </a:rPr>
               <a:t>Time Schedule</a:t>
             </a:r>
           </a:p>
           <a:p>
-            <a:pPr algn="ctr"/>
-            <a:r>
-              <a:rPr lang="en-US" sz="3600" dirty="0">
-                <a:cs typeface="Calibri"/>
-              </a:rPr>
-              <a:t>List of Deliverables</a:t>
-            </a:r>
-          </a:p>
-          <a:p>
-            <a:pPr algn="ctr"/>
-            <a:r>
-              <a:rPr lang="en-US" sz="3600" dirty="0">
+            <a:pPr lvl="1"/>
+            <a:r>
+              <a:rPr lang="en-US" sz="3200" dirty="0" smtClean="0">
                 <a:cs typeface="Calibri"/>
               </a:rPr>
               <a:t>Grading Scheme</a:t>
             </a:r>
           </a:p>
           <a:p>
-            <a:endParaRPr lang="en-US" sz="3388" dirty="0">
-              <a:solidFill>
-                <a:srgbClr val="000000"/>
-              </a:solidFill>
-              <a:latin typeface="Trebuchet MS"/>
+            <a:r>
+              <a:rPr lang="en-US" sz="3600" dirty="0" smtClean="0">
+                <a:cs typeface="Calibri"/>
+              </a:rPr>
+              <a:t>Project Retrospective</a:t>
+            </a:r>
+            <a:endParaRPr lang="en-US" sz="3600" dirty="0">
               <a:cs typeface="Calibri"/>
             </a:endParaRPr>
+          </a:p>
+          <a:p>
+            <a:r>
+              <a:rPr lang="en-US" sz="3600" dirty="0" smtClean="0">
+                <a:solidFill>
+                  <a:srgbClr val="99CC00"/>
+                </a:solidFill>
+                <a:latin typeface="Big Caslon"/>
+                <a:cs typeface="Big Caslon"/>
+              </a:rPr>
+              <a:t>Plan</a:t>
+            </a:r>
+            <a:r>
+              <a:rPr lang="en-US" sz="3600" i="1" dirty="0" smtClean="0">
+                <a:solidFill>
+                  <a:srgbClr val="7F7F7F"/>
+                </a:solidFill>
+                <a:latin typeface="Big Caslon"/>
+                <a:cs typeface="Big Caslon"/>
+              </a:rPr>
+              <a:t>it</a:t>
+            </a:r>
+            <a:r>
+              <a:rPr lang="en-US" sz="3600" dirty="0" smtClean="0">
+                <a:solidFill>
+                  <a:srgbClr val="7F7F7F"/>
+                </a:solidFill>
+                <a:latin typeface="Big Caslon"/>
+                <a:cs typeface="Big Caslon"/>
+              </a:rPr>
+              <a:t>!</a:t>
+            </a:r>
+            <a:r>
+              <a:rPr lang="en-US" sz="3600" dirty="0" smtClean="0">
+                <a:solidFill>
+                  <a:srgbClr val="000000"/>
+                </a:solidFill>
+                <a:latin typeface="Trebuchet MS"/>
+                <a:cs typeface="Calibri"/>
+              </a:rPr>
+              <a:t> Demo</a:t>
+            </a:r>
           </a:p>
           <a:p>
             <a:pPr algn="ctr"/>
@@ -14434,88 +14800,6 @@
           <a:lstStyle/>
           <a:p>
             <a:r>
-              <a:rPr lang="en-US"/>
-              <a:t>List of Deliverables</a:t>
-            </a:r>
-          </a:p>
-        </p:txBody>
-      </p:sp>
-      <p:pic>
-        <p:nvPicPr>
-          <p:cNvPr id="4" name="Content Placeholder 3" descr="Picture1.png"/>
-          <p:cNvPicPr>
-            <a:picLocks noGrp="1" noChangeAspect="1"/>
-          </p:cNvPicPr>
-          <p:nvPr>
-            <p:ph idx="1"/>
-          </p:nvPr>
-        </p:nvPicPr>
-        <p:blipFill>
-          <a:blip r:embed="rId3"/>
-          <a:stretch>
-            <a:fillRect/>
-          </a:stretch>
-        </p:blipFill>
-        <p:spPr>
-          <a:xfrm>
-            <a:off x="500213" y="1739006"/>
-            <a:ext cx="8547008" cy="3940171"/>
-          </a:xfrm>
-        </p:spPr>
-      </p:pic>
-    </p:spTree>
-    <p:extLst>
-      <p:ext uri="{BB962C8B-B14F-4D97-AF65-F5344CB8AC3E}">
-        <p14:creationId xmlns:p14="http://schemas.microsoft.com/office/powerpoint/2010/main" val="2599566711"/>
-      </p:ext>
-    </p:extLst>
-  </p:cSld>
-  <p:clrMapOvr>
-    <a:masterClrMapping/>
-  </p:clrMapOvr>
-  <p:timing>
-    <p:tnLst>
-      <p:par>
-        <p:cTn id="1" dur="indefinite" restart="never" nodeType="tmRoot"/>
-      </p:par>
-    </p:tnLst>
-  </p:timing>
-</p:sld>
-</file>
-
-<file path=ppt/slides/slide9.xml><?xml version="1.0" encoding="utf-8"?>
-<p:sld xmlns:a="http://schemas.openxmlformats.org/drawingml/2006/main" xmlns:r="http://schemas.openxmlformats.org/officeDocument/2006/relationships" xmlns:p="http://schemas.openxmlformats.org/presentationml/2006/main">
-  <p:cSld>
-    <p:spTree>
-      <p:nvGrpSpPr>
-        <p:cNvPr id="1" name=""/>
-        <p:cNvGrpSpPr/>
-        <p:nvPr/>
-      </p:nvGrpSpPr>
-      <p:grpSpPr>
-        <a:xfrm>
-          <a:off x="0" y="0"/>
-          <a:ext cx="0" cy="0"/>
-          <a:chOff x="0" y="0"/>
-          <a:chExt cx="0" cy="0"/>
-        </a:xfrm>
-      </p:grpSpPr>
-      <p:sp>
-        <p:nvSpPr>
-          <p:cNvPr id="2" name="Title 1"/>
-          <p:cNvSpPr>
-            <a:spLocks noGrp="1"/>
-          </p:cNvSpPr>
-          <p:nvPr>
-            <p:ph type="title"/>
-          </p:nvPr>
-        </p:nvSpPr>
-        <p:spPr/>
-        <p:txBody>
-          <a:bodyPr/>
-          <a:lstStyle/>
-          <a:p>
-            <a:r>
               <a:rPr lang="en-US" dirty="0"/>
               <a:t>Grading Scheme</a:t>
             </a:r>
@@ -15644,6 +15928,188 @@
 </p:sld>
 </file>
 
+<file path=ppt/slides/slide9.xml><?xml version="1.0" encoding="utf-8"?>
+<p:sld xmlns:a="http://schemas.openxmlformats.org/drawingml/2006/main" xmlns:r="http://schemas.openxmlformats.org/officeDocument/2006/relationships" xmlns:p="http://schemas.openxmlformats.org/presentationml/2006/main">
+  <p:cSld>
+    <p:spTree>
+      <p:nvGrpSpPr>
+        <p:cNvPr id="1" name=""/>
+        <p:cNvGrpSpPr/>
+        <p:nvPr/>
+      </p:nvGrpSpPr>
+      <p:grpSpPr>
+        <a:xfrm>
+          <a:off x="0" y="0"/>
+          <a:ext cx="0" cy="0"/>
+          <a:chOff x="0" y="0"/>
+          <a:chExt cx="0" cy="0"/>
+        </a:xfrm>
+      </p:grpSpPr>
+      <p:sp>
+        <p:nvSpPr>
+          <p:cNvPr id="2" name="Title 1"/>
+          <p:cNvSpPr>
+            <a:spLocks noGrp="1"/>
+          </p:cNvSpPr>
+          <p:nvPr>
+            <p:ph type="title"/>
+          </p:nvPr>
+        </p:nvSpPr>
+        <p:spPr/>
+        <p:txBody>
+          <a:bodyPr>
+            <a:normAutofit/>
+          </a:bodyPr>
+          <a:lstStyle/>
+          <a:p>
+            <a:pPr algn="ctr"/>
+            <a:r>
+              <a:rPr lang="en-US" sz="4000" dirty="0"/>
+              <a:t>Retrospective</a:t>
+            </a:r>
+            <a:endParaRPr lang="en-US" sz="4000" dirty="0"/>
+          </a:p>
+        </p:txBody>
+      </p:sp>
+      <p:sp>
+        <p:nvSpPr>
+          <p:cNvPr id="3" name="Content Placeholder 2"/>
+          <p:cNvSpPr>
+            <a:spLocks noGrp="1"/>
+          </p:cNvSpPr>
+          <p:nvPr>
+            <p:ph idx="1"/>
+          </p:nvPr>
+        </p:nvSpPr>
+        <p:spPr/>
+        <p:txBody>
+          <a:bodyPr>
+            <a:normAutofit/>
+          </a:bodyPr>
+          <a:lstStyle/>
+          <a:p>
+            <a:r>
+              <a:rPr lang="en-US" b="1" dirty="0" smtClean="0"/>
+              <a:t>Project Framework</a:t>
+            </a:r>
+          </a:p>
+          <a:p>
+            <a:r>
+              <a:rPr lang="en-US" b="1" dirty="0" smtClean="0"/>
+              <a:t>Doing </a:t>
+            </a:r>
+            <a:r>
+              <a:rPr lang="en-US" b="1" dirty="0"/>
+              <a:t>the first walkthrough of deploying to </a:t>
+            </a:r>
+            <a:r>
+              <a:rPr lang="en-US" b="1" dirty="0" smtClean="0"/>
+              <a:t>Azure </a:t>
+            </a:r>
+            <a:endParaRPr lang="en-US" b="1" dirty="0" smtClean="0"/>
+          </a:p>
+          <a:p>
+            <a:endParaRPr lang="en-US" b="1" dirty="0" smtClean="0"/>
+          </a:p>
+          <a:p>
+            <a:r>
+              <a:rPr lang="en-US" b="1" dirty="0" smtClean="0"/>
+              <a:t>The GIT </a:t>
+            </a:r>
+            <a:r>
+              <a:rPr lang="en-US" b="1" dirty="0"/>
+              <a:t>Bash Learning curve - Living in </a:t>
+            </a:r>
+            <a:r>
+              <a:rPr lang="en-US" b="1" dirty="0" err="1"/>
+              <a:t>GITHub</a:t>
+            </a:r>
+            <a:r>
+              <a:rPr lang="en-US" b="1" dirty="0"/>
+              <a:t> and working in GIT </a:t>
+            </a:r>
+            <a:endParaRPr lang="en-US" b="1" dirty="0" smtClean="0"/>
+          </a:p>
+          <a:p>
+            <a:r>
+              <a:rPr lang="en-US" b="1" dirty="0" smtClean="0"/>
+              <a:t>Using </a:t>
+            </a:r>
+            <a:r>
+              <a:rPr lang="en-US" b="1" dirty="0"/>
+              <a:t>JQuery </a:t>
+            </a:r>
+            <a:r>
+              <a:rPr lang="en-US" b="1" dirty="0" smtClean="0"/>
+              <a:t>plugins</a:t>
+            </a:r>
+          </a:p>
+          <a:p>
+            <a:endParaRPr lang="en-US" b="1" dirty="0" smtClean="0"/>
+          </a:p>
+          <a:p>
+            <a:r>
+              <a:rPr lang="en-US" b="1" dirty="0" smtClean="0"/>
+              <a:t>Integrating </a:t>
+            </a:r>
+            <a:r>
+              <a:rPr lang="en-US" b="1" dirty="0"/>
+              <a:t>JQuery Plugin into </a:t>
+            </a:r>
+            <a:r>
+              <a:rPr lang="en-US" b="1" dirty="0" smtClean="0"/>
+              <a:t>MVC/Razor/Html</a:t>
+            </a:r>
+          </a:p>
+          <a:p>
+            <a:r>
+              <a:rPr lang="en-US" b="1" dirty="0" smtClean="0"/>
+              <a:t>No change is a Stand alone change</a:t>
+            </a:r>
+          </a:p>
+          <a:p>
+            <a:endParaRPr lang="en-US" b="1" dirty="0" smtClean="0"/>
+          </a:p>
+          <a:p>
+            <a:endParaRPr lang="en-US" b="1" dirty="0"/>
+          </a:p>
+          <a:p>
+            <a:pPr marL="0" indent="0">
+              <a:buNone/>
+            </a:pPr>
+            <a:endParaRPr lang="en-US" b="1" dirty="0"/>
+          </a:p>
+          <a:p>
+            <a:endParaRPr lang="en-US" dirty="0"/>
+          </a:p>
+          <a:p>
+            <a:pPr marL="0" indent="0">
+              <a:buNone/>
+            </a:pPr>
+            <a:endParaRPr lang="en-US" dirty="0"/>
+          </a:p>
+        </p:txBody>
+      </p:sp>
+    </p:spTree>
+    <p:extLst>
+      <p:ext uri="{BB962C8B-B14F-4D97-AF65-F5344CB8AC3E}">
+        <p14:creationId xmlns:p14="http://schemas.microsoft.com/office/powerpoint/2010/main" val="2116137551"/>
+      </p:ext>
+    </p:extLst>
+  </p:cSld>
+  <p:clrMapOvr>
+    <a:masterClrMapping/>
+  </p:clrMapOvr>
+  <p:timing>
+    <p:tnLst>
+      <p:par>
+        <p:cTn id="1" dur="indefinite" restart="never" nodeType="tmRoot"/>
+      </p:par>
+    </p:tnLst>
+  </p:timing>
+</p:sld>
+</file>
+
 <file path=ppt/theme/theme1.xml><?xml version="1.0" encoding="utf-8"?>
 <a:theme xmlns:a="http://schemas.openxmlformats.org/drawingml/2006/main" name="Facet">
   <a:themeElements>

</xml_diff>

<commit_message>
PowerPoint Albert Update or presentation
</commit_message>
<xml_diff>
--- a/Final Project Documentation/CSC521.pptx
+++ b/Final Project Documentation/CSC521.pptx
@@ -19,8 +19,8 @@
     <p:sldId id="296" r:id="rId10"/>
     <p:sldId id="299" r:id="rId11"/>
     <p:sldId id="301" r:id="rId12"/>
-    <p:sldId id="302" r:id="rId13"/>
-    <p:sldId id="303" r:id="rId14"/>
+    <p:sldId id="306" r:id="rId13"/>
+    <p:sldId id="307" r:id="rId14"/>
     <p:sldId id="300" r:id="rId15"/>
     <p:sldId id="298" r:id="rId16"/>
     <p:sldId id="295" r:id="rId17"/>
@@ -9871,31 +9871,144 @@
             <p:ph type="title"/>
           </p:nvPr>
         </p:nvSpPr>
-        <p:spPr/>
+        <p:spPr>
+          <a:xfrm>
+            <a:off x="677334" y="487049"/>
+            <a:ext cx="8596668" cy="1320800"/>
+          </a:xfrm>
+        </p:spPr>
         <p:txBody>
-          <a:bodyPr/>
+          <a:bodyPr>
+            <a:normAutofit fontScale="90000"/>
+          </a:bodyPr>
           <a:lstStyle/>
           <a:p>
             <a:r>
-              <a:rPr lang="en-US" dirty="0"/>
-              <a:t>The GIT Bash Learning curve - Living in </a:t>
-            </a:r>
-            <a:r>
-              <a:rPr lang="en-US" dirty="0" err="1"/>
+              <a:rPr lang="en-US" b="1" dirty="0"/>
+              <a:t>The GIT Bash Learning curve </a:t>
+            </a:r>
+            <a:r>
+              <a:rPr lang="en-US" b="1" dirty="0" smtClean="0"/>
+              <a:t> </a:t>
+            </a:r>
+            <a:br>
+              <a:rPr lang="en-US" b="1" dirty="0" smtClean="0"/>
+            </a:br>
+            <a:r>
+              <a:rPr lang="en-US" b="1" dirty="0" smtClean="0"/>
+              <a:t>Living </a:t>
+            </a:r>
+            <a:r>
+              <a:rPr lang="en-US" b="1" dirty="0"/>
+              <a:t>in </a:t>
+            </a:r>
+            <a:r>
+              <a:rPr lang="en-US" b="1" dirty="0" err="1"/>
               <a:t>GITHub</a:t>
             </a:r>
             <a:r>
-              <a:rPr lang="en-US" dirty="0"/>
-              <a:t> and working in GIT</a:t>
-            </a:r>
+              <a:rPr lang="en-US" b="1" dirty="0"/>
+              <a:t> and working in GIT </a:t>
+            </a:r>
+            <a:br>
+              <a:rPr lang="en-US" b="1" dirty="0"/>
+            </a:br>
             <a:endParaRPr lang="en-US" dirty="0"/>
           </a:p>
         </p:txBody>
       </p:sp>
+      <p:pic>
+        <p:nvPicPr>
+          <p:cNvPr id="5" name="Content Placeholder 4"/>
+          <p:cNvPicPr>
+            <a:picLocks noGrp="1" noChangeAspect="1"/>
+          </p:cNvPicPr>
+          <p:nvPr>
+            <p:ph sz="half" idx="1"/>
+          </p:nvPr>
+        </p:nvPicPr>
+        <p:blipFill>
+          <a:blip r:embed="rId2" cstate="print">
+            <a:extLst>
+              <a:ext uri="{28A0092B-C50C-407E-A947-70E740481C1C}">
+                <a14:useLocalDpi xmlns:a14="http://schemas.microsoft.com/office/drawing/2010/main" val="0"/>
+              </a:ext>
+            </a:extLst>
+          </a:blip>
+          <a:stretch>
+            <a:fillRect/>
+          </a:stretch>
+        </p:blipFill>
+        <p:spPr>
+          <a:xfrm>
+            <a:off x="374915" y="1840076"/>
+            <a:ext cx="4132854" cy="4211932"/>
+          </a:xfrm>
+        </p:spPr>
+      </p:pic>
+      <p:pic>
+        <p:nvPicPr>
+          <p:cNvPr id="6" name="Content Placeholder 5"/>
+          <p:cNvPicPr>
+            <a:picLocks noGrp="1" noChangeAspect="1"/>
+          </p:cNvPicPr>
+          <p:nvPr>
+            <p:ph sz="half" idx="2"/>
+          </p:nvPr>
+        </p:nvPicPr>
+        <p:blipFill>
+          <a:blip r:embed="rId3" cstate="print">
+            <a:extLst>
+              <a:ext uri="{28A0092B-C50C-407E-A947-70E740481C1C}">
+                <a14:useLocalDpi xmlns:a14="http://schemas.microsoft.com/office/drawing/2010/main" val="0"/>
+              </a:ext>
+            </a:extLst>
+          </a:blip>
+          <a:stretch>
+            <a:fillRect/>
+          </a:stretch>
+        </p:blipFill>
+        <p:spPr>
+          <a:xfrm>
+            <a:off x="5051084" y="1745806"/>
+            <a:ext cx="4582901" cy="3520096"/>
+          </a:xfrm>
+        </p:spPr>
+      </p:pic>
+      <p:pic>
+        <p:nvPicPr>
+          <p:cNvPr id="7" name="Picture 6"/>
+          <p:cNvPicPr>
+            <a:picLocks noChangeAspect="1"/>
+          </p:cNvPicPr>
+          <p:nvPr/>
+        </p:nvPicPr>
+        <p:blipFill>
+          <a:blip r:embed="rId4" cstate="print">
+            <a:extLst>
+              <a:ext uri="{28A0092B-C50C-407E-A947-70E740481C1C}">
+                <a14:useLocalDpi xmlns:a14="http://schemas.microsoft.com/office/drawing/2010/main" val="0"/>
+              </a:ext>
+            </a:extLst>
+          </a:blip>
+          <a:stretch>
+            <a:fillRect/>
+          </a:stretch>
+        </p:blipFill>
+        <p:spPr>
+          <a:xfrm>
+            <a:off x="2672330" y="2611224"/>
+            <a:ext cx="4106285" cy="4147795"/>
+          </a:xfrm>
+          <a:prstGeom prst="rect">
+            <a:avLst/>
+          </a:prstGeom>
+        </p:spPr>
+      </p:pic>
     </p:spTree>
     <p:extLst>
       <p:ext uri="{BB962C8B-B14F-4D97-AF65-F5344CB8AC3E}">
-        <p14:creationId xmlns:p14="http://schemas.microsoft.com/office/powerpoint/2010/main" val="3466366651"/>
+        <p14:creationId xmlns:p14="http://schemas.microsoft.com/office/powerpoint/2010/main" val="1388846036"/>
       </p:ext>
     </p:extLst>
   </p:cSld>
@@ -9905,7 +10018,327 @@
   <p:timing>
     <p:tnLst>
       <p:par>
-        <p:cTn id="1" dur="indefinite" restart="never" nodeType="tmRoot"/>
+        <p:cTn id="1" dur="indefinite" restart="never" nodeType="tmRoot">
+          <p:childTnLst>
+            <p:seq concurrent="1" nextAc="seek">
+              <p:cTn id="2" dur="indefinite" nodeType="mainSeq">
+                <p:childTnLst>
+                  <p:par>
+                    <p:cTn id="3" fill="hold">
+                      <p:stCondLst>
+                        <p:cond delay="indefinite"/>
+                      </p:stCondLst>
+                      <p:childTnLst>
+                        <p:par>
+                          <p:cTn id="4" fill="hold">
+                            <p:stCondLst>
+                              <p:cond delay="0"/>
+                            </p:stCondLst>
+                            <p:childTnLst>
+                              <p:par>
+                                <p:cTn id="5" presetID="42" presetClass="entr" presetSubtype="0" fill="hold" nodeType="clickEffect">
+                                  <p:stCondLst>
+                                    <p:cond delay="0"/>
+                                  </p:stCondLst>
+                                  <p:childTnLst>
+                                    <p:set>
+                                      <p:cBhvr>
+                                        <p:cTn id="6" dur="1" fill="hold">
+                                          <p:stCondLst>
+                                            <p:cond delay="0"/>
+                                          </p:stCondLst>
+                                        </p:cTn>
+                                        <p:tgtEl>
+                                          <p:spTgt spid="5"/>
+                                        </p:tgtEl>
+                                        <p:attrNameLst>
+                                          <p:attrName>style.visibility</p:attrName>
+                                        </p:attrNameLst>
+                                      </p:cBhvr>
+                                      <p:to>
+                                        <p:strVal val="visible"/>
+                                      </p:to>
+                                    </p:set>
+                                    <p:animEffect transition="in" filter="fade">
+                                      <p:cBhvr>
+                                        <p:cTn id="7" dur="1000"/>
+                                        <p:tgtEl>
+                                          <p:spTgt spid="5"/>
+                                        </p:tgtEl>
+                                      </p:cBhvr>
+                                    </p:animEffect>
+                                    <p:anim calcmode="lin" valueType="num">
+                                      <p:cBhvr>
+                                        <p:cTn id="8" dur="1000" fill="hold"/>
+                                        <p:tgtEl>
+                                          <p:spTgt spid="5"/>
+                                        </p:tgtEl>
+                                        <p:attrNameLst>
+                                          <p:attrName>ppt_x</p:attrName>
+                                        </p:attrNameLst>
+                                      </p:cBhvr>
+                                      <p:tavLst>
+                                        <p:tav tm="0">
+                                          <p:val>
+                                            <p:strVal val="#ppt_x"/>
+                                          </p:val>
+                                        </p:tav>
+                                        <p:tav tm="100000">
+                                          <p:val>
+                                            <p:strVal val="#ppt_x"/>
+                                          </p:val>
+                                        </p:tav>
+                                      </p:tavLst>
+                                    </p:anim>
+                                    <p:anim calcmode="lin" valueType="num">
+                                      <p:cBhvr>
+                                        <p:cTn id="9" dur="1000" fill="hold"/>
+                                        <p:tgtEl>
+                                          <p:spTgt spid="5"/>
+                                        </p:tgtEl>
+                                        <p:attrNameLst>
+                                          <p:attrName>ppt_y</p:attrName>
+                                        </p:attrNameLst>
+                                      </p:cBhvr>
+                                      <p:tavLst>
+                                        <p:tav tm="0">
+                                          <p:val>
+                                            <p:strVal val="#ppt_y+.1"/>
+                                          </p:val>
+                                        </p:tav>
+                                        <p:tav tm="100000">
+                                          <p:val>
+                                            <p:strVal val="#ppt_y"/>
+                                          </p:val>
+                                        </p:tav>
+                                      </p:tavLst>
+                                    </p:anim>
+                                  </p:childTnLst>
+                                </p:cTn>
+                              </p:par>
+                            </p:childTnLst>
+                          </p:cTn>
+                        </p:par>
+                      </p:childTnLst>
+                    </p:cTn>
+                  </p:par>
+                  <p:par>
+                    <p:cTn id="10" fill="hold">
+                      <p:stCondLst>
+                        <p:cond delay="indefinite"/>
+                      </p:stCondLst>
+                      <p:childTnLst>
+                        <p:par>
+                          <p:cTn id="11" fill="hold">
+                            <p:stCondLst>
+                              <p:cond delay="0"/>
+                            </p:stCondLst>
+                            <p:childTnLst>
+                              <p:par>
+                                <p:cTn id="12" presetID="42" presetClass="entr" presetSubtype="0" fill="hold" nodeType="clickEffect">
+                                  <p:stCondLst>
+                                    <p:cond delay="0"/>
+                                  </p:stCondLst>
+                                  <p:childTnLst>
+                                    <p:set>
+                                      <p:cBhvr>
+                                        <p:cTn id="13" dur="1" fill="hold">
+                                          <p:stCondLst>
+                                            <p:cond delay="0"/>
+                                          </p:stCondLst>
+                                        </p:cTn>
+                                        <p:tgtEl>
+                                          <p:spTgt spid="6"/>
+                                        </p:tgtEl>
+                                        <p:attrNameLst>
+                                          <p:attrName>style.visibility</p:attrName>
+                                        </p:attrNameLst>
+                                      </p:cBhvr>
+                                      <p:to>
+                                        <p:strVal val="visible"/>
+                                      </p:to>
+                                    </p:set>
+                                    <p:animEffect transition="in" filter="fade">
+                                      <p:cBhvr>
+                                        <p:cTn id="14" dur="1000"/>
+                                        <p:tgtEl>
+                                          <p:spTgt spid="6"/>
+                                        </p:tgtEl>
+                                      </p:cBhvr>
+                                    </p:animEffect>
+                                    <p:anim calcmode="lin" valueType="num">
+                                      <p:cBhvr>
+                                        <p:cTn id="15" dur="1000" fill="hold"/>
+                                        <p:tgtEl>
+                                          <p:spTgt spid="6"/>
+                                        </p:tgtEl>
+                                        <p:attrNameLst>
+                                          <p:attrName>ppt_x</p:attrName>
+                                        </p:attrNameLst>
+                                      </p:cBhvr>
+                                      <p:tavLst>
+                                        <p:tav tm="0">
+                                          <p:val>
+                                            <p:strVal val="#ppt_x"/>
+                                          </p:val>
+                                        </p:tav>
+                                        <p:tav tm="100000">
+                                          <p:val>
+                                            <p:strVal val="#ppt_x"/>
+                                          </p:val>
+                                        </p:tav>
+                                      </p:tavLst>
+                                    </p:anim>
+                                    <p:anim calcmode="lin" valueType="num">
+                                      <p:cBhvr>
+                                        <p:cTn id="16" dur="1000" fill="hold"/>
+                                        <p:tgtEl>
+                                          <p:spTgt spid="6"/>
+                                        </p:tgtEl>
+                                        <p:attrNameLst>
+                                          <p:attrName>ppt_y</p:attrName>
+                                        </p:attrNameLst>
+                                      </p:cBhvr>
+                                      <p:tavLst>
+                                        <p:tav tm="0">
+                                          <p:val>
+                                            <p:strVal val="#ppt_y+.1"/>
+                                          </p:val>
+                                        </p:tav>
+                                        <p:tav tm="100000">
+                                          <p:val>
+                                            <p:strVal val="#ppt_y"/>
+                                          </p:val>
+                                        </p:tav>
+                                      </p:tavLst>
+                                    </p:anim>
+                                  </p:childTnLst>
+                                </p:cTn>
+                              </p:par>
+                            </p:childTnLst>
+                          </p:cTn>
+                        </p:par>
+                      </p:childTnLst>
+                    </p:cTn>
+                  </p:par>
+                  <p:par>
+                    <p:cTn id="17" fill="hold">
+                      <p:stCondLst>
+                        <p:cond delay="indefinite"/>
+                      </p:stCondLst>
+                      <p:childTnLst>
+                        <p:par>
+                          <p:cTn id="18" fill="hold">
+                            <p:stCondLst>
+                              <p:cond delay="0"/>
+                            </p:stCondLst>
+                            <p:childTnLst>
+                              <p:par>
+                                <p:cTn id="19" presetID="42" presetClass="entr" presetSubtype="0" fill="hold" nodeType="clickEffect">
+                                  <p:stCondLst>
+                                    <p:cond delay="0"/>
+                                  </p:stCondLst>
+                                  <p:childTnLst>
+                                    <p:set>
+                                      <p:cBhvr>
+                                        <p:cTn id="20" dur="1" fill="hold">
+                                          <p:stCondLst>
+                                            <p:cond delay="0"/>
+                                          </p:stCondLst>
+                                        </p:cTn>
+                                        <p:tgtEl>
+                                          <p:spTgt spid="7"/>
+                                        </p:tgtEl>
+                                        <p:attrNameLst>
+                                          <p:attrName>style.visibility</p:attrName>
+                                        </p:attrNameLst>
+                                      </p:cBhvr>
+                                      <p:to>
+                                        <p:strVal val="visible"/>
+                                      </p:to>
+                                    </p:set>
+                                    <p:animEffect transition="in" filter="fade">
+                                      <p:cBhvr>
+                                        <p:cTn id="21" dur="1000"/>
+                                        <p:tgtEl>
+                                          <p:spTgt spid="7"/>
+                                        </p:tgtEl>
+                                      </p:cBhvr>
+                                    </p:animEffect>
+                                    <p:anim calcmode="lin" valueType="num">
+                                      <p:cBhvr>
+                                        <p:cTn id="22" dur="1000" fill="hold"/>
+                                        <p:tgtEl>
+                                          <p:spTgt spid="7"/>
+                                        </p:tgtEl>
+                                        <p:attrNameLst>
+                                          <p:attrName>ppt_x</p:attrName>
+                                        </p:attrNameLst>
+                                      </p:cBhvr>
+                                      <p:tavLst>
+                                        <p:tav tm="0">
+                                          <p:val>
+                                            <p:strVal val="#ppt_x"/>
+                                          </p:val>
+                                        </p:tav>
+                                        <p:tav tm="100000">
+                                          <p:val>
+                                            <p:strVal val="#ppt_x"/>
+                                          </p:val>
+                                        </p:tav>
+                                      </p:tavLst>
+                                    </p:anim>
+                                    <p:anim calcmode="lin" valueType="num">
+                                      <p:cBhvr>
+                                        <p:cTn id="23" dur="1000" fill="hold"/>
+                                        <p:tgtEl>
+                                          <p:spTgt spid="7"/>
+                                        </p:tgtEl>
+                                        <p:attrNameLst>
+                                          <p:attrName>ppt_y</p:attrName>
+                                        </p:attrNameLst>
+                                      </p:cBhvr>
+                                      <p:tavLst>
+                                        <p:tav tm="0">
+                                          <p:val>
+                                            <p:strVal val="#ppt_y+.1"/>
+                                          </p:val>
+                                        </p:tav>
+                                        <p:tav tm="100000">
+                                          <p:val>
+                                            <p:strVal val="#ppt_y"/>
+                                          </p:val>
+                                        </p:tav>
+                                      </p:tavLst>
+                                    </p:anim>
+                                  </p:childTnLst>
+                                </p:cTn>
+                              </p:par>
+                            </p:childTnLst>
+                          </p:cTn>
+                        </p:par>
+                      </p:childTnLst>
+                    </p:cTn>
+                  </p:par>
+                </p:childTnLst>
+              </p:cTn>
+              <p:prevCondLst>
+                <p:cond evt="onPrev" delay="0">
+                  <p:tgtEl>
+                    <p:sldTgt/>
+                  </p:tgtEl>
+                </p:cond>
+              </p:prevCondLst>
+              <p:nextCondLst>
+                <p:cond evt="onNext" delay="0">
+                  <p:tgtEl>
+                    <p:sldTgt/>
+                  </p:tgtEl>
+                </p:cond>
+              </p:nextCondLst>
+            </p:seq>
+          </p:childTnLst>
+        </p:cTn>
       </p:par>
     </p:tnLst>
   </p:timing>
@@ -9945,20 +10378,138 @@
           <a:lstStyle/>
           <a:p>
             <a:r>
-              <a:rPr lang="en-US" dirty="0"/>
+              <a:rPr lang="en-US" b="1" dirty="0"/>
               <a:t>Using JQuery plugins</a:t>
             </a:r>
             <a:br>
-              <a:rPr lang="en-US" dirty="0"/>
+              <a:rPr lang="en-US" b="1" dirty="0"/>
             </a:br>
             <a:endParaRPr lang="en-US" dirty="0"/>
           </a:p>
         </p:txBody>
       </p:sp>
+      <p:pic>
+        <p:nvPicPr>
+          <p:cNvPr id="6" name="Content Placeholder 5"/>
+          <p:cNvPicPr>
+            <a:picLocks noGrp="1" noChangeAspect="1"/>
+          </p:cNvPicPr>
+          <p:nvPr>
+            <p:ph sz="half" idx="2"/>
+          </p:nvPr>
+        </p:nvPicPr>
+        <p:blipFill>
+          <a:blip r:embed="rId2" cstate="print">
+            <a:extLst>
+              <a:ext uri="{28A0092B-C50C-407E-A947-70E740481C1C}">
+                <a14:useLocalDpi xmlns:a14="http://schemas.microsoft.com/office/drawing/2010/main" val="0"/>
+              </a:ext>
+            </a:extLst>
+          </a:blip>
+          <a:stretch>
+            <a:fillRect/>
+          </a:stretch>
+        </p:blipFill>
+        <p:spPr>
+          <a:xfrm>
+            <a:off x="422177" y="2193673"/>
+            <a:ext cx="3057461" cy="3881437"/>
+          </a:xfrm>
+        </p:spPr>
+      </p:pic>
+      <p:pic>
+        <p:nvPicPr>
+          <p:cNvPr id="7" name="Picture 6"/>
+          <p:cNvPicPr>
+            <a:picLocks noChangeAspect="1"/>
+          </p:cNvPicPr>
+          <p:nvPr/>
+        </p:nvPicPr>
+        <p:blipFill>
+          <a:blip r:embed="rId3" cstate="print">
+            <a:extLst>
+              <a:ext uri="{28A0092B-C50C-407E-A947-70E740481C1C}">
+                <a14:useLocalDpi xmlns:a14="http://schemas.microsoft.com/office/drawing/2010/main" val="0"/>
+              </a:ext>
+            </a:extLst>
+          </a:blip>
+          <a:stretch>
+            <a:fillRect/>
+          </a:stretch>
+        </p:blipFill>
+        <p:spPr>
+          <a:xfrm>
+            <a:off x="2768040" y="1690411"/>
+            <a:ext cx="3894776" cy="3596326"/>
+          </a:xfrm>
+          <a:prstGeom prst="rect">
+            <a:avLst/>
+          </a:prstGeom>
+        </p:spPr>
+      </p:pic>
+      <p:pic>
+        <p:nvPicPr>
+          <p:cNvPr id="5" name="Content Placeholder 4"/>
+          <p:cNvPicPr>
+            <a:picLocks noGrp="1" noChangeAspect="1"/>
+          </p:cNvPicPr>
+          <p:nvPr>
+            <p:ph sz="half" idx="1"/>
+          </p:nvPr>
+        </p:nvPicPr>
+        <p:blipFill>
+          <a:blip r:embed="rId4" cstate="print">
+            <a:extLst>
+              <a:ext uri="{28A0092B-C50C-407E-A947-70E740481C1C}">
+                <a14:useLocalDpi xmlns:a14="http://schemas.microsoft.com/office/drawing/2010/main" val="0"/>
+              </a:ext>
+            </a:extLst>
+          </a:blip>
+          <a:stretch>
+            <a:fillRect/>
+          </a:stretch>
+        </p:blipFill>
+        <p:spPr>
+          <a:xfrm>
+            <a:off x="5940781" y="883184"/>
+            <a:ext cx="3427491" cy="3606384"/>
+          </a:xfrm>
+        </p:spPr>
+      </p:pic>
+      <p:pic>
+        <p:nvPicPr>
+          <p:cNvPr id="8" name="Picture 7"/>
+          <p:cNvPicPr>
+            <a:picLocks noChangeAspect="1"/>
+          </p:cNvPicPr>
+          <p:nvPr/>
+        </p:nvPicPr>
+        <p:blipFill>
+          <a:blip r:embed="rId5">
+            <a:extLst>
+              <a:ext uri="{28A0092B-C50C-407E-A947-70E740481C1C}">
+                <a14:useLocalDpi xmlns:a14="http://schemas.microsoft.com/office/drawing/2010/main" val="0"/>
+              </a:ext>
+            </a:extLst>
+          </a:blip>
+          <a:stretch>
+            <a:fillRect/>
+          </a:stretch>
+        </p:blipFill>
+        <p:spPr>
+          <a:xfrm>
+            <a:off x="2419248" y="3328990"/>
+            <a:ext cx="5857486" cy="2519804"/>
+          </a:xfrm>
+          <a:prstGeom prst="rect">
+            <a:avLst/>
+          </a:prstGeom>
+        </p:spPr>
+      </p:pic>
     </p:spTree>
     <p:extLst>
       <p:ext uri="{BB962C8B-B14F-4D97-AF65-F5344CB8AC3E}">
-        <p14:creationId xmlns:p14="http://schemas.microsoft.com/office/powerpoint/2010/main" val="3889570862"/>
+        <p14:creationId xmlns:p14="http://schemas.microsoft.com/office/powerpoint/2010/main" val="2395182948"/>
       </p:ext>
     </p:extLst>
   </p:cSld>
@@ -9968,7 +10519,426 @@
   <p:timing>
     <p:tnLst>
       <p:par>
-        <p:cTn id="1" dur="indefinite" restart="never" nodeType="tmRoot"/>
+        <p:cTn id="1" dur="indefinite" restart="never" nodeType="tmRoot">
+          <p:childTnLst>
+            <p:seq concurrent="1" nextAc="seek">
+              <p:cTn id="2" dur="indefinite" nodeType="mainSeq">
+                <p:childTnLst>
+                  <p:par>
+                    <p:cTn id="3" fill="hold">
+                      <p:stCondLst>
+                        <p:cond delay="indefinite"/>
+                      </p:stCondLst>
+                      <p:childTnLst>
+                        <p:par>
+                          <p:cTn id="4" fill="hold">
+                            <p:stCondLst>
+                              <p:cond delay="0"/>
+                            </p:stCondLst>
+                            <p:childTnLst>
+                              <p:par>
+                                <p:cTn id="5" presetID="42" presetClass="entr" presetSubtype="0" fill="hold" nodeType="clickEffect">
+                                  <p:stCondLst>
+                                    <p:cond delay="0"/>
+                                  </p:stCondLst>
+                                  <p:childTnLst>
+                                    <p:set>
+                                      <p:cBhvr>
+                                        <p:cTn id="6" dur="1" fill="hold">
+                                          <p:stCondLst>
+                                            <p:cond delay="0"/>
+                                          </p:stCondLst>
+                                        </p:cTn>
+                                        <p:tgtEl>
+                                          <p:spTgt spid="6"/>
+                                        </p:tgtEl>
+                                        <p:attrNameLst>
+                                          <p:attrName>style.visibility</p:attrName>
+                                        </p:attrNameLst>
+                                      </p:cBhvr>
+                                      <p:to>
+                                        <p:strVal val="visible"/>
+                                      </p:to>
+                                    </p:set>
+                                    <p:animEffect transition="in" filter="fade">
+                                      <p:cBhvr>
+                                        <p:cTn id="7" dur="1000"/>
+                                        <p:tgtEl>
+                                          <p:spTgt spid="6"/>
+                                        </p:tgtEl>
+                                      </p:cBhvr>
+                                    </p:animEffect>
+                                    <p:anim calcmode="lin" valueType="num">
+                                      <p:cBhvr>
+                                        <p:cTn id="8" dur="1000" fill="hold"/>
+                                        <p:tgtEl>
+                                          <p:spTgt spid="6"/>
+                                        </p:tgtEl>
+                                        <p:attrNameLst>
+                                          <p:attrName>ppt_x</p:attrName>
+                                        </p:attrNameLst>
+                                      </p:cBhvr>
+                                      <p:tavLst>
+                                        <p:tav tm="0">
+                                          <p:val>
+                                            <p:strVal val="#ppt_x"/>
+                                          </p:val>
+                                        </p:tav>
+                                        <p:tav tm="100000">
+                                          <p:val>
+                                            <p:strVal val="#ppt_x"/>
+                                          </p:val>
+                                        </p:tav>
+                                      </p:tavLst>
+                                    </p:anim>
+                                    <p:anim calcmode="lin" valueType="num">
+                                      <p:cBhvr>
+                                        <p:cTn id="9" dur="1000" fill="hold"/>
+                                        <p:tgtEl>
+                                          <p:spTgt spid="6"/>
+                                        </p:tgtEl>
+                                        <p:attrNameLst>
+                                          <p:attrName>ppt_y</p:attrName>
+                                        </p:attrNameLst>
+                                      </p:cBhvr>
+                                      <p:tavLst>
+                                        <p:tav tm="0">
+                                          <p:val>
+                                            <p:strVal val="#ppt_y+.1"/>
+                                          </p:val>
+                                        </p:tav>
+                                        <p:tav tm="100000">
+                                          <p:val>
+                                            <p:strVal val="#ppt_y"/>
+                                          </p:val>
+                                        </p:tav>
+                                      </p:tavLst>
+                                    </p:anim>
+                                  </p:childTnLst>
+                                </p:cTn>
+                              </p:par>
+                            </p:childTnLst>
+                          </p:cTn>
+                        </p:par>
+                      </p:childTnLst>
+                    </p:cTn>
+                  </p:par>
+                  <p:par>
+                    <p:cTn id="10" fill="hold">
+                      <p:stCondLst>
+                        <p:cond delay="indefinite"/>
+                      </p:stCondLst>
+                      <p:childTnLst>
+                        <p:par>
+                          <p:cTn id="11" fill="hold">
+                            <p:stCondLst>
+                              <p:cond delay="0"/>
+                            </p:stCondLst>
+                            <p:childTnLst>
+                              <p:par>
+                                <p:cTn id="12" presetID="42" presetClass="entr" presetSubtype="0" fill="hold" nodeType="clickEffect">
+                                  <p:stCondLst>
+                                    <p:cond delay="0"/>
+                                  </p:stCondLst>
+                                  <p:childTnLst>
+                                    <p:set>
+                                      <p:cBhvr>
+                                        <p:cTn id="13" dur="1" fill="hold">
+                                          <p:stCondLst>
+                                            <p:cond delay="0"/>
+                                          </p:stCondLst>
+                                        </p:cTn>
+                                        <p:tgtEl>
+                                          <p:spTgt spid="7"/>
+                                        </p:tgtEl>
+                                        <p:attrNameLst>
+                                          <p:attrName>style.visibility</p:attrName>
+                                        </p:attrNameLst>
+                                      </p:cBhvr>
+                                      <p:to>
+                                        <p:strVal val="visible"/>
+                                      </p:to>
+                                    </p:set>
+                                    <p:animEffect transition="in" filter="fade">
+                                      <p:cBhvr>
+                                        <p:cTn id="14" dur="1000"/>
+                                        <p:tgtEl>
+                                          <p:spTgt spid="7"/>
+                                        </p:tgtEl>
+                                      </p:cBhvr>
+                                    </p:animEffect>
+                                    <p:anim calcmode="lin" valueType="num">
+                                      <p:cBhvr>
+                                        <p:cTn id="15" dur="1000" fill="hold"/>
+                                        <p:tgtEl>
+                                          <p:spTgt spid="7"/>
+                                        </p:tgtEl>
+                                        <p:attrNameLst>
+                                          <p:attrName>ppt_x</p:attrName>
+                                        </p:attrNameLst>
+                                      </p:cBhvr>
+                                      <p:tavLst>
+                                        <p:tav tm="0">
+                                          <p:val>
+                                            <p:strVal val="#ppt_x"/>
+                                          </p:val>
+                                        </p:tav>
+                                        <p:tav tm="100000">
+                                          <p:val>
+                                            <p:strVal val="#ppt_x"/>
+                                          </p:val>
+                                        </p:tav>
+                                      </p:tavLst>
+                                    </p:anim>
+                                    <p:anim calcmode="lin" valueType="num">
+                                      <p:cBhvr>
+                                        <p:cTn id="16" dur="1000" fill="hold"/>
+                                        <p:tgtEl>
+                                          <p:spTgt spid="7"/>
+                                        </p:tgtEl>
+                                        <p:attrNameLst>
+                                          <p:attrName>ppt_y</p:attrName>
+                                        </p:attrNameLst>
+                                      </p:cBhvr>
+                                      <p:tavLst>
+                                        <p:tav tm="0">
+                                          <p:val>
+                                            <p:strVal val="#ppt_y+.1"/>
+                                          </p:val>
+                                        </p:tav>
+                                        <p:tav tm="100000">
+                                          <p:val>
+                                            <p:strVal val="#ppt_y"/>
+                                          </p:val>
+                                        </p:tav>
+                                      </p:tavLst>
+                                    </p:anim>
+                                  </p:childTnLst>
+                                </p:cTn>
+                              </p:par>
+                            </p:childTnLst>
+                          </p:cTn>
+                        </p:par>
+                      </p:childTnLst>
+                    </p:cTn>
+                  </p:par>
+                  <p:par>
+                    <p:cTn id="17" fill="hold">
+                      <p:stCondLst>
+                        <p:cond delay="indefinite"/>
+                      </p:stCondLst>
+                      <p:childTnLst>
+                        <p:par>
+                          <p:cTn id="18" fill="hold">
+                            <p:stCondLst>
+                              <p:cond delay="0"/>
+                            </p:stCondLst>
+                            <p:childTnLst>
+                              <p:par>
+                                <p:cTn id="19" presetID="42" presetClass="entr" presetSubtype="0" fill="hold" nodeType="clickEffect">
+                                  <p:stCondLst>
+                                    <p:cond delay="0"/>
+                                  </p:stCondLst>
+                                  <p:childTnLst>
+                                    <p:set>
+                                      <p:cBhvr>
+                                        <p:cTn id="20" dur="1" fill="hold">
+                                          <p:stCondLst>
+                                            <p:cond delay="0"/>
+                                          </p:stCondLst>
+                                        </p:cTn>
+                                        <p:tgtEl>
+                                          <p:spTgt spid="5"/>
+                                        </p:tgtEl>
+                                        <p:attrNameLst>
+                                          <p:attrName>style.visibility</p:attrName>
+                                        </p:attrNameLst>
+                                      </p:cBhvr>
+                                      <p:to>
+                                        <p:strVal val="visible"/>
+                                      </p:to>
+                                    </p:set>
+                                    <p:animEffect transition="in" filter="fade">
+                                      <p:cBhvr>
+                                        <p:cTn id="21" dur="1000"/>
+                                        <p:tgtEl>
+                                          <p:spTgt spid="5"/>
+                                        </p:tgtEl>
+                                      </p:cBhvr>
+                                    </p:animEffect>
+                                    <p:anim calcmode="lin" valueType="num">
+                                      <p:cBhvr>
+                                        <p:cTn id="22" dur="1000" fill="hold"/>
+                                        <p:tgtEl>
+                                          <p:spTgt spid="5"/>
+                                        </p:tgtEl>
+                                        <p:attrNameLst>
+                                          <p:attrName>ppt_x</p:attrName>
+                                        </p:attrNameLst>
+                                      </p:cBhvr>
+                                      <p:tavLst>
+                                        <p:tav tm="0">
+                                          <p:val>
+                                            <p:strVal val="#ppt_x"/>
+                                          </p:val>
+                                        </p:tav>
+                                        <p:tav tm="100000">
+                                          <p:val>
+                                            <p:strVal val="#ppt_x"/>
+                                          </p:val>
+                                        </p:tav>
+                                      </p:tavLst>
+                                    </p:anim>
+                                    <p:anim calcmode="lin" valueType="num">
+                                      <p:cBhvr>
+                                        <p:cTn id="23" dur="1000" fill="hold"/>
+                                        <p:tgtEl>
+                                          <p:spTgt spid="5"/>
+                                        </p:tgtEl>
+                                        <p:attrNameLst>
+                                          <p:attrName>ppt_y</p:attrName>
+                                        </p:attrNameLst>
+                                      </p:cBhvr>
+                                      <p:tavLst>
+                                        <p:tav tm="0">
+                                          <p:val>
+                                            <p:strVal val="#ppt_y+.1"/>
+                                          </p:val>
+                                        </p:tav>
+                                        <p:tav tm="100000">
+                                          <p:val>
+                                            <p:strVal val="#ppt_y"/>
+                                          </p:val>
+                                        </p:tav>
+                                      </p:tavLst>
+                                    </p:anim>
+                                  </p:childTnLst>
+                                </p:cTn>
+                              </p:par>
+                            </p:childTnLst>
+                          </p:cTn>
+                        </p:par>
+                      </p:childTnLst>
+                    </p:cTn>
+                  </p:par>
+                  <p:par>
+                    <p:cTn id="24" fill="hold">
+                      <p:stCondLst>
+                        <p:cond delay="indefinite"/>
+                      </p:stCondLst>
+                      <p:childTnLst>
+                        <p:par>
+                          <p:cTn id="25" fill="hold">
+                            <p:stCondLst>
+                              <p:cond delay="0"/>
+                            </p:stCondLst>
+                            <p:childTnLst>
+                              <p:par>
+                                <p:cTn id="26" presetID="42" presetClass="entr" presetSubtype="0" fill="hold" nodeType="clickEffect">
+                                  <p:stCondLst>
+                                    <p:cond delay="0"/>
+                                  </p:stCondLst>
+                                  <p:childTnLst>
+                                    <p:set>
+                                      <p:cBhvr>
+                                        <p:cTn id="27" dur="1" fill="hold">
+                                          <p:stCondLst>
+                                            <p:cond delay="0"/>
+                                          </p:stCondLst>
+                                        </p:cTn>
+                                        <p:tgtEl>
+                                          <p:spTgt spid="8"/>
+                                        </p:tgtEl>
+                                        <p:attrNameLst>
+                                          <p:attrName>style.visibility</p:attrName>
+                                        </p:attrNameLst>
+                                      </p:cBhvr>
+                                      <p:to>
+                                        <p:strVal val="visible"/>
+                                      </p:to>
+                                    </p:set>
+                                    <p:animEffect transition="in" filter="fade">
+                                      <p:cBhvr>
+                                        <p:cTn id="28" dur="1000"/>
+                                        <p:tgtEl>
+                                          <p:spTgt spid="8"/>
+                                        </p:tgtEl>
+                                      </p:cBhvr>
+                                    </p:animEffect>
+                                    <p:anim calcmode="lin" valueType="num">
+                                      <p:cBhvr>
+                                        <p:cTn id="29" dur="1000" fill="hold"/>
+                                        <p:tgtEl>
+                                          <p:spTgt spid="8"/>
+                                        </p:tgtEl>
+                                        <p:attrNameLst>
+                                          <p:attrName>ppt_x</p:attrName>
+                                        </p:attrNameLst>
+                                      </p:cBhvr>
+                                      <p:tavLst>
+                                        <p:tav tm="0">
+                                          <p:val>
+                                            <p:strVal val="#ppt_x"/>
+                                          </p:val>
+                                        </p:tav>
+                                        <p:tav tm="100000">
+                                          <p:val>
+                                            <p:strVal val="#ppt_x"/>
+                                          </p:val>
+                                        </p:tav>
+                                      </p:tavLst>
+                                    </p:anim>
+                                    <p:anim calcmode="lin" valueType="num">
+                                      <p:cBhvr>
+                                        <p:cTn id="30" dur="1000" fill="hold"/>
+                                        <p:tgtEl>
+                                          <p:spTgt spid="8"/>
+                                        </p:tgtEl>
+                                        <p:attrNameLst>
+                                          <p:attrName>ppt_y</p:attrName>
+                                        </p:attrNameLst>
+                                      </p:cBhvr>
+                                      <p:tavLst>
+                                        <p:tav tm="0">
+                                          <p:val>
+                                            <p:strVal val="#ppt_y+.1"/>
+                                          </p:val>
+                                        </p:tav>
+                                        <p:tav tm="100000">
+                                          <p:val>
+                                            <p:strVal val="#ppt_y"/>
+                                          </p:val>
+                                        </p:tav>
+                                      </p:tavLst>
+                                    </p:anim>
+                                  </p:childTnLst>
+                                </p:cTn>
+                              </p:par>
+                            </p:childTnLst>
+                          </p:cTn>
+                        </p:par>
+                      </p:childTnLst>
+                    </p:cTn>
+                  </p:par>
+                </p:childTnLst>
+              </p:cTn>
+              <p:prevCondLst>
+                <p:cond evt="onPrev" delay="0">
+                  <p:tgtEl>
+                    <p:sldTgt/>
+                  </p:tgtEl>
+                </p:cond>
+              </p:prevCondLst>
+              <p:nextCondLst>
+                <p:cond evt="onNext" delay="0">
+                  <p:tgtEl>
+                    <p:sldTgt/>
+                  </p:tgtEl>
+                </p:cond>
+              </p:nextCondLst>
+            </p:seq>
+          </p:childTnLst>
+        </p:cTn>
       </p:par>
     </p:tnLst>
   </p:timing>

</xml_diff>